<commit_message>
Finished review with Dylan.
</commit_message>
<xml_diff>
--- a/Docker Proofs of Concept.pptx
+++ b/Docker Proofs of Concept.pptx
@@ -21,8 +21,7 @@
     <p:sldId id="270" r:id="rId15"/>
     <p:sldId id="271" r:id="rId16"/>
     <p:sldId id="280" r:id="rId17"/>
-    <p:sldId id="273" r:id="rId18"/>
-    <p:sldId id="274" r:id="rId19"/>
+    <p:sldId id="274" r:id="rId18"/>
   </p:sldIdLst>
   <p:sldSz cx="12192000" cy="6858000"/>
   <p:notesSz cx="7010400" cy="9296400"/>
@@ -150,7 +149,6 @@
             <p14:sldId id="270"/>
             <p14:sldId id="271"/>
             <p14:sldId id="280"/>
-            <p14:sldId id="273"/>
             <p14:sldId id="274"/>
           </p14:sldIdLst>
         </p14:section>
@@ -1972,788 +1970,6 @@
 </dgm:colorsDef>
 </file>
 
-<file path=ppt/diagrams/colors2.xml><?xml version="1.0" encoding="utf-8"?>
-<dgm:colorsDef xmlns:dgm="http://schemas.openxmlformats.org/drawingml/2006/diagram" xmlns:a="http://schemas.openxmlformats.org/drawingml/2006/main" uniqueId="urn:microsoft.com/office/officeart/2005/8/colors/colorful2">
-  <dgm:title val=""/>
-  <dgm:desc val=""/>
-  <dgm:catLst>
-    <dgm:cat type="colorful" pri="10200"/>
-  </dgm:catLst>
-  <dgm:styleLbl name="node0">
-    <dgm:fillClrLst meth="repeat">
-      <a:schemeClr val="accent1"/>
-    </dgm:fillClrLst>
-    <dgm:linClrLst meth="repeat">
-      <a:schemeClr val="lt1"/>
-    </dgm:linClrLst>
-    <dgm:effectClrLst/>
-    <dgm:txLinClrLst/>
-    <dgm:txFillClrLst/>
-    <dgm:txEffectClrLst/>
-  </dgm:styleLbl>
-  <dgm:styleLbl name="node1">
-    <dgm:fillClrLst>
-      <a:schemeClr val="accent2"/>
-      <a:schemeClr val="accent3"/>
-    </dgm:fillClrLst>
-    <dgm:linClrLst meth="repeat">
-      <a:schemeClr val="lt1"/>
-    </dgm:linClrLst>
-    <dgm:effectClrLst/>
-    <dgm:txLinClrLst/>
-    <dgm:txFillClrLst/>
-    <dgm:txEffectClrLst/>
-  </dgm:styleLbl>
-  <dgm:styleLbl name="alignNode1">
-    <dgm:fillClrLst>
-      <a:schemeClr val="accent2"/>
-      <a:schemeClr val="accent3"/>
-    </dgm:fillClrLst>
-    <dgm:linClrLst>
-      <a:schemeClr val="accent2"/>
-      <a:schemeClr val="accent3"/>
-    </dgm:linClrLst>
-    <dgm:effectClrLst/>
-    <dgm:txLinClrLst/>
-    <dgm:txFillClrLst/>
-    <dgm:txEffectClrLst/>
-  </dgm:styleLbl>
-  <dgm:styleLbl name="lnNode1">
-    <dgm:fillClrLst>
-      <a:schemeClr val="accent2"/>
-      <a:schemeClr val="accent3"/>
-    </dgm:fillClrLst>
-    <dgm:linClrLst meth="repeat">
-      <a:schemeClr val="lt1"/>
-    </dgm:linClrLst>
-    <dgm:effectClrLst/>
-    <dgm:txLinClrLst/>
-    <dgm:txFillClrLst/>
-    <dgm:txEffectClrLst/>
-  </dgm:styleLbl>
-  <dgm:styleLbl name="vennNode1">
-    <dgm:fillClrLst>
-      <a:schemeClr val="accent2">
-        <a:alpha val="50000"/>
-      </a:schemeClr>
-      <a:schemeClr val="accent3">
-        <a:alpha val="50000"/>
-      </a:schemeClr>
-    </dgm:fillClrLst>
-    <dgm:linClrLst meth="repeat">
-      <a:schemeClr val="lt1"/>
-    </dgm:linClrLst>
-    <dgm:effectClrLst/>
-    <dgm:txLinClrLst/>
-    <dgm:txFillClrLst/>
-    <dgm:txEffectClrLst/>
-  </dgm:styleLbl>
-  <dgm:styleLbl name="node2">
-    <dgm:fillClrLst>
-      <a:schemeClr val="accent3"/>
-    </dgm:fillClrLst>
-    <dgm:linClrLst meth="repeat">
-      <a:schemeClr val="lt1"/>
-    </dgm:linClrLst>
-    <dgm:effectClrLst/>
-    <dgm:txLinClrLst/>
-    <dgm:txFillClrLst/>
-    <dgm:txEffectClrLst/>
-  </dgm:styleLbl>
-  <dgm:styleLbl name="node3">
-    <dgm:fillClrLst>
-      <a:schemeClr val="accent4"/>
-    </dgm:fillClrLst>
-    <dgm:linClrLst meth="repeat">
-      <a:schemeClr val="lt1"/>
-    </dgm:linClrLst>
-    <dgm:effectClrLst/>
-    <dgm:txLinClrLst/>
-    <dgm:txFillClrLst/>
-    <dgm:txEffectClrLst/>
-  </dgm:styleLbl>
-  <dgm:styleLbl name="node4">
-    <dgm:fillClrLst>
-      <a:schemeClr val="accent5"/>
-    </dgm:fillClrLst>
-    <dgm:linClrLst meth="repeat">
-      <a:schemeClr val="lt1"/>
-    </dgm:linClrLst>
-    <dgm:effectClrLst/>
-    <dgm:txLinClrLst/>
-    <dgm:txFillClrLst/>
-    <dgm:txEffectClrLst/>
-  </dgm:styleLbl>
-  <dgm:styleLbl name="fgImgPlace1">
-    <dgm:fillClrLst>
-      <a:schemeClr val="accent2">
-        <a:tint val="50000"/>
-      </a:schemeClr>
-      <a:schemeClr val="accent3">
-        <a:tint val="50000"/>
-      </a:schemeClr>
-    </dgm:fillClrLst>
-    <dgm:linClrLst meth="repeat">
-      <a:schemeClr val="lt1"/>
-    </dgm:linClrLst>
-    <dgm:effectClrLst/>
-    <dgm:txLinClrLst/>
-    <dgm:txFillClrLst meth="repeat">
-      <a:schemeClr val="lt1"/>
-    </dgm:txFillClrLst>
-    <dgm:txEffectClrLst/>
-  </dgm:styleLbl>
-  <dgm:styleLbl name="alignImgPlace1">
-    <dgm:fillClrLst>
-      <a:schemeClr val="accent2">
-        <a:tint val="50000"/>
-      </a:schemeClr>
-      <a:schemeClr val="accent3">
-        <a:tint val="20000"/>
-      </a:schemeClr>
-    </dgm:fillClrLst>
-    <dgm:linClrLst meth="repeat">
-      <a:schemeClr val="lt1"/>
-    </dgm:linClrLst>
-    <dgm:effectClrLst/>
-    <dgm:txLinClrLst/>
-    <dgm:txFillClrLst meth="repeat">
-      <a:schemeClr val="lt1"/>
-    </dgm:txFillClrLst>
-    <dgm:txEffectClrLst/>
-  </dgm:styleLbl>
-  <dgm:styleLbl name="bgImgPlace1">
-    <dgm:fillClrLst>
-      <a:schemeClr val="accent2">
-        <a:tint val="50000"/>
-      </a:schemeClr>
-      <a:schemeClr val="accent3">
-        <a:tint val="20000"/>
-      </a:schemeClr>
-    </dgm:fillClrLst>
-    <dgm:linClrLst meth="repeat">
-      <a:schemeClr val="lt1"/>
-    </dgm:linClrLst>
-    <dgm:effectClrLst/>
-    <dgm:txLinClrLst/>
-    <dgm:txFillClrLst meth="repeat">
-      <a:schemeClr val="lt1"/>
-    </dgm:txFillClrLst>
-    <dgm:txEffectClrLst/>
-  </dgm:styleLbl>
-  <dgm:styleLbl name="sibTrans2D1">
-    <dgm:fillClrLst>
-      <a:schemeClr val="accent2"/>
-      <a:schemeClr val="accent3"/>
-    </dgm:fillClrLst>
-    <dgm:linClrLst meth="repeat">
-      <a:schemeClr val="lt1"/>
-    </dgm:linClrLst>
-    <dgm:effectClrLst/>
-    <dgm:txLinClrLst/>
-    <dgm:txFillClrLst/>
-    <dgm:txEffectClrLst/>
-  </dgm:styleLbl>
-  <dgm:styleLbl name="fgSibTrans2D1">
-    <dgm:fillClrLst>
-      <a:schemeClr val="accent2"/>
-      <a:schemeClr val="accent3"/>
-    </dgm:fillClrLst>
-    <dgm:linClrLst meth="repeat">
-      <a:schemeClr val="lt1"/>
-    </dgm:linClrLst>
-    <dgm:effectClrLst/>
-    <dgm:txLinClrLst/>
-    <dgm:txFillClrLst meth="repeat">
-      <a:schemeClr val="lt1"/>
-    </dgm:txFillClrLst>
-    <dgm:txEffectClrLst/>
-  </dgm:styleLbl>
-  <dgm:styleLbl name="bgSibTrans2D1">
-    <dgm:fillClrLst>
-      <a:schemeClr val="accent2"/>
-      <a:schemeClr val="accent3"/>
-    </dgm:fillClrLst>
-    <dgm:linClrLst meth="repeat">
-      <a:schemeClr val="lt1"/>
-    </dgm:linClrLst>
-    <dgm:effectClrLst/>
-    <dgm:txLinClrLst/>
-    <dgm:txFillClrLst meth="repeat">
-      <a:schemeClr val="lt1"/>
-    </dgm:txFillClrLst>
-    <dgm:txEffectClrLst/>
-  </dgm:styleLbl>
-  <dgm:styleLbl name="sibTrans1D1">
-    <dgm:fillClrLst/>
-    <dgm:linClrLst>
-      <a:schemeClr val="accent2"/>
-      <a:schemeClr val="accent3"/>
-    </dgm:linClrLst>
-    <dgm:effectClrLst/>
-    <dgm:txLinClrLst/>
-    <dgm:txFillClrLst meth="repeat">
-      <a:schemeClr val="tx1"/>
-    </dgm:txFillClrLst>
-    <dgm:txEffectClrLst/>
-  </dgm:styleLbl>
-  <dgm:styleLbl name="callout">
-    <dgm:fillClrLst meth="repeat">
-      <a:schemeClr val="accent2"/>
-    </dgm:fillClrLst>
-    <dgm:linClrLst meth="repeat">
-      <a:schemeClr val="accent2">
-        <a:tint val="50000"/>
-      </a:schemeClr>
-    </dgm:linClrLst>
-    <dgm:effectClrLst/>
-    <dgm:txLinClrLst/>
-    <dgm:txFillClrLst meth="repeat">
-      <a:schemeClr val="tx1"/>
-    </dgm:txFillClrLst>
-    <dgm:txEffectClrLst/>
-  </dgm:styleLbl>
-  <dgm:styleLbl name="asst0">
-    <dgm:fillClrLst meth="repeat">
-      <a:schemeClr val="accent2"/>
-    </dgm:fillClrLst>
-    <dgm:linClrLst meth="repeat">
-      <a:schemeClr val="lt1">
-        <a:shade val="80000"/>
-      </a:schemeClr>
-    </dgm:linClrLst>
-    <dgm:effectClrLst/>
-    <dgm:txLinClrLst/>
-    <dgm:txFillClrLst/>
-    <dgm:txEffectClrLst/>
-  </dgm:styleLbl>
-  <dgm:styleLbl name="asst1">
-    <dgm:fillClrLst meth="repeat">
-      <a:schemeClr val="accent3"/>
-    </dgm:fillClrLst>
-    <dgm:linClrLst meth="repeat">
-      <a:schemeClr val="lt1">
-        <a:shade val="80000"/>
-      </a:schemeClr>
-    </dgm:linClrLst>
-    <dgm:effectClrLst/>
-    <dgm:txLinClrLst/>
-    <dgm:txFillClrLst/>
-    <dgm:txEffectClrLst/>
-  </dgm:styleLbl>
-  <dgm:styleLbl name="asst2">
-    <dgm:fillClrLst>
-      <a:schemeClr val="accent4"/>
-    </dgm:fillClrLst>
-    <dgm:linClrLst meth="repeat">
-      <a:schemeClr val="lt1"/>
-    </dgm:linClrLst>
-    <dgm:effectClrLst/>
-    <dgm:txLinClrLst/>
-    <dgm:txFillClrLst/>
-    <dgm:txEffectClrLst/>
-  </dgm:styleLbl>
-  <dgm:styleLbl name="asst3">
-    <dgm:fillClrLst>
-      <a:schemeClr val="accent5"/>
-    </dgm:fillClrLst>
-    <dgm:linClrLst meth="repeat">
-      <a:schemeClr val="lt1"/>
-    </dgm:linClrLst>
-    <dgm:effectClrLst/>
-    <dgm:txLinClrLst/>
-    <dgm:txFillClrLst/>
-    <dgm:txEffectClrLst/>
-  </dgm:styleLbl>
-  <dgm:styleLbl name="asst4">
-    <dgm:fillClrLst>
-      <a:schemeClr val="accent6"/>
-    </dgm:fillClrLst>
-    <dgm:linClrLst meth="repeat">
-      <a:schemeClr val="lt1"/>
-    </dgm:linClrLst>
-    <dgm:effectClrLst/>
-    <dgm:txLinClrLst/>
-    <dgm:txFillClrLst/>
-    <dgm:txEffectClrLst/>
-  </dgm:styleLbl>
-  <dgm:styleLbl name="parChTrans2D1">
-    <dgm:fillClrLst meth="repeat">
-      <a:schemeClr val="accent2"/>
-    </dgm:fillClrLst>
-    <dgm:linClrLst meth="repeat">
-      <a:schemeClr val="lt1"/>
-    </dgm:linClrLst>
-    <dgm:effectClrLst/>
-    <dgm:txLinClrLst/>
-    <dgm:txFillClrLst meth="repeat">
-      <a:schemeClr val="lt1"/>
-    </dgm:txFillClrLst>
-    <dgm:txEffectClrLst/>
-  </dgm:styleLbl>
-  <dgm:styleLbl name="parChTrans2D2">
-    <dgm:fillClrLst meth="repeat">
-      <a:schemeClr val="accent3"/>
-    </dgm:fillClrLst>
-    <dgm:linClrLst meth="repeat">
-      <a:schemeClr val="lt1"/>
-    </dgm:linClrLst>
-    <dgm:effectClrLst/>
-    <dgm:txLinClrLst/>
-    <dgm:txFillClrLst/>
-    <dgm:txEffectClrLst/>
-  </dgm:styleLbl>
-  <dgm:styleLbl name="parChTrans2D3">
-    <dgm:fillClrLst meth="repeat">
-      <a:schemeClr val="accent4"/>
-    </dgm:fillClrLst>
-    <dgm:linClrLst meth="repeat">
-      <a:schemeClr val="lt1"/>
-    </dgm:linClrLst>
-    <dgm:effectClrLst/>
-    <dgm:txLinClrLst/>
-    <dgm:txFillClrLst/>
-    <dgm:txEffectClrLst/>
-  </dgm:styleLbl>
-  <dgm:styleLbl name="parChTrans2D4">
-    <dgm:fillClrLst meth="repeat">
-      <a:schemeClr val="accent5"/>
-    </dgm:fillClrLst>
-    <dgm:linClrLst meth="repeat">
-      <a:schemeClr val="lt1"/>
-    </dgm:linClrLst>
-    <dgm:effectClrLst/>
-    <dgm:txLinClrLst/>
-    <dgm:txFillClrLst meth="repeat">
-      <a:schemeClr val="lt1"/>
-    </dgm:txFillClrLst>
-    <dgm:txEffectClrLst/>
-  </dgm:styleLbl>
-  <dgm:styleLbl name="parChTrans1D1">
-    <dgm:fillClrLst meth="repeat">
-      <a:schemeClr val="accent2"/>
-    </dgm:fillClrLst>
-    <dgm:linClrLst meth="repeat">
-      <a:schemeClr val="accent2"/>
-    </dgm:linClrLst>
-    <dgm:effectClrLst/>
-    <dgm:txLinClrLst/>
-    <dgm:txFillClrLst meth="repeat">
-      <a:schemeClr val="tx1"/>
-    </dgm:txFillClrLst>
-    <dgm:txEffectClrLst/>
-  </dgm:styleLbl>
-  <dgm:styleLbl name="parChTrans1D2">
-    <dgm:fillClrLst meth="repeat">
-      <a:schemeClr val="accent2">
-        <a:tint val="90000"/>
-      </a:schemeClr>
-    </dgm:fillClrLst>
-    <dgm:linClrLst meth="repeat">
-      <a:schemeClr val="accent3"/>
-    </dgm:linClrLst>
-    <dgm:effectClrLst/>
-    <dgm:txLinClrLst/>
-    <dgm:txFillClrLst meth="repeat">
-      <a:schemeClr val="tx1"/>
-    </dgm:txFillClrLst>
-    <dgm:txEffectClrLst/>
-  </dgm:styleLbl>
-  <dgm:styleLbl name="parChTrans1D3">
-    <dgm:fillClrLst meth="repeat">
-      <a:schemeClr val="accent2">
-        <a:tint val="70000"/>
-      </a:schemeClr>
-    </dgm:fillClrLst>
-    <dgm:linClrLst meth="repeat">
-      <a:schemeClr val="accent4"/>
-    </dgm:linClrLst>
-    <dgm:effectClrLst/>
-    <dgm:txLinClrLst/>
-    <dgm:txFillClrLst meth="repeat">
-      <a:schemeClr val="tx1"/>
-    </dgm:txFillClrLst>
-    <dgm:txEffectClrLst/>
-  </dgm:styleLbl>
-  <dgm:styleLbl name="parChTrans1D4">
-    <dgm:fillClrLst meth="repeat">
-      <a:schemeClr val="accent2">
-        <a:tint val="50000"/>
-      </a:schemeClr>
-    </dgm:fillClrLst>
-    <dgm:linClrLst meth="repeat">
-      <a:schemeClr val="accent5"/>
-    </dgm:linClrLst>
-    <dgm:effectClrLst/>
-    <dgm:txLinClrLst/>
-    <dgm:txFillClrLst meth="repeat">
-      <a:schemeClr val="tx1"/>
-    </dgm:txFillClrLst>
-    <dgm:txEffectClrLst/>
-  </dgm:styleLbl>
-  <dgm:styleLbl name="fgAcc1">
-    <dgm:fillClrLst meth="repeat">
-      <a:schemeClr val="lt1">
-        <a:alpha val="90000"/>
-      </a:schemeClr>
-    </dgm:fillClrLst>
-    <dgm:linClrLst>
-      <a:schemeClr val="accent2"/>
-      <a:schemeClr val="accent3"/>
-    </dgm:linClrLst>
-    <dgm:effectClrLst/>
-    <dgm:txLinClrLst/>
-    <dgm:txFillClrLst meth="repeat">
-      <a:schemeClr val="dk1"/>
-    </dgm:txFillClrLst>
-    <dgm:txEffectClrLst/>
-  </dgm:styleLbl>
-  <dgm:styleLbl name="conFgAcc1">
-    <dgm:fillClrLst meth="repeat">
-      <a:schemeClr val="lt1">
-        <a:alpha val="90000"/>
-      </a:schemeClr>
-    </dgm:fillClrLst>
-    <dgm:linClrLst>
-      <a:schemeClr val="accent2"/>
-      <a:schemeClr val="accent3"/>
-    </dgm:linClrLst>
-    <dgm:effectClrLst/>
-    <dgm:txLinClrLst/>
-    <dgm:txFillClrLst meth="repeat">
-      <a:schemeClr val="dk1"/>
-    </dgm:txFillClrLst>
-    <dgm:txEffectClrLst/>
-  </dgm:styleLbl>
-  <dgm:styleLbl name="alignAcc1">
-    <dgm:fillClrLst meth="repeat">
-      <a:schemeClr val="lt1">
-        <a:alpha val="90000"/>
-      </a:schemeClr>
-    </dgm:fillClrLst>
-    <dgm:linClrLst>
-      <a:schemeClr val="accent2"/>
-      <a:schemeClr val="accent3"/>
-    </dgm:linClrLst>
-    <dgm:effectClrLst/>
-    <dgm:txLinClrLst/>
-    <dgm:txFillClrLst meth="repeat">
-      <a:schemeClr val="dk1"/>
-    </dgm:txFillClrLst>
-    <dgm:txEffectClrLst/>
-  </dgm:styleLbl>
-  <dgm:styleLbl name="trAlignAcc1">
-    <dgm:fillClrLst meth="repeat">
-      <a:schemeClr val="lt1">
-        <a:alpha val="40000"/>
-      </a:schemeClr>
-    </dgm:fillClrLst>
-    <dgm:linClrLst meth="repeat">
-      <a:schemeClr val="accent2"/>
-    </dgm:linClrLst>
-    <dgm:effectClrLst/>
-    <dgm:txLinClrLst/>
-    <dgm:txFillClrLst meth="repeat">
-      <a:schemeClr val="dk1"/>
-    </dgm:txFillClrLst>
-    <dgm:txEffectClrLst/>
-  </dgm:styleLbl>
-  <dgm:styleLbl name="bgAcc1">
-    <dgm:fillClrLst meth="repeat">
-      <a:schemeClr val="lt1">
-        <a:alpha val="90000"/>
-      </a:schemeClr>
-    </dgm:fillClrLst>
-    <dgm:linClrLst>
-      <a:schemeClr val="accent2"/>
-      <a:schemeClr val="accent3"/>
-    </dgm:linClrLst>
-    <dgm:effectClrLst/>
-    <dgm:txLinClrLst/>
-    <dgm:txFillClrLst meth="repeat">
-      <a:schemeClr val="dk1"/>
-    </dgm:txFillClrLst>
-    <dgm:txEffectClrLst/>
-  </dgm:styleLbl>
-  <dgm:styleLbl name="solidFgAcc1">
-    <dgm:fillClrLst meth="repeat">
-      <a:schemeClr val="lt1"/>
-    </dgm:fillClrLst>
-    <dgm:linClrLst>
-      <a:schemeClr val="accent2"/>
-      <a:schemeClr val="accent3"/>
-    </dgm:linClrLst>
-    <dgm:effectClrLst/>
-    <dgm:txLinClrLst/>
-    <dgm:txFillClrLst meth="repeat">
-      <a:schemeClr val="dk1"/>
-    </dgm:txFillClrLst>
-    <dgm:txEffectClrLst/>
-  </dgm:styleLbl>
-  <dgm:styleLbl name="solidAlignAcc1">
-    <dgm:fillClrLst meth="repeat">
-      <a:schemeClr val="lt1"/>
-    </dgm:fillClrLst>
-    <dgm:linClrLst>
-      <a:schemeClr val="accent2"/>
-      <a:schemeClr val="accent3"/>
-    </dgm:linClrLst>
-    <dgm:effectClrLst/>
-    <dgm:txLinClrLst/>
-    <dgm:txFillClrLst meth="repeat">
-      <a:schemeClr val="dk1"/>
-    </dgm:txFillClrLst>
-    <dgm:txEffectClrLst/>
-  </dgm:styleLbl>
-  <dgm:styleLbl name="solidBgAcc1">
-    <dgm:fillClrLst meth="repeat">
-      <a:schemeClr val="lt1"/>
-    </dgm:fillClrLst>
-    <dgm:linClrLst>
-      <a:schemeClr val="accent2"/>
-      <a:schemeClr val="accent3"/>
-    </dgm:linClrLst>
-    <dgm:effectClrLst/>
-    <dgm:txLinClrLst/>
-    <dgm:txFillClrLst meth="repeat">
-      <a:schemeClr val="dk1"/>
-    </dgm:txFillClrLst>
-    <dgm:txEffectClrLst/>
-  </dgm:styleLbl>
-  <dgm:styleLbl name="fgAccFollowNode1">
-    <dgm:fillClrLst>
-      <a:schemeClr val="accent2">
-        <a:tint val="40000"/>
-        <a:alpha val="90000"/>
-      </a:schemeClr>
-      <a:schemeClr val="accent3">
-        <a:tint val="40000"/>
-        <a:alpha val="90000"/>
-      </a:schemeClr>
-    </dgm:fillClrLst>
-    <dgm:linClrLst>
-      <a:schemeClr val="accent2">
-        <a:tint val="40000"/>
-        <a:alpha val="90000"/>
-      </a:schemeClr>
-      <a:schemeClr val="accent3">
-        <a:tint val="40000"/>
-        <a:alpha val="90000"/>
-      </a:schemeClr>
-    </dgm:linClrLst>
-    <dgm:effectClrLst/>
-    <dgm:txLinClrLst/>
-    <dgm:txFillClrLst meth="repeat">
-      <a:schemeClr val="dk1"/>
-    </dgm:txFillClrLst>
-    <dgm:txEffectClrLst/>
-  </dgm:styleLbl>
-  <dgm:styleLbl name="alignAccFollowNode1">
-    <dgm:fillClrLst>
-      <a:schemeClr val="accent2">
-        <a:tint val="40000"/>
-        <a:alpha val="90000"/>
-      </a:schemeClr>
-      <a:schemeClr val="accent3">
-        <a:tint val="40000"/>
-        <a:alpha val="90000"/>
-      </a:schemeClr>
-    </dgm:fillClrLst>
-    <dgm:linClrLst>
-      <a:schemeClr val="accent2">
-        <a:tint val="40000"/>
-        <a:alpha val="90000"/>
-      </a:schemeClr>
-      <a:schemeClr val="accent3">
-        <a:tint val="40000"/>
-        <a:alpha val="90000"/>
-      </a:schemeClr>
-    </dgm:linClrLst>
-    <dgm:effectClrLst/>
-    <dgm:txLinClrLst/>
-    <dgm:txFillClrLst meth="repeat">
-      <a:schemeClr val="dk1"/>
-    </dgm:txFillClrLst>
-    <dgm:txEffectClrLst/>
-  </dgm:styleLbl>
-  <dgm:styleLbl name="bgAccFollowNode1">
-    <dgm:fillClrLst>
-      <a:schemeClr val="accent2">
-        <a:tint val="40000"/>
-        <a:alpha val="90000"/>
-      </a:schemeClr>
-      <a:schemeClr val="accent3">
-        <a:tint val="40000"/>
-        <a:alpha val="90000"/>
-      </a:schemeClr>
-    </dgm:fillClrLst>
-    <dgm:linClrLst>
-      <a:schemeClr val="accent2">
-        <a:tint val="40000"/>
-        <a:alpha val="90000"/>
-      </a:schemeClr>
-      <a:schemeClr val="accent3">
-        <a:tint val="40000"/>
-        <a:alpha val="90000"/>
-      </a:schemeClr>
-    </dgm:linClrLst>
-    <dgm:effectClrLst/>
-    <dgm:txLinClrLst/>
-    <dgm:txFillClrLst meth="repeat">
-      <a:schemeClr val="dk1"/>
-    </dgm:txFillClrLst>
-    <dgm:txEffectClrLst/>
-  </dgm:styleLbl>
-  <dgm:styleLbl name="fgAcc0">
-    <dgm:fillClrLst meth="repeat">
-      <a:schemeClr val="lt1">
-        <a:alpha val="90000"/>
-      </a:schemeClr>
-    </dgm:fillClrLst>
-    <dgm:linClrLst>
-      <a:schemeClr val="accent1"/>
-    </dgm:linClrLst>
-    <dgm:effectClrLst/>
-    <dgm:txLinClrLst/>
-    <dgm:txFillClrLst meth="repeat">
-      <a:schemeClr val="dk1"/>
-    </dgm:txFillClrLst>
-    <dgm:txEffectClrLst/>
-  </dgm:styleLbl>
-  <dgm:styleLbl name="fgAcc2">
-    <dgm:fillClrLst meth="repeat">
-      <a:schemeClr val="lt1">
-        <a:alpha val="90000"/>
-      </a:schemeClr>
-    </dgm:fillClrLst>
-    <dgm:linClrLst>
-      <a:schemeClr val="accent3"/>
-    </dgm:linClrLst>
-    <dgm:effectClrLst/>
-    <dgm:txLinClrLst/>
-    <dgm:txFillClrLst meth="repeat">
-      <a:schemeClr val="dk1"/>
-    </dgm:txFillClrLst>
-    <dgm:txEffectClrLst/>
-  </dgm:styleLbl>
-  <dgm:styleLbl name="fgAcc3">
-    <dgm:fillClrLst meth="repeat">
-      <a:schemeClr val="lt1">
-        <a:alpha val="90000"/>
-      </a:schemeClr>
-    </dgm:fillClrLst>
-    <dgm:linClrLst>
-      <a:schemeClr val="accent4"/>
-    </dgm:linClrLst>
-    <dgm:effectClrLst/>
-    <dgm:txLinClrLst/>
-    <dgm:txFillClrLst meth="repeat">
-      <a:schemeClr val="dk1"/>
-    </dgm:txFillClrLst>
-    <dgm:txEffectClrLst/>
-  </dgm:styleLbl>
-  <dgm:styleLbl name="fgAcc4">
-    <dgm:fillClrLst meth="repeat">
-      <a:schemeClr val="lt1">
-        <a:alpha val="90000"/>
-      </a:schemeClr>
-    </dgm:fillClrLst>
-    <dgm:linClrLst>
-      <a:schemeClr val="accent5"/>
-    </dgm:linClrLst>
-    <dgm:effectClrLst/>
-    <dgm:txLinClrLst/>
-    <dgm:txFillClrLst meth="repeat">
-      <a:schemeClr val="dk1"/>
-    </dgm:txFillClrLst>
-    <dgm:txEffectClrLst/>
-  </dgm:styleLbl>
-  <dgm:styleLbl name="bgShp">
-    <dgm:fillClrLst meth="repeat">
-      <a:schemeClr val="accent2">
-        <a:tint val="40000"/>
-      </a:schemeClr>
-    </dgm:fillClrLst>
-    <dgm:linClrLst meth="repeat">
-      <a:schemeClr val="dk1"/>
-    </dgm:linClrLst>
-    <dgm:effectClrLst/>
-    <dgm:txLinClrLst/>
-    <dgm:txFillClrLst meth="repeat">
-      <a:schemeClr val="dk1"/>
-    </dgm:txFillClrLst>
-    <dgm:txEffectClrLst/>
-  </dgm:styleLbl>
-  <dgm:styleLbl name="dkBgShp">
-    <dgm:fillClrLst meth="repeat">
-      <a:schemeClr val="accent2">
-        <a:shade val="90000"/>
-      </a:schemeClr>
-    </dgm:fillClrLst>
-    <dgm:linClrLst meth="repeat">
-      <a:schemeClr val="dk1"/>
-    </dgm:linClrLst>
-    <dgm:effectClrLst/>
-    <dgm:txLinClrLst/>
-    <dgm:txFillClrLst meth="repeat">
-      <a:schemeClr val="lt1"/>
-    </dgm:txFillClrLst>
-    <dgm:txEffectClrLst/>
-  </dgm:styleLbl>
-  <dgm:styleLbl name="trBgShp">
-    <dgm:fillClrLst meth="repeat">
-      <a:schemeClr val="accent2">
-        <a:tint val="50000"/>
-        <a:alpha val="40000"/>
-      </a:schemeClr>
-    </dgm:fillClrLst>
-    <dgm:linClrLst meth="repeat">
-      <a:schemeClr val="accent2"/>
-    </dgm:linClrLst>
-    <dgm:effectClrLst/>
-    <dgm:txLinClrLst/>
-    <dgm:txFillClrLst meth="repeat">
-      <a:schemeClr val="lt1"/>
-    </dgm:txFillClrLst>
-    <dgm:txEffectClrLst/>
-  </dgm:styleLbl>
-  <dgm:styleLbl name="fgShp">
-    <dgm:fillClrLst meth="repeat">
-      <a:schemeClr val="accent2">
-        <a:tint val="40000"/>
-      </a:schemeClr>
-    </dgm:fillClrLst>
-    <dgm:linClrLst meth="repeat">
-      <a:schemeClr val="lt1"/>
-    </dgm:linClrLst>
-    <dgm:effectClrLst/>
-    <dgm:txLinClrLst/>
-    <dgm:txFillClrLst meth="repeat">
-      <a:schemeClr val="dk1"/>
-    </dgm:txFillClrLst>
-    <dgm:txEffectClrLst/>
-  </dgm:styleLbl>
-  <dgm:styleLbl name="revTx">
-    <dgm:fillClrLst meth="repeat">
-      <a:schemeClr val="lt1">
-        <a:alpha val="0"/>
-      </a:schemeClr>
-    </dgm:fillClrLst>
-    <dgm:linClrLst meth="repeat">
-      <a:schemeClr val="dk1">
-        <a:alpha val="0"/>
-      </a:schemeClr>
-    </dgm:linClrLst>
-    <dgm:effectClrLst/>
-    <dgm:txLinClrLst/>
-    <dgm:txFillClrLst meth="repeat">
-      <a:schemeClr val="tx1"/>
-    </dgm:txFillClrLst>
-    <dgm:txEffectClrLst/>
-  </dgm:styleLbl>
-</dgm:colorsDef>
-</file>
-
 <file path=ppt/diagrams/data1.xml><?xml version="1.0" encoding="utf-8"?>
 <dgm:dataModel xmlns:dgm="http://schemas.openxmlformats.org/drawingml/2006/diagram" xmlns:a="http://schemas.openxmlformats.org/drawingml/2006/main">
   <dgm:ptLst>
@@ -3085,372 +2301,8 @@
     <dgm:cxn modelId="{B8801F57-4A9F-407D-B9B6-276DC81CBB39}" srcId="{9C0E2CA4-744F-44C1-AF8D-32951179B3EC}" destId="{70001328-16F6-40B8-B034-8B63C6347611}" srcOrd="1" destOrd="0" parTransId="{E8C021ED-2D82-4837-8049-A14D44901631}" sibTransId="{C53E6838-5DA5-4754-B4E2-86D13141604E}"/>
     <dgm:cxn modelId="{AF635921-B396-40F9-BFC8-CA2383B28137}" srcId="{9C0E2CA4-744F-44C1-AF8D-32951179B3EC}" destId="{39F2B261-B7E6-41C9-9A03-BF7A18D5AE07}" srcOrd="3" destOrd="0" parTransId="{B54D6B98-B7EB-4771-8027-B788EBDD1E43}" sibTransId="{F758DE4A-AF8F-4642-9F20-0910D51B3749}"/>
     <dgm:cxn modelId="{588A68F6-CB04-4965-95A6-752E31735CBB}" type="presOf" srcId="{77573696-C6EB-461E-A870-6B1BC7BB5CD0}" destId="{5E965E1B-8117-417A-AF2C-EE3F901C2B1D}" srcOrd="0" destOrd="0" presId="urn:microsoft.com/office/officeart/2005/8/layout/cycle2"/>
+    <dgm:cxn modelId="{444F7BE8-7D19-4331-9506-8E2843F7D5C0}" type="presOf" srcId="{70001328-16F6-40B8-B034-8B63C6347611}" destId="{24EFD81F-AA69-44F2-83C2-806B40FDD526}" srcOrd="0" destOrd="0" presId="urn:microsoft.com/office/officeart/2005/8/layout/cycle2"/>
     <dgm:cxn modelId="{8F9ACBDB-8860-49E3-A094-6E2301D68EC6}" srcId="{9C0E2CA4-744F-44C1-AF8D-32951179B3EC}" destId="{77573696-C6EB-461E-A870-6B1BC7BB5CD0}" srcOrd="0" destOrd="0" parTransId="{A49FEBBF-9866-45F4-B78C-0731FB3BDF07}" sibTransId="{680A9B4A-9CA0-40AB-B4C2-BF29A3AD51C9}"/>
-    <dgm:cxn modelId="{444F7BE8-7D19-4331-9506-8E2843F7D5C0}" type="presOf" srcId="{70001328-16F6-40B8-B034-8B63C6347611}" destId="{24EFD81F-AA69-44F2-83C2-806B40FDD526}" srcOrd="0" destOrd="0" presId="urn:microsoft.com/office/officeart/2005/8/layout/cycle2"/>
-    <dgm:cxn modelId="{29BF8D4E-F746-4F70-A459-EAD46BBF6E06}" type="presOf" srcId="{680A9B4A-9CA0-40AB-B4C2-BF29A3AD51C9}" destId="{7B54B8A5-6606-4C3C-9500-31A30500CCD7}" srcOrd="1" destOrd="0" presId="urn:microsoft.com/office/officeart/2005/8/layout/cycle2"/>
-    <dgm:cxn modelId="{65127703-01AA-4425-BB14-B3CD3DFD3651}" type="presOf" srcId="{39F2B261-B7E6-41C9-9A03-BF7A18D5AE07}" destId="{015190AF-6814-4124-9780-D1FE7582EDA2}" srcOrd="0" destOrd="0" presId="urn:microsoft.com/office/officeart/2005/8/layout/cycle2"/>
-    <dgm:cxn modelId="{414FB5C9-CBC4-422C-BE77-631634FBFB4E}" type="presOf" srcId="{F758DE4A-AF8F-4642-9F20-0910D51B3749}" destId="{CD52FBA2-DB57-457F-BF9C-C215954791D2}" srcOrd="1" destOrd="0" presId="urn:microsoft.com/office/officeart/2005/8/layout/cycle2"/>
-    <dgm:cxn modelId="{42DE5CC3-82F8-4081-92C7-ABF2A64ED109}" type="presOf" srcId="{680A9B4A-9CA0-40AB-B4C2-BF29A3AD51C9}" destId="{0EB7CA57-BE36-4B74-B166-DB62B0C2EF0D}" srcOrd="0" destOrd="0" presId="urn:microsoft.com/office/officeart/2005/8/layout/cycle2"/>
-    <dgm:cxn modelId="{3E4F0A96-C334-477C-B52C-F2C8445FDAE7}" type="presOf" srcId="{C53E6838-5DA5-4754-B4E2-86D13141604E}" destId="{7CC276FD-6F19-4E05-B00B-85069AD9148E}" srcOrd="0" destOrd="0" presId="urn:microsoft.com/office/officeart/2005/8/layout/cycle2"/>
-    <dgm:cxn modelId="{8A104C9B-B492-4325-90FC-E66B0AAAC20A}" type="presOf" srcId="{5C5FCAE7-DD4A-440A-A309-08B507BDBE4D}" destId="{E74D0B9F-AA38-4716-BB64-90BE35523337}" srcOrd="0" destOrd="0" presId="urn:microsoft.com/office/officeart/2005/8/layout/cycle2"/>
-    <dgm:cxn modelId="{0CD136E1-7BE0-464C-BB7E-5C35997A1A28}" type="presOf" srcId="{5C5FCAE7-DD4A-440A-A309-08B507BDBE4D}" destId="{1284F3CF-717B-486C-9098-5C0FB28AEF94}" srcOrd="1" destOrd="0" presId="urn:microsoft.com/office/officeart/2005/8/layout/cycle2"/>
-    <dgm:cxn modelId="{56D189FD-2BFC-4AAC-9330-81727944FDD1}" type="presOf" srcId="{F758DE4A-AF8F-4642-9F20-0910D51B3749}" destId="{2E4547E8-5A26-4145-B8D5-9870E6925ED4}" srcOrd="0" destOrd="0" presId="urn:microsoft.com/office/officeart/2005/8/layout/cycle2"/>
-    <dgm:cxn modelId="{0B6EC18C-823B-4AF0-AD3F-31F3F9993358}" type="presParOf" srcId="{1CAC3338-C130-4861-AE7B-A69033E92718}" destId="{5E965E1B-8117-417A-AF2C-EE3F901C2B1D}" srcOrd="0" destOrd="0" presId="urn:microsoft.com/office/officeart/2005/8/layout/cycle2"/>
-    <dgm:cxn modelId="{54C2C981-0B3B-4BB6-BFC8-28D571303A4B}" type="presParOf" srcId="{1CAC3338-C130-4861-AE7B-A69033E92718}" destId="{0EB7CA57-BE36-4B74-B166-DB62B0C2EF0D}" srcOrd="1" destOrd="0" presId="urn:microsoft.com/office/officeart/2005/8/layout/cycle2"/>
-    <dgm:cxn modelId="{91B40722-0A31-4DE2-ADC0-DDE0756AEF21}" type="presParOf" srcId="{0EB7CA57-BE36-4B74-B166-DB62B0C2EF0D}" destId="{7B54B8A5-6606-4C3C-9500-31A30500CCD7}" srcOrd="0" destOrd="0" presId="urn:microsoft.com/office/officeart/2005/8/layout/cycle2"/>
-    <dgm:cxn modelId="{5B215928-6072-4966-9B89-D7EA2D3254F9}" type="presParOf" srcId="{1CAC3338-C130-4861-AE7B-A69033E92718}" destId="{24EFD81F-AA69-44F2-83C2-806B40FDD526}" srcOrd="2" destOrd="0" presId="urn:microsoft.com/office/officeart/2005/8/layout/cycle2"/>
-    <dgm:cxn modelId="{10871D6F-C936-49F4-AB6D-1C1018392582}" type="presParOf" srcId="{1CAC3338-C130-4861-AE7B-A69033E92718}" destId="{7CC276FD-6F19-4E05-B00B-85069AD9148E}" srcOrd="3" destOrd="0" presId="urn:microsoft.com/office/officeart/2005/8/layout/cycle2"/>
-    <dgm:cxn modelId="{853CFF67-9B61-4387-8491-FEF41DC6F6E8}" type="presParOf" srcId="{7CC276FD-6F19-4E05-B00B-85069AD9148E}" destId="{A167945A-F89D-4397-9D92-7EC3CFCB3A03}" srcOrd="0" destOrd="0" presId="urn:microsoft.com/office/officeart/2005/8/layout/cycle2"/>
-    <dgm:cxn modelId="{2A187968-3740-499C-8924-F05F81547CEE}" type="presParOf" srcId="{1CAC3338-C130-4861-AE7B-A69033E92718}" destId="{6CB6C22C-45D1-4921-B019-37E18F399A24}" srcOrd="4" destOrd="0" presId="urn:microsoft.com/office/officeart/2005/8/layout/cycle2"/>
-    <dgm:cxn modelId="{17057816-0A68-4030-ACF9-B9CB1CDEE5AD}" type="presParOf" srcId="{1CAC3338-C130-4861-AE7B-A69033E92718}" destId="{E74D0B9F-AA38-4716-BB64-90BE35523337}" srcOrd="5" destOrd="0" presId="urn:microsoft.com/office/officeart/2005/8/layout/cycle2"/>
-    <dgm:cxn modelId="{36A42048-FD0C-440E-B6B1-AB68AD037BA1}" type="presParOf" srcId="{E74D0B9F-AA38-4716-BB64-90BE35523337}" destId="{1284F3CF-717B-486C-9098-5C0FB28AEF94}" srcOrd="0" destOrd="0" presId="urn:microsoft.com/office/officeart/2005/8/layout/cycle2"/>
-    <dgm:cxn modelId="{289C7868-B179-44B6-B893-A47AFAAB6FCB}" type="presParOf" srcId="{1CAC3338-C130-4861-AE7B-A69033E92718}" destId="{015190AF-6814-4124-9780-D1FE7582EDA2}" srcOrd="6" destOrd="0" presId="urn:microsoft.com/office/officeart/2005/8/layout/cycle2"/>
-    <dgm:cxn modelId="{1FF68CE8-2B17-49DC-8AC9-1AE2E6BFBBB1}" type="presParOf" srcId="{1CAC3338-C130-4861-AE7B-A69033E92718}" destId="{2E4547E8-5A26-4145-B8D5-9870E6925ED4}" srcOrd="7" destOrd="0" presId="urn:microsoft.com/office/officeart/2005/8/layout/cycle2"/>
-    <dgm:cxn modelId="{314741C0-7585-4841-84D9-D441D1CAA300}" type="presParOf" srcId="{2E4547E8-5A26-4145-B8D5-9870E6925ED4}" destId="{CD52FBA2-DB57-457F-BF9C-C215954791D2}" srcOrd="0" destOrd="0" presId="urn:microsoft.com/office/officeart/2005/8/layout/cycle2"/>
-  </dgm:cxnLst>
-  <dgm:bg/>
-  <dgm:whole/>
-  <dgm:extLst>
-    <a:ext uri="http://schemas.microsoft.com/office/drawing/2008/diagram">
-      <dsp:dataModelExt xmlns:dsp="http://schemas.microsoft.com/office/drawing/2008/diagram" relId="rId6" minVer="http://schemas.openxmlformats.org/drawingml/2006/diagram"/>
-    </a:ext>
-  </dgm:extLst>
-</dgm:dataModel>
-</file>
-
-<file path=ppt/diagrams/data2.xml><?xml version="1.0" encoding="utf-8"?>
-<dgm:dataModel xmlns:dgm="http://schemas.openxmlformats.org/drawingml/2006/diagram" xmlns:a="http://schemas.openxmlformats.org/drawingml/2006/main">
-  <dgm:ptLst>
-    <dgm:pt modelId="{9C0E2CA4-744F-44C1-AF8D-32951179B3EC}" type="doc">
-      <dgm:prSet loTypeId="urn:microsoft.com/office/officeart/2005/8/layout/cycle2" loCatId="cycle" qsTypeId="urn:microsoft.com/office/officeart/2005/8/quickstyle/simple1" qsCatId="simple" csTypeId="urn:microsoft.com/office/officeart/2005/8/colors/colorful2" csCatId="colorful" phldr="1"/>
-      <dgm:spPr/>
-      <dgm:t>
-        <a:bodyPr/>
-        <a:lstStyle/>
-        <a:p>
-          <a:endParaRPr lang="en-US"/>
-        </a:p>
-      </dgm:t>
-    </dgm:pt>
-    <dgm:pt modelId="{77573696-C6EB-461E-A870-6B1BC7BB5CD0}">
-      <dgm:prSet phldrT="[Text]"/>
-      <dgm:spPr/>
-      <dgm:t>
-        <a:bodyPr/>
-        <a:lstStyle/>
-        <a:p>
-          <a:r>
-            <a:rPr lang="en-US" dirty="0"/>
-            <a:t>Code</a:t>
-          </a:r>
-        </a:p>
-      </dgm:t>
-    </dgm:pt>
-    <dgm:pt modelId="{A49FEBBF-9866-45F4-B78C-0731FB3BDF07}" type="parTrans" cxnId="{8F9ACBDB-8860-49E3-A094-6E2301D68EC6}">
-      <dgm:prSet/>
-      <dgm:spPr/>
-      <dgm:t>
-        <a:bodyPr/>
-        <a:lstStyle/>
-        <a:p>
-          <a:endParaRPr lang="en-US"/>
-        </a:p>
-      </dgm:t>
-    </dgm:pt>
-    <dgm:pt modelId="{680A9B4A-9CA0-40AB-B4C2-BF29A3AD51C9}" type="sibTrans" cxnId="{8F9ACBDB-8860-49E3-A094-6E2301D68EC6}">
-      <dgm:prSet/>
-      <dgm:spPr/>
-      <dgm:t>
-        <a:bodyPr/>
-        <a:lstStyle/>
-        <a:p>
-          <a:endParaRPr lang="en-US"/>
-        </a:p>
-      </dgm:t>
-    </dgm:pt>
-    <dgm:pt modelId="{39F2B261-B7E6-41C9-9A03-BF7A18D5AE07}">
-      <dgm:prSet phldrT="[Text]"/>
-      <dgm:spPr/>
-      <dgm:t>
-        <a:bodyPr/>
-        <a:lstStyle/>
-        <a:p>
-          <a:r>
-            <a:rPr lang="en-US" dirty="0"/>
-            <a:t>Debug</a:t>
-          </a:r>
-        </a:p>
-      </dgm:t>
-    </dgm:pt>
-    <dgm:pt modelId="{B54D6B98-B7EB-4771-8027-B788EBDD1E43}" type="parTrans" cxnId="{AF635921-B396-40F9-BFC8-CA2383B28137}">
-      <dgm:prSet/>
-      <dgm:spPr/>
-      <dgm:t>
-        <a:bodyPr/>
-        <a:lstStyle/>
-        <a:p>
-          <a:endParaRPr lang="en-US"/>
-        </a:p>
-      </dgm:t>
-    </dgm:pt>
-    <dgm:pt modelId="{F758DE4A-AF8F-4642-9F20-0910D51B3749}" type="sibTrans" cxnId="{AF635921-B396-40F9-BFC8-CA2383B28137}">
-      <dgm:prSet/>
-      <dgm:spPr/>
-      <dgm:t>
-        <a:bodyPr/>
-        <a:lstStyle/>
-        <a:p>
-          <a:endParaRPr lang="en-US"/>
-        </a:p>
-      </dgm:t>
-    </dgm:pt>
-    <dgm:pt modelId="{70001328-16F6-40B8-B034-8B63C6347611}">
-      <dgm:prSet phldrT="[Text]"/>
-      <dgm:spPr/>
-      <dgm:t>
-        <a:bodyPr/>
-        <a:lstStyle/>
-        <a:p>
-          <a:r>
-            <a:rPr lang="en-US" dirty="0"/>
-            <a:t>Run</a:t>
-          </a:r>
-        </a:p>
-      </dgm:t>
-    </dgm:pt>
-    <dgm:pt modelId="{E8C021ED-2D82-4837-8049-A14D44901631}" type="parTrans" cxnId="{B8801F57-4A9F-407D-B9B6-276DC81CBB39}">
-      <dgm:prSet/>
-      <dgm:spPr/>
-      <dgm:t>
-        <a:bodyPr/>
-        <a:lstStyle/>
-        <a:p>
-          <a:endParaRPr lang="en-US"/>
-        </a:p>
-      </dgm:t>
-    </dgm:pt>
-    <dgm:pt modelId="{C53E6838-5DA5-4754-B4E2-86D13141604E}" type="sibTrans" cxnId="{B8801F57-4A9F-407D-B9B6-276DC81CBB39}">
-      <dgm:prSet/>
-      <dgm:spPr/>
-      <dgm:t>
-        <a:bodyPr/>
-        <a:lstStyle/>
-        <a:p>
-          <a:endParaRPr lang="en-US"/>
-        </a:p>
-      </dgm:t>
-    </dgm:pt>
-    <dgm:pt modelId="{AD3E5398-E9E0-4E42-BCC9-D8820B90B1FB}">
-      <dgm:prSet phldrT="[Text]"/>
-      <dgm:spPr/>
-      <dgm:t>
-        <a:bodyPr/>
-        <a:lstStyle/>
-        <a:p>
-          <a:r>
-            <a:rPr lang="en-US" dirty="0"/>
-            <a:t>Validate</a:t>
-          </a:r>
-        </a:p>
-      </dgm:t>
-    </dgm:pt>
-    <dgm:pt modelId="{91E26694-5280-4F38-A99D-2323B823A62E}" type="parTrans" cxnId="{EC471369-68E0-44A4-85EC-EBB9CB2DE6D6}">
-      <dgm:prSet/>
-      <dgm:spPr/>
-      <dgm:t>
-        <a:bodyPr/>
-        <a:lstStyle/>
-        <a:p>
-          <a:endParaRPr lang="en-US"/>
-        </a:p>
-      </dgm:t>
-    </dgm:pt>
-    <dgm:pt modelId="{5C5FCAE7-DD4A-440A-A309-08B507BDBE4D}" type="sibTrans" cxnId="{EC471369-68E0-44A4-85EC-EBB9CB2DE6D6}">
-      <dgm:prSet/>
-      <dgm:spPr/>
-      <dgm:t>
-        <a:bodyPr/>
-        <a:lstStyle/>
-        <a:p>
-          <a:endParaRPr lang="en-US"/>
-        </a:p>
-      </dgm:t>
-    </dgm:pt>
-    <dgm:pt modelId="{1CAC3338-C130-4861-AE7B-A69033E92718}" type="pres">
-      <dgm:prSet presAssocID="{9C0E2CA4-744F-44C1-AF8D-32951179B3EC}" presName="cycle" presStyleCnt="0">
-        <dgm:presLayoutVars>
-          <dgm:dir/>
-          <dgm:resizeHandles val="exact"/>
-        </dgm:presLayoutVars>
-      </dgm:prSet>
-      <dgm:spPr/>
-      <dgm:t>
-        <a:bodyPr/>
-        <a:lstStyle/>
-        <a:p>
-          <a:endParaRPr lang="en-US"/>
-        </a:p>
-      </dgm:t>
-    </dgm:pt>
-    <dgm:pt modelId="{5E965E1B-8117-417A-AF2C-EE3F901C2B1D}" type="pres">
-      <dgm:prSet presAssocID="{77573696-C6EB-461E-A870-6B1BC7BB5CD0}" presName="node" presStyleLbl="node1" presStyleIdx="0" presStyleCnt="4">
-        <dgm:presLayoutVars>
-          <dgm:bulletEnabled val="1"/>
-        </dgm:presLayoutVars>
-      </dgm:prSet>
-      <dgm:spPr/>
-      <dgm:t>
-        <a:bodyPr/>
-        <a:lstStyle/>
-        <a:p>
-          <a:endParaRPr lang="en-US"/>
-        </a:p>
-      </dgm:t>
-    </dgm:pt>
-    <dgm:pt modelId="{0EB7CA57-BE36-4B74-B166-DB62B0C2EF0D}" type="pres">
-      <dgm:prSet presAssocID="{680A9B4A-9CA0-40AB-B4C2-BF29A3AD51C9}" presName="sibTrans" presStyleLbl="sibTrans2D1" presStyleIdx="0" presStyleCnt="4"/>
-      <dgm:spPr/>
-      <dgm:t>
-        <a:bodyPr/>
-        <a:lstStyle/>
-        <a:p>
-          <a:endParaRPr lang="en-US"/>
-        </a:p>
-      </dgm:t>
-    </dgm:pt>
-    <dgm:pt modelId="{7B54B8A5-6606-4C3C-9500-31A30500CCD7}" type="pres">
-      <dgm:prSet presAssocID="{680A9B4A-9CA0-40AB-B4C2-BF29A3AD51C9}" presName="connectorText" presStyleLbl="sibTrans2D1" presStyleIdx="0" presStyleCnt="4"/>
-      <dgm:spPr/>
-      <dgm:t>
-        <a:bodyPr/>
-        <a:lstStyle/>
-        <a:p>
-          <a:endParaRPr lang="en-US"/>
-        </a:p>
-      </dgm:t>
-    </dgm:pt>
-    <dgm:pt modelId="{24EFD81F-AA69-44F2-83C2-806B40FDD526}" type="pres">
-      <dgm:prSet presAssocID="{70001328-16F6-40B8-B034-8B63C6347611}" presName="node" presStyleLbl="node1" presStyleIdx="1" presStyleCnt="4">
-        <dgm:presLayoutVars>
-          <dgm:bulletEnabled val="1"/>
-        </dgm:presLayoutVars>
-      </dgm:prSet>
-      <dgm:spPr/>
-      <dgm:t>
-        <a:bodyPr/>
-        <a:lstStyle/>
-        <a:p>
-          <a:endParaRPr lang="en-US"/>
-        </a:p>
-      </dgm:t>
-    </dgm:pt>
-    <dgm:pt modelId="{7CC276FD-6F19-4E05-B00B-85069AD9148E}" type="pres">
-      <dgm:prSet presAssocID="{C53E6838-5DA5-4754-B4E2-86D13141604E}" presName="sibTrans" presStyleLbl="sibTrans2D1" presStyleIdx="1" presStyleCnt="4"/>
-      <dgm:spPr/>
-      <dgm:t>
-        <a:bodyPr/>
-        <a:lstStyle/>
-        <a:p>
-          <a:endParaRPr lang="en-US"/>
-        </a:p>
-      </dgm:t>
-    </dgm:pt>
-    <dgm:pt modelId="{A167945A-F89D-4397-9D92-7EC3CFCB3A03}" type="pres">
-      <dgm:prSet presAssocID="{C53E6838-5DA5-4754-B4E2-86D13141604E}" presName="connectorText" presStyleLbl="sibTrans2D1" presStyleIdx="1" presStyleCnt="4"/>
-      <dgm:spPr/>
-      <dgm:t>
-        <a:bodyPr/>
-        <a:lstStyle/>
-        <a:p>
-          <a:endParaRPr lang="en-US"/>
-        </a:p>
-      </dgm:t>
-    </dgm:pt>
-    <dgm:pt modelId="{6CB6C22C-45D1-4921-B019-37E18F399A24}" type="pres">
-      <dgm:prSet presAssocID="{AD3E5398-E9E0-4E42-BCC9-D8820B90B1FB}" presName="node" presStyleLbl="node1" presStyleIdx="2" presStyleCnt="4">
-        <dgm:presLayoutVars>
-          <dgm:bulletEnabled val="1"/>
-        </dgm:presLayoutVars>
-      </dgm:prSet>
-      <dgm:spPr/>
-      <dgm:t>
-        <a:bodyPr/>
-        <a:lstStyle/>
-        <a:p>
-          <a:endParaRPr lang="en-US"/>
-        </a:p>
-      </dgm:t>
-    </dgm:pt>
-    <dgm:pt modelId="{E74D0B9F-AA38-4716-BB64-90BE35523337}" type="pres">
-      <dgm:prSet presAssocID="{5C5FCAE7-DD4A-440A-A309-08B507BDBE4D}" presName="sibTrans" presStyleLbl="sibTrans2D1" presStyleIdx="2" presStyleCnt="4"/>
-      <dgm:spPr/>
-      <dgm:t>
-        <a:bodyPr/>
-        <a:lstStyle/>
-        <a:p>
-          <a:endParaRPr lang="en-US"/>
-        </a:p>
-      </dgm:t>
-    </dgm:pt>
-    <dgm:pt modelId="{1284F3CF-717B-486C-9098-5C0FB28AEF94}" type="pres">
-      <dgm:prSet presAssocID="{5C5FCAE7-DD4A-440A-A309-08B507BDBE4D}" presName="connectorText" presStyleLbl="sibTrans2D1" presStyleIdx="2" presStyleCnt="4"/>
-      <dgm:spPr/>
-      <dgm:t>
-        <a:bodyPr/>
-        <a:lstStyle/>
-        <a:p>
-          <a:endParaRPr lang="en-US"/>
-        </a:p>
-      </dgm:t>
-    </dgm:pt>
-    <dgm:pt modelId="{015190AF-6814-4124-9780-D1FE7582EDA2}" type="pres">
-      <dgm:prSet presAssocID="{39F2B261-B7E6-41C9-9A03-BF7A18D5AE07}" presName="node" presStyleLbl="node1" presStyleIdx="3" presStyleCnt="4">
-        <dgm:presLayoutVars>
-          <dgm:bulletEnabled val="1"/>
-        </dgm:presLayoutVars>
-      </dgm:prSet>
-      <dgm:spPr/>
-      <dgm:t>
-        <a:bodyPr/>
-        <a:lstStyle/>
-        <a:p>
-          <a:endParaRPr lang="en-US"/>
-        </a:p>
-      </dgm:t>
-    </dgm:pt>
-    <dgm:pt modelId="{2E4547E8-5A26-4145-B8D5-9870E6925ED4}" type="pres">
-      <dgm:prSet presAssocID="{F758DE4A-AF8F-4642-9F20-0910D51B3749}" presName="sibTrans" presStyleLbl="sibTrans2D1" presStyleIdx="3" presStyleCnt="4"/>
-      <dgm:spPr/>
-      <dgm:t>
-        <a:bodyPr/>
-        <a:lstStyle/>
-        <a:p>
-          <a:endParaRPr lang="en-US"/>
-        </a:p>
-      </dgm:t>
-    </dgm:pt>
-    <dgm:pt modelId="{CD52FBA2-DB57-457F-BF9C-C215954791D2}" type="pres">
-      <dgm:prSet presAssocID="{F758DE4A-AF8F-4642-9F20-0910D51B3749}" presName="connectorText" presStyleLbl="sibTrans2D1" presStyleIdx="3" presStyleCnt="4"/>
-      <dgm:spPr/>
-      <dgm:t>
-        <a:bodyPr/>
-        <a:lstStyle/>
-        <a:p>
-          <a:endParaRPr lang="en-US"/>
-        </a:p>
-      </dgm:t>
-    </dgm:pt>
-  </dgm:ptLst>
-  <dgm:cxnLst>
-    <dgm:cxn modelId="{523E40C3-BAAE-4BDB-B0A6-5B8F9CB17151}" type="presOf" srcId="{9C0E2CA4-744F-44C1-AF8D-32951179B3EC}" destId="{1CAC3338-C130-4861-AE7B-A69033E92718}" srcOrd="0" destOrd="0" presId="urn:microsoft.com/office/officeart/2005/8/layout/cycle2"/>
-    <dgm:cxn modelId="{FDE76C4B-05A4-4779-8429-1169B103A25D}" type="presOf" srcId="{AD3E5398-E9E0-4E42-BCC9-D8820B90B1FB}" destId="{6CB6C22C-45D1-4921-B019-37E18F399A24}" srcOrd="0" destOrd="0" presId="urn:microsoft.com/office/officeart/2005/8/layout/cycle2"/>
-    <dgm:cxn modelId="{34F07AE0-2D54-4FFB-8A83-0071D8CC6E3D}" type="presOf" srcId="{C53E6838-5DA5-4754-B4E2-86D13141604E}" destId="{A167945A-F89D-4397-9D92-7EC3CFCB3A03}" srcOrd="1" destOrd="0" presId="urn:microsoft.com/office/officeart/2005/8/layout/cycle2"/>
-    <dgm:cxn modelId="{EC471369-68E0-44A4-85EC-EBB9CB2DE6D6}" srcId="{9C0E2CA4-744F-44C1-AF8D-32951179B3EC}" destId="{AD3E5398-E9E0-4E42-BCC9-D8820B90B1FB}" srcOrd="2" destOrd="0" parTransId="{91E26694-5280-4F38-A99D-2323B823A62E}" sibTransId="{5C5FCAE7-DD4A-440A-A309-08B507BDBE4D}"/>
-    <dgm:cxn modelId="{B8801F57-4A9F-407D-B9B6-276DC81CBB39}" srcId="{9C0E2CA4-744F-44C1-AF8D-32951179B3EC}" destId="{70001328-16F6-40B8-B034-8B63C6347611}" srcOrd="1" destOrd="0" parTransId="{E8C021ED-2D82-4837-8049-A14D44901631}" sibTransId="{C53E6838-5DA5-4754-B4E2-86D13141604E}"/>
-    <dgm:cxn modelId="{AF635921-B396-40F9-BFC8-CA2383B28137}" srcId="{9C0E2CA4-744F-44C1-AF8D-32951179B3EC}" destId="{39F2B261-B7E6-41C9-9A03-BF7A18D5AE07}" srcOrd="3" destOrd="0" parTransId="{B54D6B98-B7EB-4771-8027-B788EBDD1E43}" sibTransId="{F758DE4A-AF8F-4642-9F20-0910D51B3749}"/>
-    <dgm:cxn modelId="{588A68F6-CB04-4965-95A6-752E31735CBB}" type="presOf" srcId="{77573696-C6EB-461E-A870-6B1BC7BB5CD0}" destId="{5E965E1B-8117-417A-AF2C-EE3F901C2B1D}" srcOrd="0" destOrd="0" presId="urn:microsoft.com/office/officeart/2005/8/layout/cycle2"/>
-    <dgm:cxn modelId="{8F9ACBDB-8860-49E3-A094-6E2301D68EC6}" srcId="{9C0E2CA4-744F-44C1-AF8D-32951179B3EC}" destId="{77573696-C6EB-461E-A870-6B1BC7BB5CD0}" srcOrd="0" destOrd="0" parTransId="{A49FEBBF-9866-45F4-B78C-0731FB3BDF07}" sibTransId="{680A9B4A-9CA0-40AB-B4C2-BF29A3AD51C9}"/>
-    <dgm:cxn modelId="{444F7BE8-7D19-4331-9506-8E2843F7D5C0}" type="presOf" srcId="{70001328-16F6-40B8-B034-8B63C6347611}" destId="{24EFD81F-AA69-44F2-83C2-806B40FDD526}" srcOrd="0" destOrd="0" presId="urn:microsoft.com/office/officeart/2005/8/layout/cycle2"/>
     <dgm:cxn modelId="{29BF8D4E-F746-4F70-A459-EAD46BBF6E06}" type="presOf" srcId="{680A9B4A-9CA0-40AB-B4C2-BF29A3AD51C9}" destId="{7B54B8A5-6606-4C3C-9500-31A30500CCD7}" srcOrd="1" destOrd="0" presId="urn:microsoft.com/office/officeart/2005/8/layout/cycle2"/>
     <dgm:cxn modelId="{65127703-01AA-4425-BB14-B3CD3DFD3651}" type="presOf" srcId="{39F2B261-B7E6-41C9-9A03-BF7A18D5AE07}" destId="{015190AF-6814-4124-9780-D1FE7582EDA2}" srcOrd="0" destOrd="0" presId="urn:microsoft.com/office/officeart/2005/8/layout/cycle2"/>
     <dgm:cxn modelId="{414FB5C9-CBC4-422C-BE77-631634FBFB4E}" type="presOf" srcId="{F758DE4A-AF8F-4642-9F20-0910D51B3749}" destId="{CD52FBA2-DB57-457F-BF9C-C215954791D2}" srcOrd="1" destOrd="0" presId="urn:microsoft.com/office/officeart/2005/8/layout/cycle2"/>
@@ -3497,600 +2349,8 @@
       </dsp:nvSpPr>
       <dsp:spPr>
         <a:xfrm>
-          <a:off x="4562065" y="1117"/>
-          <a:ext cx="1391468" cy="1391468"/>
-        </a:xfrm>
-        <a:prstGeom prst="ellipse">
-          <a:avLst/>
-        </a:prstGeom>
-        <a:solidFill>
-          <a:schemeClr val="accent2">
-            <a:hueOff val="0"/>
-            <a:satOff val="0"/>
-            <a:lumOff val="0"/>
-            <a:alphaOff val="0"/>
-          </a:schemeClr>
-        </a:solidFill>
-        <a:ln w="12700" cap="flat" cmpd="sng" algn="ctr">
-          <a:solidFill>
-            <a:schemeClr val="lt1">
-              <a:hueOff val="0"/>
-              <a:satOff val="0"/>
-              <a:lumOff val="0"/>
-              <a:alphaOff val="0"/>
-            </a:schemeClr>
-          </a:solidFill>
-          <a:prstDash val="solid"/>
-          <a:miter lim="800000"/>
-        </a:ln>
-        <a:effectLst/>
-      </dsp:spPr>
-      <dsp:style>
-        <a:lnRef idx="2">
-          <a:scrgbClr r="0" g="0" b="0"/>
-        </a:lnRef>
-        <a:fillRef idx="1">
-          <a:scrgbClr r="0" g="0" b="0"/>
-        </a:fillRef>
-        <a:effectRef idx="0">
-          <a:scrgbClr r="0" g="0" b="0"/>
-        </a:effectRef>
-        <a:fontRef idx="minor">
-          <a:schemeClr val="lt1"/>
-        </a:fontRef>
-      </dsp:style>
-      <dsp:txBody>
-        <a:bodyPr spcFirstLastPara="0" vert="horz" wrap="square" lIns="27940" tIns="27940" rIns="27940" bIns="27940" numCol="1" spcCol="1270" anchor="ctr" anchorCtr="0">
-          <a:noAutofit/>
-        </a:bodyPr>
-        <a:lstStyle/>
-        <a:p>
-          <a:pPr lvl="0" algn="ctr" defTabSz="977900">
-            <a:lnSpc>
-              <a:spcPct val="90000"/>
-            </a:lnSpc>
-            <a:spcBef>
-              <a:spcPct val="0"/>
-            </a:spcBef>
-            <a:spcAft>
-              <a:spcPct val="35000"/>
-            </a:spcAft>
-          </a:pPr>
-          <a:r>
-            <a:rPr lang="en-US" sz="2200" kern="1200" dirty="0"/>
-            <a:t>Code</a:t>
-          </a:r>
-        </a:p>
-      </dsp:txBody>
-      <dsp:txXfrm>
-        <a:off x="4765841" y="204893"/>
-        <a:ext cx="983916" cy="983916"/>
-      </dsp:txXfrm>
-    </dsp:sp>
-    <dsp:sp modelId="{0EB7CA57-BE36-4B74-B166-DB62B0C2EF0D}">
-      <dsp:nvSpPr>
-        <dsp:cNvPr id="0" name=""/>
-        <dsp:cNvSpPr/>
-      </dsp:nvSpPr>
-      <dsp:spPr>
-        <a:xfrm rot="2700000">
-          <a:off x="5804312" y="1194026"/>
-          <a:ext cx="370944" cy="469620"/>
-        </a:xfrm>
-        <a:prstGeom prst="rightArrow">
-          <a:avLst>
-            <a:gd name="adj1" fmla="val 60000"/>
-            <a:gd name="adj2" fmla="val 50000"/>
-          </a:avLst>
-        </a:prstGeom>
-        <a:solidFill>
-          <a:schemeClr val="accent2">
-            <a:hueOff val="0"/>
-            <a:satOff val="0"/>
-            <a:lumOff val="0"/>
-            <a:alphaOff val="0"/>
-          </a:schemeClr>
-        </a:solidFill>
-        <a:ln>
-          <a:noFill/>
-        </a:ln>
-        <a:effectLst/>
-      </dsp:spPr>
-      <dsp:style>
-        <a:lnRef idx="0">
-          <a:scrgbClr r="0" g="0" b="0"/>
-        </a:lnRef>
-        <a:fillRef idx="1">
-          <a:scrgbClr r="0" g="0" b="0"/>
-        </a:fillRef>
-        <a:effectRef idx="0">
-          <a:scrgbClr r="0" g="0" b="0"/>
-        </a:effectRef>
-        <a:fontRef idx="minor">
-          <a:schemeClr val="lt1"/>
-        </a:fontRef>
-      </dsp:style>
-      <dsp:txBody>
-        <a:bodyPr spcFirstLastPara="0" vert="horz" wrap="square" lIns="0" tIns="0" rIns="0" bIns="0" numCol="1" spcCol="1270" anchor="ctr" anchorCtr="0">
-          <a:noAutofit/>
-        </a:bodyPr>
-        <a:lstStyle/>
-        <a:p>
-          <a:pPr lvl="0" algn="ctr" defTabSz="755650">
-            <a:lnSpc>
-              <a:spcPct val="90000"/>
-            </a:lnSpc>
-            <a:spcBef>
-              <a:spcPct val="0"/>
-            </a:spcBef>
-            <a:spcAft>
-              <a:spcPct val="35000"/>
-            </a:spcAft>
-          </a:pPr>
-          <a:endParaRPr lang="en-US" sz="1700" kern="1200"/>
-        </a:p>
-      </dsp:txBody>
-      <dsp:txXfrm>
-        <a:off x="5820609" y="1248606"/>
-        <a:ext cx="259661" cy="281772"/>
-      </dsp:txXfrm>
-    </dsp:sp>
-    <dsp:sp modelId="{24EFD81F-AA69-44F2-83C2-806B40FDD526}">
-      <dsp:nvSpPr>
-        <dsp:cNvPr id="0" name=""/>
-        <dsp:cNvSpPr/>
-      </dsp:nvSpPr>
-      <dsp:spPr>
-        <a:xfrm>
-          <a:off x="6040882" y="1479934"/>
-          <a:ext cx="1391468" cy="1391468"/>
-        </a:xfrm>
-        <a:prstGeom prst="ellipse">
-          <a:avLst/>
-        </a:prstGeom>
-        <a:solidFill>
-          <a:schemeClr val="accent2">
-            <a:hueOff val="-485121"/>
-            <a:satOff val="-27976"/>
-            <a:lumOff val="2876"/>
-            <a:alphaOff val="0"/>
-          </a:schemeClr>
-        </a:solidFill>
-        <a:ln w="12700" cap="flat" cmpd="sng" algn="ctr">
-          <a:solidFill>
-            <a:schemeClr val="lt1">
-              <a:hueOff val="0"/>
-              <a:satOff val="0"/>
-              <a:lumOff val="0"/>
-              <a:alphaOff val="0"/>
-            </a:schemeClr>
-          </a:solidFill>
-          <a:prstDash val="solid"/>
-          <a:miter lim="800000"/>
-        </a:ln>
-        <a:effectLst/>
-      </dsp:spPr>
-      <dsp:style>
-        <a:lnRef idx="2">
-          <a:scrgbClr r="0" g="0" b="0"/>
-        </a:lnRef>
-        <a:fillRef idx="1">
-          <a:scrgbClr r="0" g="0" b="0"/>
-        </a:fillRef>
-        <a:effectRef idx="0">
-          <a:scrgbClr r="0" g="0" b="0"/>
-        </a:effectRef>
-        <a:fontRef idx="minor">
-          <a:schemeClr val="lt1"/>
-        </a:fontRef>
-      </dsp:style>
-      <dsp:txBody>
-        <a:bodyPr spcFirstLastPara="0" vert="horz" wrap="square" lIns="27940" tIns="27940" rIns="27940" bIns="27940" numCol="1" spcCol="1270" anchor="ctr" anchorCtr="0">
-          <a:noAutofit/>
-        </a:bodyPr>
-        <a:lstStyle/>
-        <a:p>
-          <a:pPr lvl="0" algn="ctr" defTabSz="977900">
-            <a:lnSpc>
-              <a:spcPct val="90000"/>
-            </a:lnSpc>
-            <a:spcBef>
-              <a:spcPct val="0"/>
-            </a:spcBef>
-            <a:spcAft>
-              <a:spcPct val="35000"/>
-            </a:spcAft>
-          </a:pPr>
-          <a:r>
-            <a:rPr lang="en-US" sz="2200" kern="1200" dirty="0"/>
-            <a:t>Run</a:t>
-          </a:r>
-        </a:p>
-      </dsp:txBody>
-      <dsp:txXfrm>
-        <a:off x="6244658" y="1683710"/>
-        <a:ext cx="983916" cy="983916"/>
-      </dsp:txXfrm>
-    </dsp:sp>
-    <dsp:sp modelId="{7CC276FD-6F19-4E05-B00B-85069AD9148E}">
-      <dsp:nvSpPr>
-        <dsp:cNvPr id="0" name=""/>
-        <dsp:cNvSpPr/>
-      </dsp:nvSpPr>
-      <dsp:spPr>
-        <a:xfrm rot="8100000">
-          <a:off x="5819159" y="2672843"/>
-          <a:ext cx="370944" cy="469620"/>
-        </a:xfrm>
-        <a:prstGeom prst="rightArrow">
-          <a:avLst>
-            <a:gd name="adj1" fmla="val 60000"/>
-            <a:gd name="adj2" fmla="val 50000"/>
-          </a:avLst>
-        </a:prstGeom>
-        <a:solidFill>
-          <a:schemeClr val="accent2">
-            <a:hueOff val="-485121"/>
-            <a:satOff val="-27976"/>
-            <a:lumOff val="2876"/>
-            <a:alphaOff val="0"/>
-          </a:schemeClr>
-        </a:solidFill>
-        <a:ln>
-          <a:noFill/>
-        </a:ln>
-        <a:effectLst/>
-      </dsp:spPr>
-      <dsp:style>
-        <a:lnRef idx="0">
-          <a:scrgbClr r="0" g="0" b="0"/>
-        </a:lnRef>
-        <a:fillRef idx="1">
-          <a:scrgbClr r="0" g="0" b="0"/>
-        </a:fillRef>
-        <a:effectRef idx="0">
-          <a:scrgbClr r="0" g="0" b="0"/>
-        </a:effectRef>
-        <a:fontRef idx="minor">
-          <a:schemeClr val="lt1"/>
-        </a:fontRef>
-      </dsp:style>
-      <dsp:txBody>
-        <a:bodyPr spcFirstLastPara="0" vert="horz" wrap="square" lIns="0" tIns="0" rIns="0" bIns="0" numCol="1" spcCol="1270" anchor="ctr" anchorCtr="0">
-          <a:noAutofit/>
-        </a:bodyPr>
-        <a:lstStyle/>
-        <a:p>
-          <a:pPr lvl="0" algn="ctr" defTabSz="755650">
-            <a:lnSpc>
-              <a:spcPct val="90000"/>
-            </a:lnSpc>
-            <a:spcBef>
-              <a:spcPct val="0"/>
-            </a:spcBef>
-            <a:spcAft>
-              <a:spcPct val="35000"/>
-            </a:spcAft>
-          </a:pPr>
-          <a:endParaRPr lang="en-US" sz="1700" kern="1200"/>
-        </a:p>
-      </dsp:txBody>
-      <dsp:txXfrm rot="10800000">
-        <a:off x="5914145" y="2727423"/>
-        <a:ext cx="259661" cy="281772"/>
-      </dsp:txXfrm>
-    </dsp:sp>
-    <dsp:sp modelId="{6CB6C22C-45D1-4921-B019-37E18F399A24}">
-      <dsp:nvSpPr>
-        <dsp:cNvPr id="0" name=""/>
-        <dsp:cNvSpPr/>
-      </dsp:nvSpPr>
-      <dsp:spPr>
-        <a:xfrm>
-          <a:off x="4562065" y="2958751"/>
-          <a:ext cx="1391468" cy="1391468"/>
-        </a:xfrm>
-        <a:prstGeom prst="ellipse">
-          <a:avLst/>
-        </a:prstGeom>
-        <a:solidFill>
-          <a:schemeClr val="accent2">
-            <a:hueOff val="-970242"/>
-            <a:satOff val="-55952"/>
-            <a:lumOff val="5752"/>
-            <a:alphaOff val="0"/>
-          </a:schemeClr>
-        </a:solidFill>
-        <a:ln w="12700" cap="flat" cmpd="sng" algn="ctr">
-          <a:solidFill>
-            <a:schemeClr val="lt1">
-              <a:hueOff val="0"/>
-              <a:satOff val="0"/>
-              <a:lumOff val="0"/>
-              <a:alphaOff val="0"/>
-            </a:schemeClr>
-          </a:solidFill>
-          <a:prstDash val="solid"/>
-          <a:miter lim="800000"/>
-        </a:ln>
-        <a:effectLst/>
-      </dsp:spPr>
-      <dsp:style>
-        <a:lnRef idx="2">
-          <a:scrgbClr r="0" g="0" b="0"/>
-        </a:lnRef>
-        <a:fillRef idx="1">
-          <a:scrgbClr r="0" g="0" b="0"/>
-        </a:fillRef>
-        <a:effectRef idx="0">
-          <a:scrgbClr r="0" g="0" b="0"/>
-        </a:effectRef>
-        <a:fontRef idx="minor">
-          <a:schemeClr val="lt1"/>
-        </a:fontRef>
-      </dsp:style>
-      <dsp:txBody>
-        <a:bodyPr spcFirstLastPara="0" vert="horz" wrap="square" lIns="27940" tIns="27940" rIns="27940" bIns="27940" numCol="1" spcCol="1270" anchor="ctr" anchorCtr="0">
-          <a:noAutofit/>
-        </a:bodyPr>
-        <a:lstStyle/>
-        <a:p>
-          <a:pPr lvl="0" algn="ctr" defTabSz="977900">
-            <a:lnSpc>
-              <a:spcPct val="90000"/>
-            </a:lnSpc>
-            <a:spcBef>
-              <a:spcPct val="0"/>
-            </a:spcBef>
-            <a:spcAft>
-              <a:spcPct val="35000"/>
-            </a:spcAft>
-          </a:pPr>
-          <a:r>
-            <a:rPr lang="en-US" sz="2200" kern="1200" dirty="0"/>
-            <a:t>Validate</a:t>
-          </a:r>
-        </a:p>
-      </dsp:txBody>
-      <dsp:txXfrm>
-        <a:off x="4765841" y="3162527"/>
-        <a:ext cx="983916" cy="983916"/>
-      </dsp:txXfrm>
-    </dsp:sp>
-    <dsp:sp modelId="{E74D0B9F-AA38-4716-BB64-90BE35523337}">
-      <dsp:nvSpPr>
-        <dsp:cNvPr id="0" name=""/>
-        <dsp:cNvSpPr/>
-      </dsp:nvSpPr>
-      <dsp:spPr>
-        <a:xfrm rot="13500000">
-          <a:off x="4340342" y="2687690"/>
-          <a:ext cx="370944" cy="469620"/>
-        </a:xfrm>
-        <a:prstGeom prst="rightArrow">
-          <a:avLst>
-            <a:gd name="adj1" fmla="val 60000"/>
-            <a:gd name="adj2" fmla="val 50000"/>
-          </a:avLst>
-        </a:prstGeom>
-        <a:solidFill>
-          <a:schemeClr val="accent2">
-            <a:hueOff val="-970242"/>
-            <a:satOff val="-55952"/>
-            <a:lumOff val="5752"/>
-            <a:alphaOff val="0"/>
-          </a:schemeClr>
-        </a:solidFill>
-        <a:ln>
-          <a:noFill/>
-        </a:ln>
-        <a:effectLst/>
-      </dsp:spPr>
-      <dsp:style>
-        <a:lnRef idx="0">
-          <a:scrgbClr r="0" g="0" b="0"/>
-        </a:lnRef>
-        <a:fillRef idx="1">
-          <a:scrgbClr r="0" g="0" b="0"/>
-        </a:fillRef>
-        <a:effectRef idx="0">
-          <a:scrgbClr r="0" g="0" b="0"/>
-        </a:effectRef>
-        <a:fontRef idx="minor">
-          <a:schemeClr val="lt1"/>
-        </a:fontRef>
-      </dsp:style>
-      <dsp:txBody>
-        <a:bodyPr spcFirstLastPara="0" vert="horz" wrap="square" lIns="0" tIns="0" rIns="0" bIns="0" numCol="1" spcCol="1270" anchor="ctr" anchorCtr="0">
-          <a:noAutofit/>
-        </a:bodyPr>
-        <a:lstStyle/>
-        <a:p>
-          <a:pPr lvl="0" algn="ctr" defTabSz="755650">
-            <a:lnSpc>
-              <a:spcPct val="90000"/>
-            </a:lnSpc>
-            <a:spcBef>
-              <a:spcPct val="0"/>
-            </a:spcBef>
-            <a:spcAft>
-              <a:spcPct val="35000"/>
-            </a:spcAft>
-          </a:pPr>
-          <a:endParaRPr lang="en-US" sz="1700" kern="1200"/>
-        </a:p>
-      </dsp:txBody>
-      <dsp:txXfrm rot="10800000">
-        <a:off x="4435328" y="2820958"/>
-        <a:ext cx="259661" cy="281772"/>
-      </dsp:txXfrm>
-    </dsp:sp>
-    <dsp:sp modelId="{015190AF-6814-4124-9780-D1FE7582EDA2}">
-      <dsp:nvSpPr>
-        <dsp:cNvPr id="0" name=""/>
-        <dsp:cNvSpPr/>
-      </dsp:nvSpPr>
-      <dsp:spPr>
-        <a:xfrm>
-          <a:off x="3083248" y="1479934"/>
-          <a:ext cx="1391468" cy="1391468"/>
-        </a:xfrm>
-        <a:prstGeom prst="ellipse">
-          <a:avLst/>
-        </a:prstGeom>
-        <a:solidFill>
-          <a:schemeClr val="accent2">
-            <a:hueOff val="-1455363"/>
-            <a:satOff val="-83928"/>
-            <a:lumOff val="8628"/>
-            <a:alphaOff val="0"/>
-          </a:schemeClr>
-        </a:solidFill>
-        <a:ln w="12700" cap="flat" cmpd="sng" algn="ctr">
-          <a:solidFill>
-            <a:schemeClr val="lt1">
-              <a:hueOff val="0"/>
-              <a:satOff val="0"/>
-              <a:lumOff val="0"/>
-              <a:alphaOff val="0"/>
-            </a:schemeClr>
-          </a:solidFill>
-          <a:prstDash val="solid"/>
-          <a:miter lim="800000"/>
-        </a:ln>
-        <a:effectLst/>
-      </dsp:spPr>
-      <dsp:style>
-        <a:lnRef idx="2">
-          <a:scrgbClr r="0" g="0" b="0"/>
-        </a:lnRef>
-        <a:fillRef idx="1">
-          <a:scrgbClr r="0" g="0" b="0"/>
-        </a:fillRef>
-        <a:effectRef idx="0">
-          <a:scrgbClr r="0" g="0" b="0"/>
-        </a:effectRef>
-        <a:fontRef idx="minor">
-          <a:schemeClr val="lt1"/>
-        </a:fontRef>
-      </dsp:style>
-      <dsp:txBody>
-        <a:bodyPr spcFirstLastPara="0" vert="horz" wrap="square" lIns="27940" tIns="27940" rIns="27940" bIns="27940" numCol="1" spcCol="1270" anchor="ctr" anchorCtr="0">
-          <a:noAutofit/>
-        </a:bodyPr>
-        <a:lstStyle/>
-        <a:p>
-          <a:pPr lvl="0" algn="ctr" defTabSz="977900">
-            <a:lnSpc>
-              <a:spcPct val="90000"/>
-            </a:lnSpc>
-            <a:spcBef>
-              <a:spcPct val="0"/>
-            </a:spcBef>
-            <a:spcAft>
-              <a:spcPct val="35000"/>
-            </a:spcAft>
-          </a:pPr>
-          <a:r>
-            <a:rPr lang="en-US" sz="2200" kern="1200" dirty="0"/>
-            <a:t>Debug</a:t>
-          </a:r>
-        </a:p>
-      </dsp:txBody>
-      <dsp:txXfrm>
-        <a:off x="3287024" y="1683710"/>
-        <a:ext cx="983916" cy="983916"/>
-      </dsp:txXfrm>
-    </dsp:sp>
-    <dsp:sp modelId="{2E4547E8-5A26-4145-B8D5-9870E6925ED4}">
-      <dsp:nvSpPr>
-        <dsp:cNvPr id="0" name=""/>
-        <dsp:cNvSpPr/>
-      </dsp:nvSpPr>
-      <dsp:spPr>
-        <a:xfrm rot="18900000">
-          <a:off x="4325495" y="1208873"/>
-          <a:ext cx="370944" cy="469620"/>
-        </a:xfrm>
-        <a:prstGeom prst="rightArrow">
-          <a:avLst>
-            <a:gd name="adj1" fmla="val 60000"/>
-            <a:gd name="adj2" fmla="val 50000"/>
-          </a:avLst>
-        </a:prstGeom>
-        <a:solidFill>
-          <a:schemeClr val="accent2">
-            <a:hueOff val="-1455363"/>
-            <a:satOff val="-83928"/>
-            <a:lumOff val="8628"/>
-            <a:alphaOff val="0"/>
-          </a:schemeClr>
-        </a:solidFill>
-        <a:ln>
-          <a:noFill/>
-        </a:ln>
-        <a:effectLst/>
-      </dsp:spPr>
-      <dsp:style>
-        <a:lnRef idx="0">
-          <a:scrgbClr r="0" g="0" b="0"/>
-        </a:lnRef>
-        <a:fillRef idx="1">
-          <a:scrgbClr r="0" g="0" b="0"/>
-        </a:fillRef>
-        <a:effectRef idx="0">
-          <a:scrgbClr r="0" g="0" b="0"/>
-        </a:effectRef>
-        <a:fontRef idx="minor">
-          <a:schemeClr val="lt1"/>
-        </a:fontRef>
-      </dsp:style>
-      <dsp:txBody>
-        <a:bodyPr spcFirstLastPara="0" vert="horz" wrap="square" lIns="0" tIns="0" rIns="0" bIns="0" numCol="1" spcCol="1270" anchor="ctr" anchorCtr="0">
-          <a:noAutofit/>
-        </a:bodyPr>
-        <a:lstStyle/>
-        <a:p>
-          <a:pPr lvl="0" algn="ctr" defTabSz="755650">
-            <a:lnSpc>
-              <a:spcPct val="90000"/>
-            </a:lnSpc>
-            <a:spcBef>
-              <a:spcPct val="0"/>
-            </a:spcBef>
-            <a:spcAft>
-              <a:spcPct val="35000"/>
-            </a:spcAft>
-          </a:pPr>
-          <a:endParaRPr lang="en-US" sz="1700" kern="1200"/>
-        </a:p>
-      </dsp:txBody>
-      <dsp:txXfrm>
-        <a:off x="4341792" y="1342141"/>
-        <a:ext cx="259661" cy="281772"/>
-      </dsp:txXfrm>
-    </dsp:sp>
-  </dsp:spTree>
-</dsp:drawing>
-</file>
-
-<file path=ppt/diagrams/drawing2.xml><?xml version="1.0" encoding="utf-8"?>
-<dsp:drawing xmlns:dgm="http://schemas.openxmlformats.org/drawingml/2006/diagram" xmlns:dsp="http://schemas.microsoft.com/office/drawing/2008/diagram" xmlns:a="http://schemas.openxmlformats.org/drawingml/2006/main">
-  <dsp:spTree>
-    <dsp:nvGrpSpPr>
-      <dsp:cNvPr id="0" name=""/>
-      <dsp:cNvGrpSpPr/>
-    </dsp:nvGrpSpPr>
-    <dsp:grpSpPr/>
-    <dsp:sp modelId="{5E965E1B-8117-417A-AF2C-EE3F901C2B1D}">
-      <dsp:nvSpPr>
-        <dsp:cNvPr id="0" name=""/>
-        <dsp:cNvSpPr/>
-      </dsp:nvSpPr>
-      <dsp:spPr>
-        <a:xfrm>
-          <a:off x="333411" y="51583"/>
-          <a:ext cx="314250" cy="314250"/>
+          <a:off x="380710" y="58900"/>
+          <a:ext cx="358831" cy="358831"/>
         </a:xfrm>
         <a:prstGeom prst="ellipse">
           <a:avLst/>
@@ -4155,8 +2415,8 @@
         </a:p>
       </dsp:txBody>
       <dsp:txXfrm>
-        <a:off x="379432" y="97604"/>
-        <a:ext cx="222208" cy="222208"/>
+        <a:off x="433260" y="111450"/>
+        <a:ext cx="253731" cy="253731"/>
       </dsp:txXfrm>
     </dsp:sp>
     <dsp:sp modelId="{0EB7CA57-BE36-4B74-B166-DB62B0C2EF0D}">
@@ -4166,8 +2426,8 @@
       </dsp:nvSpPr>
       <dsp:spPr>
         <a:xfrm rot="2700000">
-          <a:off x="613896" y="320703"/>
-          <a:ext cx="83330" cy="106059"/>
+          <a:off x="700986" y="366199"/>
+          <a:ext cx="95151" cy="121105"/>
         </a:xfrm>
         <a:prstGeom prst="rightArrow">
           <a:avLst>
@@ -4223,8 +2483,8 @@
         </a:p>
       </dsp:txBody>
       <dsp:txXfrm>
-        <a:off x="617557" y="333077"/>
-        <a:ext cx="58331" cy="63635"/>
+        <a:off x="705166" y="380328"/>
+        <a:ext cx="66606" cy="72663"/>
       </dsp:txXfrm>
     </dsp:sp>
     <dsp:sp modelId="{24EFD81F-AA69-44F2-83C2-806B40FDD526}">
@@ -4234,8 +2494,8 @@
       </dsp:nvSpPr>
       <dsp:spPr>
         <a:xfrm>
-          <a:off x="666796" y="384967"/>
-          <a:ext cx="314250" cy="314250"/>
+          <a:off x="761390" y="439580"/>
+          <a:ext cx="358831" cy="358831"/>
         </a:xfrm>
         <a:prstGeom prst="ellipse">
           <a:avLst/>
@@ -4300,8 +2560,8 @@
         </a:p>
       </dsp:txBody>
       <dsp:txXfrm>
-        <a:off x="712817" y="430988"/>
-        <a:ext cx="222208" cy="222208"/>
+        <a:off x="813940" y="492130"/>
+        <a:ext cx="253731" cy="253731"/>
       </dsp:txXfrm>
     </dsp:sp>
     <dsp:sp modelId="{7CC276FD-6F19-4E05-B00B-85069AD9148E}">
@@ -4311,8 +2571,8 @@
       </dsp:nvSpPr>
       <dsp:spPr>
         <a:xfrm rot="8100000">
-          <a:off x="617231" y="654087"/>
-          <a:ext cx="83330" cy="106059"/>
+          <a:off x="704794" y="746878"/>
+          <a:ext cx="95151" cy="121105"/>
         </a:xfrm>
         <a:prstGeom prst="rightArrow">
           <a:avLst>
@@ -4368,8 +2628,8 @@
         </a:p>
       </dsp:txBody>
       <dsp:txXfrm rot="10800000">
-        <a:off x="638569" y="666461"/>
-        <a:ext cx="58331" cy="63635"/>
+        <a:off x="729159" y="761007"/>
+        <a:ext cx="66606" cy="72663"/>
       </dsp:txXfrm>
     </dsp:sp>
     <dsp:sp modelId="{6CB6C22C-45D1-4921-B019-37E18F399A24}">
@@ -4379,8 +2639,8 @@
       </dsp:nvSpPr>
       <dsp:spPr>
         <a:xfrm>
-          <a:off x="333411" y="718352"/>
-          <a:ext cx="314250" cy="314250"/>
+          <a:off x="380710" y="820260"/>
+          <a:ext cx="358831" cy="358831"/>
         </a:xfrm>
         <a:prstGeom prst="ellipse">
           <a:avLst/>
@@ -4445,8 +2705,8 @@
         </a:p>
       </dsp:txBody>
       <dsp:txXfrm>
-        <a:off x="379432" y="764373"/>
-        <a:ext cx="222208" cy="222208"/>
+        <a:off x="433260" y="872810"/>
+        <a:ext cx="253731" cy="253731"/>
       </dsp:txXfrm>
     </dsp:sp>
     <dsp:sp modelId="{E74D0B9F-AA38-4716-BB64-90BE35523337}">
@@ -4456,8 +2716,8 @@
       </dsp:nvSpPr>
       <dsp:spPr>
         <a:xfrm rot="13500000">
-          <a:off x="283847" y="657423"/>
-          <a:ext cx="83330" cy="106059"/>
+          <a:off x="324115" y="750687"/>
+          <a:ext cx="95151" cy="121105"/>
         </a:xfrm>
         <a:prstGeom prst="rightArrow">
           <a:avLst>
@@ -4513,8 +2773,8 @@
         </a:p>
       </dsp:txBody>
       <dsp:txXfrm rot="10800000">
-        <a:off x="305185" y="687473"/>
-        <a:ext cx="58331" cy="63635"/>
+        <a:off x="348480" y="785000"/>
+        <a:ext cx="66606" cy="72663"/>
       </dsp:txXfrm>
     </dsp:sp>
     <dsp:sp modelId="{015190AF-6814-4124-9780-D1FE7582EDA2}">
@@ -4524,8 +2784,8 @@
       </dsp:nvSpPr>
       <dsp:spPr>
         <a:xfrm>
-          <a:off x="27" y="384967"/>
-          <a:ext cx="314250" cy="314250"/>
+          <a:off x="31" y="439580"/>
+          <a:ext cx="358831" cy="358831"/>
         </a:xfrm>
         <a:prstGeom prst="ellipse">
           <a:avLst/>
@@ -4590,8 +2850,8 @@
         </a:p>
       </dsp:txBody>
       <dsp:txXfrm>
-        <a:off x="46048" y="430988"/>
-        <a:ext cx="222208" cy="222208"/>
+        <a:off x="52581" y="492130"/>
+        <a:ext cx="253731" cy="253731"/>
       </dsp:txXfrm>
     </dsp:sp>
     <dsp:sp modelId="{2E4547E8-5A26-4145-B8D5-9870E6925ED4}">
@@ -4601,8 +2861,8 @@
       </dsp:nvSpPr>
       <dsp:spPr>
         <a:xfrm rot="18900000">
-          <a:off x="280512" y="324038"/>
-          <a:ext cx="83330" cy="106059"/>
+          <a:off x="320306" y="370007"/>
+          <a:ext cx="95151" cy="121105"/>
         </a:xfrm>
         <a:prstGeom prst="rightArrow">
           <a:avLst>
@@ -4658,8 +2918,8 @@
         </a:p>
       </dsp:txBody>
       <dsp:txXfrm>
-        <a:off x="284173" y="354088"/>
-        <a:ext cx="58331" cy="63635"/>
+        <a:off x="324486" y="404320"/>
+        <a:ext cx="66606" cy="72663"/>
       </dsp:txXfrm>
     </dsp:sp>
   </dsp:spTree>
@@ -4667,217 +2927,6 @@
 </file>
 
 <file path=ppt/diagrams/layout1.xml><?xml version="1.0" encoding="utf-8"?>
-<dgm:layoutDef xmlns:dgm="http://schemas.openxmlformats.org/drawingml/2006/diagram" xmlns:a="http://schemas.openxmlformats.org/drawingml/2006/main" uniqueId="urn:microsoft.com/office/officeart/2005/8/layout/cycle2">
-  <dgm:title val=""/>
-  <dgm:desc val=""/>
-  <dgm:catLst>
-    <dgm:cat type="cycle" pri="1000"/>
-    <dgm:cat type="convert" pri="10000"/>
-  </dgm:catLst>
-  <dgm:sampData>
-    <dgm:dataModel>
-      <dgm:ptLst>
-        <dgm:pt modelId="0" type="doc"/>
-        <dgm:pt modelId="1">
-          <dgm:prSet phldr="1"/>
-        </dgm:pt>
-        <dgm:pt modelId="2">
-          <dgm:prSet phldr="1"/>
-        </dgm:pt>
-        <dgm:pt modelId="3">
-          <dgm:prSet phldr="1"/>
-        </dgm:pt>
-        <dgm:pt modelId="4">
-          <dgm:prSet phldr="1"/>
-        </dgm:pt>
-        <dgm:pt modelId="5">
-          <dgm:prSet phldr="1"/>
-        </dgm:pt>
-      </dgm:ptLst>
-      <dgm:cxnLst>
-        <dgm:cxn modelId="6" srcId="0" destId="1" srcOrd="0" destOrd="0"/>
-        <dgm:cxn modelId="7" srcId="0" destId="2" srcOrd="1" destOrd="0"/>
-        <dgm:cxn modelId="8" srcId="0" destId="3" srcOrd="2" destOrd="0"/>
-        <dgm:cxn modelId="9" srcId="0" destId="4" srcOrd="3" destOrd="0"/>
-        <dgm:cxn modelId="10" srcId="0" destId="5" srcOrd="4" destOrd="0"/>
-      </dgm:cxnLst>
-      <dgm:bg/>
-      <dgm:whole/>
-    </dgm:dataModel>
-  </dgm:sampData>
-  <dgm:styleData>
-    <dgm:dataModel>
-      <dgm:ptLst>
-        <dgm:pt modelId="0" type="doc"/>
-        <dgm:pt modelId="1"/>
-        <dgm:pt modelId="2"/>
-        <dgm:pt modelId="3"/>
-      </dgm:ptLst>
-      <dgm:cxnLst>
-        <dgm:cxn modelId="4" srcId="0" destId="1" srcOrd="0" destOrd="0"/>
-        <dgm:cxn modelId="5" srcId="0" destId="2" srcOrd="1" destOrd="0"/>
-        <dgm:cxn modelId="6" srcId="0" destId="3" srcOrd="2" destOrd="0"/>
-      </dgm:cxnLst>
-      <dgm:bg/>
-      <dgm:whole/>
-    </dgm:dataModel>
-  </dgm:styleData>
-  <dgm:clrData>
-    <dgm:dataModel>
-      <dgm:ptLst>
-        <dgm:pt modelId="0" type="doc"/>
-        <dgm:pt modelId="1"/>
-        <dgm:pt modelId="2"/>
-        <dgm:pt modelId="3"/>
-        <dgm:pt modelId="4"/>
-        <dgm:pt modelId="5"/>
-        <dgm:pt modelId="6"/>
-      </dgm:ptLst>
-      <dgm:cxnLst>
-        <dgm:cxn modelId="7" srcId="0" destId="1" srcOrd="0" destOrd="0"/>
-        <dgm:cxn modelId="8" srcId="0" destId="2" srcOrd="1" destOrd="0"/>
-        <dgm:cxn modelId="9" srcId="0" destId="3" srcOrd="2" destOrd="0"/>
-        <dgm:cxn modelId="10" srcId="0" destId="4" srcOrd="3" destOrd="0"/>
-        <dgm:cxn modelId="11" srcId="0" destId="5" srcOrd="4" destOrd="0"/>
-        <dgm:cxn modelId="12" srcId="0" destId="6" srcOrd="5" destOrd="0"/>
-      </dgm:cxnLst>
-      <dgm:bg/>
-      <dgm:whole/>
-    </dgm:dataModel>
-  </dgm:clrData>
-  <dgm:layoutNode name="cycle">
-    <dgm:varLst>
-      <dgm:dir/>
-      <dgm:resizeHandles val="exact"/>
-    </dgm:varLst>
-    <dgm:choose name="Name0">
-      <dgm:if name="Name1" func="var" arg="dir" op="equ" val="norm">
-        <dgm:choose name="Name2">
-          <dgm:if name="Name3" axis="ch" ptType="node" func="cnt" op="gt" val="2">
-            <dgm:alg type="cycle">
-              <dgm:param type="stAng" val="0"/>
-              <dgm:param type="spanAng" val="360"/>
-            </dgm:alg>
-          </dgm:if>
-          <dgm:else name="Name4">
-            <dgm:alg type="cycle">
-              <dgm:param type="stAng" val="-90"/>
-              <dgm:param type="spanAng" val="360"/>
-            </dgm:alg>
-          </dgm:else>
-        </dgm:choose>
-      </dgm:if>
-      <dgm:else name="Name5">
-        <dgm:choose name="Name6">
-          <dgm:if name="Name7" axis="ch" ptType="node" func="cnt" op="gt" val="2">
-            <dgm:alg type="cycle">
-              <dgm:param type="stAng" val="0"/>
-              <dgm:param type="spanAng" val="-360"/>
-            </dgm:alg>
-          </dgm:if>
-          <dgm:else name="Name8">
-            <dgm:alg type="cycle">
-              <dgm:param type="stAng" val="90"/>
-              <dgm:param type="spanAng" val="-360"/>
-            </dgm:alg>
-          </dgm:else>
-        </dgm:choose>
-      </dgm:else>
-    </dgm:choose>
-    <dgm:shape xmlns:r="http://schemas.openxmlformats.org/officeDocument/2006/relationships" r:blip="">
-      <dgm:adjLst/>
-    </dgm:shape>
-    <dgm:presOf/>
-    <dgm:constrLst>
-      <dgm:constr type="w" for="ch" ptType="node" refType="w"/>
-      <dgm:constr type="w" for="ch" ptType="sibTrans" refType="w" refFor="ch" refPtType="node" op="equ" fact="0.25"/>
-      <dgm:constr type="sibSp" refType="w" refFor="ch" refPtType="node" fact="0.5"/>
-      <dgm:constr type="primFontSz" for="ch" ptType="node" op="equ" val="65"/>
-      <dgm:constr type="primFontSz" for="des" forName="connectorText" op="equ" val="55"/>
-      <dgm:constr type="primFontSz" for="des" forName="connectorText" refType="primFontSz" refFor="ch" refPtType="node" op="lte" fact="0.8"/>
-    </dgm:constrLst>
-    <dgm:ruleLst/>
-    <dgm:forEach name="nodesForEach" axis="ch" ptType="node">
-      <dgm:layoutNode name="node">
-        <dgm:varLst>
-          <dgm:bulletEnabled val="1"/>
-        </dgm:varLst>
-        <dgm:alg type="tx">
-          <dgm:param type="txAnchorVertCh" val="mid"/>
-        </dgm:alg>
-        <dgm:shape xmlns:r="http://schemas.openxmlformats.org/officeDocument/2006/relationships" type="ellipse" r:blip="">
-          <dgm:adjLst/>
-        </dgm:shape>
-        <dgm:presOf axis="desOrSelf" ptType="node"/>
-        <dgm:constrLst>
-          <dgm:constr type="h" refType="w"/>
-          <dgm:constr type="lMarg" refType="primFontSz" fact="0.1"/>
-          <dgm:constr type="rMarg" refType="primFontSz" fact="0.1"/>
-          <dgm:constr type="tMarg" refType="primFontSz" fact="0.1"/>
-          <dgm:constr type="bMarg" refType="primFontSz" fact="0.1"/>
-        </dgm:constrLst>
-        <dgm:ruleLst>
-          <dgm:rule type="primFontSz" val="5" fact="NaN" max="NaN"/>
-        </dgm:ruleLst>
-      </dgm:layoutNode>
-      <dgm:choose name="Name9">
-        <dgm:if name="Name10" axis="par ch" ptType="doc node" func="cnt" op="gt" val="1">
-          <dgm:forEach name="sibTransForEach" axis="followSib" ptType="sibTrans" hideLastTrans="0" cnt="1">
-            <dgm:layoutNode name="sibTrans">
-              <dgm:choose name="Name11">
-                <dgm:if name="Name12" axis="par ch" ptType="doc node" func="cnt" op="lt" val="3">
-                  <dgm:alg type="conn">
-                    <dgm:param type="begPts" val="radial"/>
-                    <dgm:param type="endPts" val="radial"/>
-                  </dgm:alg>
-                </dgm:if>
-                <dgm:else name="Name13">
-                  <dgm:alg type="conn">
-                    <dgm:param type="begPts" val="auto"/>
-                    <dgm:param type="endPts" val="auto"/>
-                  </dgm:alg>
-                </dgm:else>
-              </dgm:choose>
-              <dgm:shape xmlns:r="http://schemas.openxmlformats.org/officeDocument/2006/relationships" type="conn" r:blip="">
-                <dgm:adjLst/>
-              </dgm:shape>
-              <dgm:presOf axis="self"/>
-              <dgm:constrLst>
-                <dgm:constr type="h" refType="w" fact="1.35"/>
-                <dgm:constr type="connDist"/>
-                <dgm:constr type="w" for="ch" refType="connDist" fact="0.45"/>
-                <dgm:constr type="h" for="ch" refType="h"/>
-              </dgm:constrLst>
-              <dgm:ruleLst/>
-              <dgm:layoutNode name="connectorText">
-                <dgm:alg type="tx">
-                  <dgm:param type="autoTxRot" val="grav"/>
-                </dgm:alg>
-                <dgm:shape xmlns:r="http://schemas.openxmlformats.org/officeDocument/2006/relationships" type="conn" r:blip="" hideGeom="1">
-                  <dgm:adjLst/>
-                </dgm:shape>
-                <dgm:presOf axis="self"/>
-                <dgm:constrLst>
-                  <dgm:constr type="lMarg"/>
-                  <dgm:constr type="rMarg"/>
-                  <dgm:constr type="tMarg"/>
-                  <dgm:constr type="bMarg"/>
-                </dgm:constrLst>
-                <dgm:ruleLst>
-                  <dgm:rule type="primFontSz" val="5" fact="NaN" max="NaN"/>
-                </dgm:ruleLst>
-              </dgm:layoutNode>
-            </dgm:layoutNode>
-          </dgm:forEach>
-        </dgm:if>
-        <dgm:else name="Name14"/>
-      </dgm:choose>
-    </dgm:forEach>
-  </dgm:layoutNode>
-</dgm:layoutDef>
-</file>
-
-<file path=ppt/diagrams/layout2.xml><?xml version="1.0" encoding="utf-8"?>
 <dgm:layoutDef xmlns:dgm="http://schemas.openxmlformats.org/drawingml/2006/diagram" xmlns:a="http://schemas.openxmlformats.org/drawingml/2006/main" uniqueId="urn:microsoft.com/office/officeart/2005/8/layout/cycle2">
   <dgm:title val=""/>
   <dgm:desc val=""/>
@@ -6122,1040 +4171,6 @@
 </dgm:styleDef>
 </file>
 
-<file path=ppt/diagrams/quickStyle2.xml><?xml version="1.0" encoding="utf-8"?>
-<dgm:styleDef xmlns:dgm="http://schemas.openxmlformats.org/drawingml/2006/diagram" xmlns:a="http://schemas.openxmlformats.org/drawingml/2006/main" uniqueId="urn:microsoft.com/office/officeart/2005/8/quickstyle/simple1">
-  <dgm:title val=""/>
-  <dgm:desc val=""/>
-  <dgm:catLst>
-    <dgm:cat type="simple" pri="10100"/>
-  </dgm:catLst>
-  <dgm:scene3d>
-    <a:camera prst="orthographicFront"/>
-    <a:lightRig rig="threePt" dir="t"/>
-  </dgm:scene3d>
-  <dgm:styleLbl name="node0">
-    <dgm:scene3d>
-      <a:camera prst="orthographicFront"/>
-      <a:lightRig rig="threePt" dir="t"/>
-    </dgm:scene3d>
-    <dgm:sp3d/>
-    <dgm:txPr/>
-    <dgm:style>
-      <a:lnRef idx="2">
-        <a:scrgbClr r="0" g="0" b="0"/>
-      </a:lnRef>
-      <a:fillRef idx="1">
-        <a:scrgbClr r="0" g="0" b="0"/>
-      </a:fillRef>
-      <a:effectRef idx="0">
-        <a:scrgbClr r="0" g="0" b="0"/>
-      </a:effectRef>
-      <a:fontRef idx="minor">
-        <a:schemeClr val="lt1"/>
-      </a:fontRef>
-    </dgm:style>
-  </dgm:styleLbl>
-  <dgm:styleLbl name="lnNode1">
-    <dgm:scene3d>
-      <a:camera prst="orthographicFront"/>
-      <a:lightRig rig="threePt" dir="t"/>
-    </dgm:scene3d>
-    <dgm:sp3d/>
-    <dgm:txPr/>
-    <dgm:style>
-      <a:lnRef idx="2">
-        <a:scrgbClr r="0" g="0" b="0"/>
-      </a:lnRef>
-      <a:fillRef idx="1">
-        <a:scrgbClr r="0" g="0" b="0"/>
-      </a:fillRef>
-      <a:effectRef idx="0">
-        <a:scrgbClr r="0" g="0" b="0"/>
-      </a:effectRef>
-      <a:fontRef idx="minor">
-        <a:schemeClr val="lt1"/>
-      </a:fontRef>
-    </dgm:style>
-  </dgm:styleLbl>
-  <dgm:styleLbl name="vennNode1">
-    <dgm:scene3d>
-      <a:camera prst="orthographicFront"/>
-      <a:lightRig rig="threePt" dir="t"/>
-    </dgm:scene3d>
-    <dgm:sp3d/>
-    <dgm:txPr/>
-    <dgm:style>
-      <a:lnRef idx="2">
-        <a:scrgbClr r="0" g="0" b="0"/>
-      </a:lnRef>
-      <a:fillRef idx="1">
-        <a:scrgbClr r="0" g="0" b="0"/>
-      </a:fillRef>
-      <a:effectRef idx="0">
-        <a:scrgbClr r="0" g="0" b="0"/>
-      </a:effectRef>
-      <a:fontRef idx="minor">
-        <a:schemeClr val="tx1"/>
-      </a:fontRef>
-    </dgm:style>
-  </dgm:styleLbl>
-  <dgm:styleLbl name="alignNode1">
-    <dgm:scene3d>
-      <a:camera prst="orthographicFront"/>
-      <a:lightRig rig="threePt" dir="t"/>
-    </dgm:scene3d>
-    <dgm:sp3d/>
-    <dgm:txPr/>
-    <dgm:style>
-      <a:lnRef idx="2">
-        <a:scrgbClr r="0" g="0" b="0"/>
-      </a:lnRef>
-      <a:fillRef idx="1">
-        <a:scrgbClr r="0" g="0" b="0"/>
-      </a:fillRef>
-      <a:effectRef idx="0">
-        <a:scrgbClr r="0" g="0" b="0"/>
-      </a:effectRef>
-      <a:fontRef idx="minor">
-        <a:schemeClr val="lt1"/>
-      </a:fontRef>
-    </dgm:style>
-  </dgm:styleLbl>
-  <dgm:styleLbl name="node1">
-    <dgm:scene3d>
-      <a:camera prst="orthographicFront"/>
-      <a:lightRig rig="threePt" dir="t"/>
-    </dgm:scene3d>
-    <dgm:sp3d/>
-    <dgm:txPr/>
-    <dgm:style>
-      <a:lnRef idx="2">
-        <a:scrgbClr r="0" g="0" b="0"/>
-      </a:lnRef>
-      <a:fillRef idx="1">
-        <a:scrgbClr r="0" g="0" b="0"/>
-      </a:fillRef>
-      <a:effectRef idx="0">
-        <a:scrgbClr r="0" g="0" b="0"/>
-      </a:effectRef>
-      <a:fontRef idx="minor">
-        <a:schemeClr val="lt1"/>
-      </a:fontRef>
-    </dgm:style>
-  </dgm:styleLbl>
-  <dgm:styleLbl name="node2">
-    <dgm:scene3d>
-      <a:camera prst="orthographicFront"/>
-      <a:lightRig rig="threePt" dir="t"/>
-    </dgm:scene3d>
-    <dgm:sp3d/>
-    <dgm:txPr/>
-    <dgm:style>
-      <a:lnRef idx="2">
-        <a:scrgbClr r="0" g="0" b="0"/>
-      </a:lnRef>
-      <a:fillRef idx="1">
-        <a:scrgbClr r="0" g="0" b="0"/>
-      </a:fillRef>
-      <a:effectRef idx="0">
-        <a:scrgbClr r="0" g="0" b="0"/>
-      </a:effectRef>
-      <a:fontRef idx="minor">
-        <a:schemeClr val="lt1"/>
-      </a:fontRef>
-    </dgm:style>
-  </dgm:styleLbl>
-  <dgm:styleLbl name="node3">
-    <dgm:scene3d>
-      <a:camera prst="orthographicFront"/>
-      <a:lightRig rig="threePt" dir="t"/>
-    </dgm:scene3d>
-    <dgm:sp3d/>
-    <dgm:txPr/>
-    <dgm:style>
-      <a:lnRef idx="2">
-        <a:scrgbClr r="0" g="0" b="0"/>
-      </a:lnRef>
-      <a:fillRef idx="1">
-        <a:scrgbClr r="0" g="0" b="0"/>
-      </a:fillRef>
-      <a:effectRef idx="0">
-        <a:scrgbClr r="0" g="0" b="0"/>
-      </a:effectRef>
-      <a:fontRef idx="minor">
-        <a:schemeClr val="lt1"/>
-      </a:fontRef>
-    </dgm:style>
-  </dgm:styleLbl>
-  <dgm:styleLbl name="node4">
-    <dgm:scene3d>
-      <a:camera prst="orthographicFront"/>
-      <a:lightRig rig="threePt" dir="t"/>
-    </dgm:scene3d>
-    <dgm:sp3d/>
-    <dgm:txPr/>
-    <dgm:style>
-      <a:lnRef idx="2">
-        <a:scrgbClr r="0" g="0" b="0"/>
-      </a:lnRef>
-      <a:fillRef idx="1">
-        <a:scrgbClr r="0" g="0" b="0"/>
-      </a:fillRef>
-      <a:effectRef idx="0">
-        <a:scrgbClr r="0" g="0" b="0"/>
-      </a:effectRef>
-      <a:fontRef idx="minor">
-        <a:schemeClr val="lt1"/>
-      </a:fontRef>
-    </dgm:style>
-  </dgm:styleLbl>
-  <dgm:styleLbl name="fgImgPlace1">
-    <dgm:scene3d>
-      <a:camera prst="orthographicFront"/>
-      <a:lightRig rig="threePt" dir="t"/>
-    </dgm:scene3d>
-    <dgm:sp3d/>
-    <dgm:txPr/>
-    <dgm:style>
-      <a:lnRef idx="2">
-        <a:scrgbClr r="0" g="0" b="0"/>
-      </a:lnRef>
-      <a:fillRef idx="1">
-        <a:scrgbClr r="0" g="0" b="0"/>
-      </a:fillRef>
-      <a:effectRef idx="0">
-        <a:scrgbClr r="0" g="0" b="0"/>
-      </a:effectRef>
-      <a:fontRef idx="minor"/>
-    </dgm:style>
-  </dgm:styleLbl>
-  <dgm:styleLbl name="alignImgPlace1">
-    <dgm:scene3d>
-      <a:camera prst="orthographicFront"/>
-      <a:lightRig rig="threePt" dir="t"/>
-    </dgm:scene3d>
-    <dgm:sp3d/>
-    <dgm:txPr/>
-    <dgm:style>
-      <a:lnRef idx="2">
-        <a:scrgbClr r="0" g="0" b="0"/>
-      </a:lnRef>
-      <a:fillRef idx="1">
-        <a:scrgbClr r="0" g="0" b="0"/>
-      </a:fillRef>
-      <a:effectRef idx="0">
-        <a:scrgbClr r="0" g="0" b="0"/>
-      </a:effectRef>
-      <a:fontRef idx="minor"/>
-    </dgm:style>
-  </dgm:styleLbl>
-  <dgm:styleLbl name="bgImgPlace1">
-    <dgm:scene3d>
-      <a:camera prst="orthographicFront"/>
-      <a:lightRig rig="threePt" dir="t"/>
-    </dgm:scene3d>
-    <dgm:sp3d/>
-    <dgm:txPr/>
-    <dgm:style>
-      <a:lnRef idx="2">
-        <a:scrgbClr r="0" g="0" b="0"/>
-      </a:lnRef>
-      <a:fillRef idx="1">
-        <a:scrgbClr r="0" g="0" b="0"/>
-      </a:fillRef>
-      <a:effectRef idx="0">
-        <a:scrgbClr r="0" g="0" b="0"/>
-      </a:effectRef>
-      <a:fontRef idx="minor"/>
-    </dgm:style>
-  </dgm:styleLbl>
-  <dgm:styleLbl name="sibTrans2D1">
-    <dgm:scene3d>
-      <a:camera prst="orthographicFront"/>
-      <a:lightRig rig="threePt" dir="t"/>
-    </dgm:scene3d>
-    <dgm:sp3d/>
-    <dgm:txPr/>
-    <dgm:style>
-      <a:lnRef idx="0">
-        <a:scrgbClr r="0" g="0" b="0"/>
-      </a:lnRef>
-      <a:fillRef idx="1">
-        <a:scrgbClr r="0" g="0" b="0"/>
-      </a:fillRef>
-      <a:effectRef idx="0">
-        <a:scrgbClr r="0" g="0" b="0"/>
-      </a:effectRef>
-      <a:fontRef idx="minor">
-        <a:schemeClr val="lt1"/>
-      </a:fontRef>
-    </dgm:style>
-  </dgm:styleLbl>
-  <dgm:styleLbl name="fgSibTrans2D1">
-    <dgm:scene3d>
-      <a:camera prst="orthographicFront"/>
-      <a:lightRig rig="threePt" dir="t"/>
-    </dgm:scene3d>
-    <dgm:sp3d/>
-    <dgm:txPr/>
-    <dgm:style>
-      <a:lnRef idx="0">
-        <a:scrgbClr r="0" g="0" b="0"/>
-      </a:lnRef>
-      <a:fillRef idx="1">
-        <a:scrgbClr r="0" g="0" b="0"/>
-      </a:fillRef>
-      <a:effectRef idx="0">
-        <a:scrgbClr r="0" g="0" b="0"/>
-      </a:effectRef>
-      <a:fontRef idx="minor">
-        <a:schemeClr val="lt1"/>
-      </a:fontRef>
-    </dgm:style>
-  </dgm:styleLbl>
-  <dgm:styleLbl name="bgSibTrans2D1">
-    <dgm:scene3d>
-      <a:camera prst="orthographicFront"/>
-      <a:lightRig rig="threePt" dir="t"/>
-    </dgm:scene3d>
-    <dgm:sp3d/>
-    <dgm:txPr/>
-    <dgm:style>
-      <a:lnRef idx="0">
-        <a:scrgbClr r="0" g="0" b="0"/>
-      </a:lnRef>
-      <a:fillRef idx="1">
-        <a:scrgbClr r="0" g="0" b="0"/>
-      </a:fillRef>
-      <a:effectRef idx="0">
-        <a:scrgbClr r="0" g="0" b="0"/>
-      </a:effectRef>
-      <a:fontRef idx="minor">
-        <a:schemeClr val="lt1"/>
-      </a:fontRef>
-    </dgm:style>
-  </dgm:styleLbl>
-  <dgm:styleLbl name="sibTrans1D1">
-    <dgm:scene3d>
-      <a:camera prst="orthographicFront"/>
-      <a:lightRig rig="threePt" dir="t"/>
-    </dgm:scene3d>
-    <dgm:sp3d/>
-    <dgm:txPr/>
-    <dgm:style>
-      <a:lnRef idx="1">
-        <a:scrgbClr r="0" g="0" b="0"/>
-      </a:lnRef>
-      <a:fillRef idx="0">
-        <a:scrgbClr r="0" g="0" b="0"/>
-      </a:fillRef>
-      <a:effectRef idx="0">
-        <a:scrgbClr r="0" g="0" b="0"/>
-      </a:effectRef>
-      <a:fontRef idx="minor"/>
-    </dgm:style>
-  </dgm:styleLbl>
-  <dgm:styleLbl name="callout">
-    <dgm:scene3d>
-      <a:camera prst="orthographicFront"/>
-      <a:lightRig rig="threePt" dir="t"/>
-    </dgm:scene3d>
-    <dgm:sp3d/>
-    <dgm:txPr/>
-    <dgm:style>
-      <a:lnRef idx="2">
-        <a:scrgbClr r="0" g="0" b="0"/>
-      </a:lnRef>
-      <a:fillRef idx="1">
-        <a:scrgbClr r="0" g="0" b="0"/>
-      </a:fillRef>
-      <a:effectRef idx="0">
-        <a:scrgbClr r="0" g="0" b="0"/>
-      </a:effectRef>
-      <a:fontRef idx="minor"/>
-    </dgm:style>
-  </dgm:styleLbl>
-  <dgm:styleLbl name="asst0">
-    <dgm:scene3d>
-      <a:camera prst="orthographicFront"/>
-      <a:lightRig rig="threePt" dir="t"/>
-    </dgm:scene3d>
-    <dgm:sp3d/>
-    <dgm:txPr/>
-    <dgm:style>
-      <a:lnRef idx="2">
-        <a:scrgbClr r="0" g="0" b="0"/>
-      </a:lnRef>
-      <a:fillRef idx="1">
-        <a:scrgbClr r="0" g="0" b="0"/>
-      </a:fillRef>
-      <a:effectRef idx="0">
-        <a:scrgbClr r="0" g="0" b="0"/>
-      </a:effectRef>
-      <a:fontRef idx="minor">
-        <a:schemeClr val="lt1"/>
-      </a:fontRef>
-    </dgm:style>
-  </dgm:styleLbl>
-  <dgm:styleLbl name="asst1">
-    <dgm:scene3d>
-      <a:camera prst="orthographicFront"/>
-      <a:lightRig rig="threePt" dir="t"/>
-    </dgm:scene3d>
-    <dgm:sp3d/>
-    <dgm:txPr/>
-    <dgm:style>
-      <a:lnRef idx="2">
-        <a:scrgbClr r="0" g="0" b="0"/>
-      </a:lnRef>
-      <a:fillRef idx="1">
-        <a:scrgbClr r="0" g="0" b="0"/>
-      </a:fillRef>
-      <a:effectRef idx="0">
-        <a:scrgbClr r="0" g="0" b="0"/>
-      </a:effectRef>
-      <a:fontRef idx="minor">
-        <a:schemeClr val="lt1"/>
-      </a:fontRef>
-    </dgm:style>
-  </dgm:styleLbl>
-  <dgm:styleLbl name="asst2">
-    <dgm:scene3d>
-      <a:camera prst="orthographicFront"/>
-      <a:lightRig rig="threePt" dir="t"/>
-    </dgm:scene3d>
-    <dgm:sp3d/>
-    <dgm:txPr/>
-    <dgm:style>
-      <a:lnRef idx="2">
-        <a:scrgbClr r="0" g="0" b="0"/>
-      </a:lnRef>
-      <a:fillRef idx="1">
-        <a:scrgbClr r="0" g="0" b="0"/>
-      </a:fillRef>
-      <a:effectRef idx="0">
-        <a:scrgbClr r="0" g="0" b="0"/>
-      </a:effectRef>
-      <a:fontRef idx="minor">
-        <a:schemeClr val="lt1"/>
-      </a:fontRef>
-    </dgm:style>
-  </dgm:styleLbl>
-  <dgm:styleLbl name="asst3">
-    <dgm:scene3d>
-      <a:camera prst="orthographicFront"/>
-      <a:lightRig rig="threePt" dir="t"/>
-    </dgm:scene3d>
-    <dgm:sp3d/>
-    <dgm:txPr/>
-    <dgm:style>
-      <a:lnRef idx="2">
-        <a:scrgbClr r="0" g="0" b="0"/>
-      </a:lnRef>
-      <a:fillRef idx="1">
-        <a:scrgbClr r="0" g="0" b="0"/>
-      </a:fillRef>
-      <a:effectRef idx="0">
-        <a:scrgbClr r="0" g="0" b="0"/>
-      </a:effectRef>
-      <a:fontRef idx="minor">
-        <a:schemeClr val="lt1"/>
-      </a:fontRef>
-    </dgm:style>
-  </dgm:styleLbl>
-  <dgm:styleLbl name="asst4">
-    <dgm:scene3d>
-      <a:camera prst="orthographicFront"/>
-      <a:lightRig rig="threePt" dir="t"/>
-    </dgm:scene3d>
-    <dgm:sp3d/>
-    <dgm:txPr/>
-    <dgm:style>
-      <a:lnRef idx="2">
-        <a:scrgbClr r="0" g="0" b="0"/>
-      </a:lnRef>
-      <a:fillRef idx="1">
-        <a:scrgbClr r="0" g="0" b="0"/>
-      </a:fillRef>
-      <a:effectRef idx="0">
-        <a:scrgbClr r="0" g="0" b="0"/>
-      </a:effectRef>
-      <a:fontRef idx="minor">
-        <a:schemeClr val="lt1"/>
-      </a:fontRef>
-    </dgm:style>
-  </dgm:styleLbl>
-  <dgm:styleLbl name="parChTrans2D1">
-    <dgm:scene3d>
-      <a:camera prst="orthographicFront"/>
-      <a:lightRig rig="threePt" dir="t"/>
-    </dgm:scene3d>
-    <dgm:sp3d/>
-    <dgm:txPr/>
-    <dgm:style>
-      <a:lnRef idx="2">
-        <a:scrgbClr r="0" g="0" b="0"/>
-      </a:lnRef>
-      <a:fillRef idx="1">
-        <a:scrgbClr r="0" g="0" b="0"/>
-      </a:fillRef>
-      <a:effectRef idx="0">
-        <a:scrgbClr r="0" g="0" b="0"/>
-      </a:effectRef>
-      <a:fontRef idx="minor">
-        <a:schemeClr val="lt1"/>
-      </a:fontRef>
-    </dgm:style>
-  </dgm:styleLbl>
-  <dgm:styleLbl name="parChTrans2D2">
-    <dgm:scene3d>
-      <a:camera prst="orthographicFront"/>
-      <a:lightRig rig="threePt" dir="t"/>
-    </dgm:scene3d>
-    <dgm:sp3d/>
-    <dgm:txPr/>
-    <dgm:style>
-      <a:lnRef idx="2">
-        <a:scrgbClr r="0" g="0" b="0"/>
-      </a:lnRef>
-      <a:fillRef idx="1">
-        <a:scrgbClr r="0" g="0" b="0"/>
-      </a:fillRef>
-      <a:effectRef idx="0">
-        <a:scrgbClr r="0" g="0" b="0"/>
-      </a:effectRef>
-      <a:fontRef idx="minor">
-        <a:schemeClr val="lt1"/>
-      </a:fontRef>
-    </dgm:style>
-  </dgm:styleLbl>
-  <dgm:styleLbl name="parChTrans2D3">
-    <dgm:scene3d>
-      <a:camera prst="orthographicFront"/>
-      <a:lightRig rig="threePt" dir="t"/>
-    </dgm:scene3d>
-    <dgm:sp3d/>
-    <dgm:txPr/>
-    <dgm:style>
-      <a:lnRef idx="2">
-        <a:scrgbClr r="0" g="0" b="0"/>
-      </a:lnRef>
-      <a:fillRef idx="1">
-        <a:scrgbClr r="0" g="0" b="0"/>
-      </a:fillRef>
-      <a:effectRef idx="0">
-        <a:scrgbClr r="0" g="0" b="0"/>
-      </a:effectRef>
-      <a:fontRef idx="minor">
-        <a:schemeClr val="lt1"/>
-      </a:fontRef>
-    </dgm:style>
-  </dgm:styleLbl>
-  <dgm:styleLbl name="parChTrans2D4">
-    <dgm:scene3d>
-      <a:camera prst="orthographicFront"/>
-      <a:lightRig rig="threePt" dir="t"/>
-    </dgm:scene3d>
-    <dgm:sp3d/>
-    <dgm:txPr/>
-    <dgm:style>
-      <a:lnRef idx="2">
-        <a:scrgbClr r="0" g="0" b="0"/>
-      </a:lnRef>
-      <a:fillRef idx="1">
-        <a:scrgbClr r="0" g="0" b="0"/>
-      </a:fillRef>
-      <a:effectRef idx="0">
-        <a:scrgbClr r="0" g="0" b="0"/>
-      </a:effectRef>
-      <a:fontRef idx="minor">
-        <a:schemeClr val="lt1"/>
-      </a:fontRef>
-    </dgm:style>
-  </dgm:styleLbl>
-  <dgm:styleLbl name="parChTrans1D1">
-    <dgm:scene3d>
-      <a:camera prst="orthographicFront"/>
-      <a:lightRig rig="threePt" dir="t"/>
-    </dgm:scene3d>
-    <dgm:sp3d/>
-    <dgm:txPr/>
-    <dgm:style>
-      <a:lnRef idx="2">
-        <a:scrgbClr r="0" g="0" b="0"/>
-      </a:lnRef>
-      <a:fillRef idx="0">
-        <a:scrgbClr r="0" g="0" b="0"/>
-      </a:fillRef>
-      <a:effectRef idx="0">
-        <a:scrgbClr r="0" g="0" b="0"/>
-      </a:effectRef>
-      <a:fontRef idx="minor"/>
-    </dgm:style>
-  </dgm:styleLbl>
-  <dgm:styleLbl name="parChTrans1D2">
-    <dgm:scene3d>
-      <a:camera prst="orthographicFront"/>
-      <a:lightRig rig="threePt" dir="t"/>
-    </dgm:scene3d>
-    <dgm:sp3d/>
-    <dgm:txPr/>
-    <dgm:style>
-      <a:lnRef idx="2">
-        <a:scrgbClr r="0" g="0" b="0"/>
-      </a:lnRef>
-      <a:fillRef idx="0">
-        <a:scrgbClr r="0" g="0" b="0"/>
-      </a:fillRef>
-      <a:effectRef idx="0">
-        <a:scrgbClr r="0" g="0" b="0"/>
-      </a:effectRef>
-      <a:fontRef idx="minor"/>
-    </dgm:style>
-  </dgm:styleLbl>
-  <dgm:styleLbl name="parChTrans1D3">
-    <dgm:scene3d>
-      <a:camera prst="orthographicFront"/>
-      <a:lightRig rig="threePt" dir="t"/>
-    </dgm:scene3d>
-    <dgm:sp3d/>
-    <dgm:txPr/>
-    <dgm:style>
-      <a:lnRef idx="2">
-        <a:scrgbClr r="0" g="0" b="0"/>
-      </a:lnRef>
-      <a:fillRef idx="0">
-        <a:scrgbClr r="0" g="0" b="0"/>
-      </a:fillRef>
-      <a:effectRef idx="0">
-        <a:scrgbClr r="0" g="0" b="0"/>
-      </a:effectRef>
-      <a:fontRef idx="minor"/>
-    </dgm:style>
-  </dgm:styleLbl>
-  <dgm:styleLbl name="parChTrans1D4">
-    <dgm:scene3d>
-      <a:camera prst="orthographicFront"/>
-      <a:lightRig rig="threePt" dir="t"/>
-    </dgm:scene3d>
-    <dgm:sp3d/>
-    <dgm:txPr/>
-    <dgm:style>
-      <a:lnRef idx="2">
-        <a:scrgbClr r="0" g="0" b="0"/>
-      </a:lnRef>
-      <a:fillRef idx="0">
-        <a:scrgbClr r="0" g="0" b="0"/>
-      </a:fillRef>
-      <a:effectRef idx="0">
-        <a:scrgbClr r="0" g="0" b="0"/>
-      </a:effectRef>
-      <a:fontRef idx="minor"/>
-    </dgm:style>
-  </dgm:styleLbl>
-  <dgm:styleLbl name="fgAcc1">
-    <dgm:scene3d>
-      <a:camera prst="orthographicFront"/>
-      <a:lightRig rig="threePt" dir="t"/>
-    </dgm:scene3d>
-    <dgm:sp3d/>
-    <dgm:txPr/>
-    <dgm:style>
-      <a:lnRef idx="2">
-        <a:scrgbClr r="0" g="0" b="0"/>
-      </a:lnRef>
-      <a:fillRef idx="1">
-        <a:scrgbClr r="0" g="0" b="0"/>
-      </a:fillRef>
-      <a:effectRef idx="0">
-        <a:scrgbClr r="0" g="0" b="0"/>
-      </a:effectRef>
-      <a:fontRef idx="minor"/>
-    </dgm:style>
-  </dgm:styleLbl>
-  <dgm:styleLbl name="conFgAcc1">
-    <dgm:scene3d>
-      <a:camera prst="orthographicFront"/>
-      <a:lightRig rig="threePt" dir="t"/>
-    </dgm:scene3d>
-    <dgm:sp3d/>
-    <dgm:txPr/>
-    <dgm:style>
-      <a:lnRef idx="2">
-        <a:scrgbClr r="0" g="0" b="0"/>
-      </a:lnRef>
-      <a:fillRef idx="1">
-        <a:scrgbClr r="0" g="0" b="0"/>
-      </a:fillRef>
-      <a:effectRef idx="0">
-        <a:scrgbClr r="0" g="0" b="0"/>
-      </a:effectRef>
-      <a:fontRef idx="minor"/>
-    </dgm:style>
-  </dgm:styleLbl>
-  <dgm:styleLbl name="alignAcc1">
-    <dgm:scene3d>
-      <a:camera prst="orthographicFront"/>
-      <a:lightRig rig="threePt" dir="t"/>
-    </dgm:scene3d>
-    <dgm:sp3d/>
-    <dgm:txPr/>
-    <dgm:style>
-      <a:lnRef idx="2">
-        <a:scrgbClr r="0" g="0" b="0"/>
-      </a:lnRef>
-      <a:fillRef idx="1">
-        <a:scrgbClr r="0" g="0" b="0"/>
-      </a:fillRef>
-      <a:effectRef idx="0">
-        <a:scrgbClr r="0" g="0" b="0"/>
-      </a:effectRef>
-      <a:fontRef idx="minor"/>
-    </dgm:style>
-  </dgm:styleLbl>
-  <dgm:styleLbl name="trAlignAcc1">
-    <dgm:scene3d>
-      <a:camera prst="orthographicFront"/>
-      <a:lightRig rig="threePt" dir="t"/>
-    </dgm:scene3d>
-    <dgm:sp3d/>
-    <dgm:txPr/>
-    <dgm:style>
-      <a:lnRef idx="1">
-        <a:scrgbClr r="0" g="0" b="0"/>
-      </a:lnRef>
-      <a:fillRef idx="1">
-        <a:scrgbClr r="0" g="0" b="0"/>
-      </a:fillRef>
-      <a:effectRef idx="0">
-        <a:scrgbClr r="0" g="0" b="0"/>
-      </a:effectRef>
-      <a:fontRef idx="minor"/>
-    </dgm:style>
-  </dgm:styleLbl>
-  <dgm:styleLbl name="bgAcc1">
-    <dgm:scene3d>
-      <a:camera prst="orthographicFront"/>
-      <a:lightRig rig="threePt" dir="t"/>
-    </dgm:scene3d>
-    <dgm:sp3d/>
-    <dgm:txPr/>
-    <dgm:style>
-      <a:lnRef idx="2">
-        <a:scrgbClr r="0" g="0" b="0"/>
-      </a:lnRef>
-      <a:fillRef idx="1">
-        <a:scrgbClr r="0" g="0" b="0"/>
-      </a:fillRef>
-      <a:effectRef idx="0">
-        <a:scrgbClr r="0" g="0" b="0"/>
-      </a:effectRef>
-      <a:fontRef idx="minor"/>
-    </dgm:style>
-  </dgm:styleLbl>
-  <dgm:styleLbl name="solidFgAcc1">
-    <dgm:scene3d>
-      <a:camera prst="orthographicFront"/>
-      <a:lightRig rig="threePt" dir="t"/>
-    </dgm:scene3d>
-    <dgm:sp3d/>
-    <dgm:txPr/>
-    <dgm:style>
-      <a:lnRef idx="2">
-        <a:scrgbClr r="0" g="0" b="0"/>
-      </a:lnRef>
-      <a:fillRef idx="1">
-        <a:scrgbClr r="0" g="0" b="0"/>
-      </a:fillRef>
-      <a:effectRef idx="0">
-        <a:scrgbClr r="0" g="0" b="0"/>
-      </a:effectRef>
-      <a:fontRef idx="minor"/>
-    </dgm:style>
-  </dgm:styleLbl>
-  <dgm:styleLbl name="solidAlignAcc1">
-    <dgm:scene3d>
-      <a:camera prst="orthographicFront"/>
-      <a:lightRig rig="threePt" dir="t"/>
-    </dgm:scene3d>
-    <dgm:sp3d/>
-    <dgm:txPr/>
-    <dgm:style>
-      <a:lnRef idx="2">
-        <a:scrgbClr r="0" g="0" b="0"/>
-      </a:lnRef>
-      <a:fillRef idx="1">
-        <a:scrgbClr r="0" g="0" b="0"/>
-      </a:fillRef>
-      <a:effectRef idx="0">
-        <a:scrgbClr r="0" g="0" b="0"/>
-      </a:effectRef>
-      <a:fontRef idx="minor"/>
-    </dgm:style>
-  </dgm:styleLbl>
-  <dgm:styleLbl name="solidBgAcc1">
-    <dgm:scene3d>
-      <a:camera prst="orthographicFront"/>
-      <a:lightRig rig="threePt" dir="t"/>
-    </dgm:scene3d>
-    <dgm:sp3d/>
-    <dgm:txPr/>
-    <dgm:style>
-      <a:lnRef idx="2">
-        <a:scrgbClr r="0" g="0" b="0"/>
-      </a:lnRef>
-      <a:fillRef idx="1">
-        <a:scrgbClr r="0" g="0" b="0"/>
-      </a:fillRef>
-      <a:effectRef idx="0">
-        <a:scrgbClr r="0" g="0" b="0"/>
-      </a:effectRef>
-      <a:fontRef idx="minor"/>
-    </dgm:style>
-  </dgm:styleLbl>
-  <dgm:styleLbl name="fgAccFollowNode1">
-    <dgm:scene3d>
-      <a:camera prst="orthographicFront"/>
-      <a:lightRig rig="threePt" dir="t"/>
-    </dgm:scene3d>
-    <dgm:sp3d/>
-    <dgm:txPr/>
-    <dgm:style>
-      <a:lnRef idx="2">
-        <a:scrgbClr r="0" g="0" b="0"/>
-      </a:lnRef>
-      <a:fillRef idx="1">
-        <a:scrgbClr r="0" g="0" b="0"/>
-      </a:fillRef>
-      <a:effectRef idx="0">
-        <a:scrgbClr r="0" g="0" b="0"/>
-      </a:effectRef>
-      <a:fontRef idx="minor"/>
-    </dgm:style>
-  </dgm:styleLbl>
-  <dgm:styleLbl name="alignAccFollowNode1">
-    <dgm:scene3d>
-      <a:camera prst="orthographicFront"/>
-      <a:lightRig rig="threePt" dir="t"/>
-    </dgm:scene3d>
-    <dgm:sp3d/>
-    <dgm:txPr/>
-    <dgm:style>
-      <a:lnRef idx="2">
-        <a:scrgbClr r="0" g="0" b="0"/>
-      </a:lnRef>
-      <a:fillRef idx="1">
-        <a:scrgbClr r="0" g="0" b="0"/>
-      </a:fillRef>
-      <a:effectRef idx="0">
-        <a:scrgbClr r="0" g="0" b="0"/>
-      </a:effectRef>
-      <a:fontRef idx="minor"/>
-    </dgm:style>
-  </dgm:styleLbl>
-  <dgm:styleLbl name="bgAccFollowNode1">
-    <dgm:scene3d>
-      <a:camera prst="orthographicFront"/>
-      <a:lightRig rig="threePt" dir="t"/>
-    </dgm:scene3d>
-    <dgm:sp3d/>
-    <dgm:txPr/>
-    <dgm:style>
-      <a:lnRef idx="2">
-        <a:scrgbClr r="0" g="0" b="0"/>
-      </a:lnRef>
-      <a:fillRef idx="1">
-        <a:scrgbClr r="0" g="0" b="0"/>
-      </a:fillRef>
-      <a:effectRef idx="0">
-        <a:scrgbClr r="0" g="0" b="0"/>
-      </a:effectRef>
-      <a:fontRef idx="minor"/>
-    </dgm:style>
-  </dgm:styleLbl>
-  <dgm:styleLbl name="fgAcc0">
-    <dgm:scene3d>
-      <a:camera prst="orthographicFront"/>
-      <a:lightRig rig="threePt" dir="t"/>
-    </dgm:scene3d>
-    <dgm:sp3d/>
-    <dgm:txPr/>
-    <dgm:style>
-      <a:lnRef idx="2">
-        <a:scrgbClr r="0" g="0" b="0"/>
-      </a:lnRef>
-      <a:fillRef idx="1">
-        <a:scrgbClr r="0" g="0" b="0"/>
-      </a:fillRef>
-      <a:effectRef idx="0">
-        <a:scrgbClr r="0" g="0" b="0"/>
-      </a:effectRef>
-      <a:fontRef idx="minor"/>
-    </dgm:style>
-  </dgm:styleLbl>
-  <dgm:styleLbl name="fgAcc2">
-    <dgm:scene3d>
-      <a:camera prst="orthographicFront"/>
-      <a:lightRig rig="threePt" dir="t"/>
-    </dgm:scene3d>
-    <dgm:sp3d/>
-    <dgm:txPr/>
-    <dgm:style>
-      <a:lnRef idx="2">
-        <a:scrgbClr r="0" g="0" b="0"/>
-      </a:lnRef>
-      <a:fillRef idx="1">
-        <a:scrgbClr r="0" g="0" b="0"/>
-      </a:fillRef>
-      <a:effectRef idx="0">
-        <a:scrgbClr r="0" g="0" b="0"/>
-      </a:effectRef>
-      <a:fontRef idx="minor"/>
-    </dgm:style>
-  </dgm:styleLbl>
-  <dgm:styleLbl name="fgAcc3">
-    <dgm:scene3d>
-      <a:camera prst="orthographicFront"/>
-      <a:lightRig rig="threePt" dir="t"/>
-    </dgm:scene3d>
-    <dgm:sp3d/>
-    <dgm:txPr/>
-    <dgm:style>
-      <a:lnRef idx="2">
-        <a:scrgbClr r="0" g="0" b="0"/>
-      </a:lnRef>
-      <a:fillRef idx="1">
-        <a:scrgbClr r="0" g="0" b="0"/>
-      </a:fillRef>
-      <a:effectRef idx="0">
-        <a:scrgbClr r="0" g="0" b="0"/>
-      </a:effectRef>
-      <a:fontRef idx="minor"/>
-    </dgm:style>
-  </dgm:styleLbl>
-  <dgm:styleLbl name="fgAcc4">
-    <dgm:scene3d>
-      <a:camera prst="orthographicFront"/>
-      <a:lightRig rig="threePt" dir="t"/>
-    </dgm:scene3d>
-    <dgm:sp3d/>
-    <dgm:txPr/>
-    <dgm:style>
-      <a:lnRef idx="2">
-        <a:scrgbClr r="0" g="0" b="0"/>
-      </a:lnRef>
-      <a:fillRef idx="1">
-        <a:scrgbClr r="0" g="0" b="0"/>
-      </a:fillRef>
-      <a:effectRef idx="0">
-        <a:scrgbClr r="0" g="0" b="0"/>
-      </a:effectRef>
-      <a:fontRef idx="minor"/>
-    </dgm:style>
-  </dgm:styleLbl>
-  <dgm:styleLbl name="bgShp">
-    <dgm:scene3d>
-      <a:camera prst="orthographicFront"/>
-      <a:lightRig rig="threePt" dir="t"/>
-    </dgm:scene3d>
-    <dgm:sp3d/>
-    <dgm:txPr/>
-    <dgm:style>
-      <a:lnRef idx="0">
-        <a:scrgbClr r="0" g="0" b="0"/>
-      </a:lnRef>
-      <a:fillRef idx="1">
-        <a:scrgbClr r="0" g="0" b="0"/>
-      </a:fillRef>
-      <a:effectRef idx="0">
-        <a:scrgbClr r="0" g="0" b="0"/>
-      </a:effectRef>
-      <a:fontRef idx="minor"/>
-    </dgm:style>
-  </dgm:styleLbl>
-  <dgm:styleLbl name="dkBgShp">
-    <dgm:scene3d>
-      <a:camera prst="orthographicFront"/>
-      <a:lightRig rig="threePt" dir="t"/>
-    </dgm:scene3d>
-    <dgm:sp3d/>
-    <dgm:txPr/>
-    <dgm:style>
-      <a:lnRef idx="0">
-        <a:scrgbClr r="0" g="0" b="0"/>
-      </a:lnRef>
-      <a:fillRef idx="1">
-        <a:scrgbClr r="0" g="0" b="0"/>
-      </a:fillRef>
-      <a:effectRef idx="0">
-        <a:scrgbClr r="0" g="0" b="0"/>
-      </a:effectRef>
-      <a:fontRef idx="minor"/>
-    </dgm:style>
-  </dgm:styleLbl>
-  <dgm:styleLbl name="trBgShp">
-    <dgm:scene3d>
-      <a:camera prst="orthographicFront"/>
-      <a:lightRig rig="threePt" dir="t"/>
-    </dgm:scene3d>
-    <dgm:sp3d/>
-    <dgm:txPr/>
-    <dgm:style>
-      <a:lnRef idx="0">
-        <a:scrgbClr r="0" g="0" b="0"/>
-      </a:lnRef>
-      <a:fillRef idx="1">
-        <a:scrgbClr r="0" g="0" b="0"/>
-      </a:fillRef>
-      <a:effectRef idx="0">
-        <a:scrgbClr r="0" g="0" b="0"/>
-      </a:effectRef>
-      <a:fontRef idx="minor"/>
-    </dgm:style>
-  </dgm:styleLbl>
-  <dgm:styleLbl name="fgShp">
-    <dgm:scene3d>
-      <a:camera prst="orthographicFront"/>
-      <a:lightRig rig="threePt" dir="t"/>
-    </dgm:scene3d>
-    <dgm:sp3d/>
-    <dgm:txPr/>
-    <dgm:style>
-      <a:lnRef idx="2">
-        <a:scrgbClr r="0" g="0" b="0"/>
-      </a:lnRef>
-      <a:fillRef idx="1">
-        <a:scrgbClr r="0" g="0" b="0"/>
-      </a:fillRef>
-      <a:effectRef idx="0">
-        <a:scrgbClr r="0" g="0" b="0"/>
-      </a:effectRef>
-      <a:fontRef idx="minor"/>
-    </dgm:style>
-  </dgm:styleLbl>
-  <dgm:styleLbl name="revTx">
-    <dgm:scene3d>
-      <a:camera prst="orthographicFront"/>
-      <a:lightRig rig="threePt" dir="t"/>
-    </dgm:scene3d>
-    <dgm:sp3d/>
-    <dgm:txPr/>
-    <dgm:style>
-      <a:lnRef idx="0">
-        <a:scrgbClr r="0" g="0" b="0"/>
-      </a:lnRef>
-      <a:fillRef idx="0">
-        <a:scrgbClr r="0" g="0" b="0"/>
-      </a:fillRef>
-      <a:effectRef idx="0">
-        <a:scrgbClr r="0" g="0" b="0"/>
-      </a:effectRef>
-      <a:fontRef idx="minor"/>
-    </dgm:style>
-  </dgm:styleLbl>
-</dgm:styleDef>
-</file>
-
 <file path=ppt/slideLayouts/slideLayout1.xml><?xml version="1.0" encoding="utf-8"?>
 <p:sldLayout xmlns:a="http://schemas.openxmlformats.org/drawingml/2006/main" xmlns:r="http://schemas.openxmlformats.org/officeDocument/2006/relationships" xmlns:p="http://schemas.openxmlformats.org/presentationml/2006/main" type="title" preserve="1">
   <p:cSld name="Title Slide">
@@ -7287,7 +4302,7 @@
           <a:p>
             <a:fld id="{594BF61B-F633-497E-89E6-831EB66A6863}" type="datetimeFigureOut">
               <a:rPr lang="en-US" smtClean="0"/>
-              <a:t>4/8/2019</a:t>
+              <a:t>4/9/2019</a:t>
             </a:fld>
             <a:endParaRPr lang="en-US"/>
           </a:p>
@@ -7457,7 +4472,7 @@
           <a:p>
             <a:fld id="{594BF61B-F633-497E-89E6-831EB66A6863}" type="datetimeFigureOut">
               <a:rPr lang="en-US" smtClean="0"/>
-              <a:t>4/8/2019</a:t>
+              <a:t>4/9/2019</a:t>
             </a:fld>
             <a:endParaRPr lang="en-US"/>
           </a:p>
@@ -7637,7 +4652,7 @@
           <a:p>
             <a:fld id="{594BF61B-F633-497E-89E6-831EB66A6863}" type="datetimeFigureOut">
               <a:rPr lang="en-US" smtClean="0"/>
-              <a:t>4/8/2019</a:t>
+              <a:t>4/9/2019</a:t>
             </a:fld>
             <a:endParaRPr lang="en-US"/>
           </a:p>
@@ -7807,7 +4822,7 @@
           <a:p>
             <a:fld id="{594BF61B-F633-497E-89E6-831EB66A6863}" type="datetimeFigureOut">
               <a:rPr lang="en-US" smtClean="0"/>
-              <a:t>4/8/2019</a:t>
+              <a:t>4/9/2019</a:t>
             </a:fld>
             <a:endParaRPr lang="en-US"/>
           </a:p>
@@ -8053,7 +5068,7 @@
           <a:p>
             <a:fld id="{594BF61B-F633-497E-89E6-831EB66A6863}" type="datetimeFigureOut">
               <a:rPr lang="en-US" smtClean="0"/>
-              <a:t>4/8/2019</a:t>
+              <a:t>4/9/2019</a:t>
             </a:fld>
             <a:endParaRPr lang="en-US"/>
           </a:p>
@@ -8285,7 +5300,7 @@
           <a:p>
             <a:fld id="{594BF61B-F633-497E-89E6-831EB66A6863}" type="datetimeFigureOut">
               <a:rPr lang="en-US" smtClean="0"/>
-              <a:t>4/8/2019</a:t>
+              <a:t>4/9/2019</a:t>
             </a:fld>
             <a:endParaRPr lang="en-US"/>
           </a:p>
@@ -8652,7 +5667,7 @@
           <a:p>
             <a:fld id="{594BF61B-F633-497E-89E6-831EB66A6863}" type="datetimeFigureOut">
               <a:rPr lang="en-US" smtClean="0"/>
-              <a:t>4/8/2019</a:t>
+              <a:t>4/9/2019</a:t>
             </a:fld>
             <a:endParaRPr lang="en-US"/>
           </a:p>
@@ -8770,7 +5785,7 @@
           <a:p>
             <a:fld id="{594BF61B-F633-497E-89E6-831EB66A6863}" type="datetimeFigureOut">
               <a:rPr lang="en-US" smtClean="0"/>
-              <a:t>4/8/2019</a:t>
+              <a:t>4/9/2019</a:t>
             </a:fld>
             <a:endParaRPr lang="en-US"/>
           </a:p>
@@ -8865,7 +5880,7 @@
           <a:p>
             <a:fld id="{594BF61B-F633-497E-89E6-831EB66A6863}" type="datetimeFigureOut">
               <a:rPr lang="en-US" smtClean="0"/>
-              <a:t>4/8/2019</a:t>
+              <a:t>4/9/2019</a:t>
             </a:fld>
             <a:endParaRPr lang="en-US"/>
           </a:p>
@@ -9142,7 +6157,7 @@
           <a:p>
             <a:fld id="{594BF61B-F633-497E-89E6-831EB66A6863}" type="datetimeFigureOut">
               <a:rPr lang="en-US" smtClean="0"/>
-              <a:t>4/8/2019</a:t>
+              <a:t>4/9/2019</a:t>
             </a:fld>
             <a:endParaRPr lang="en-US"/>
           </a:p>
@@ -9395,7 +6410,7 @@
           <a:p>
             <a:fld id="{594BF61B-F633-497E-89E6-831EB66A6863}" type="datetimeFigureOut">
               <a:rPr lang="en-US" smtClean="0"/>
-              <a:t>4/8/2019</a:t>
+              <a:t>4/9/2019</a:t>
             </a:fld>
             <a:endParaRPr lang="en-US"/>
           </a:p>
@@ -9608,7 +6623,7 @@
           <a:p>
             <a:fld id="{594BF61B-F633-497E-89E6-831EB66A6863}" type="datetimeFigureOut">
               <a:rPr lang="en-US" smtClean="0"/>
-              <a:t>4/8/2019</a:t>
+              <a:t>4/9/2019</a:t>
             </a:fld>
             <a:endParaRPr lang="en-US"/>
           </a:p>
@@ -10148,8 +7163,19 @@
           <a:p>
             <a:r>
               <a:rPr lang="en-US" dirty="0" smtClean="0"/>
-              <a:t>Look at some dashboards</a:t>
-            </a:r>
+              <a:t>Look at some </a:t>
+            </a:r>
+            <a:r>
+              <a:rPr lang="en-US" dirty="0" smtClean="0"/>
+              <a:t>dashboards</a:t>
+            </a:r>
+          </a:p>
+          <a:p>
+            <a:r>
+              <a:rPr lang="en-US" dirty="0" smtClean="0"/>
+              <a:t>Discuss integration with current products</a:t>
+            </a:r>
+            <a:endParaRPr lang="en-US" dirty="0" smtClean="0"/>
           </a:p>
           <a:p>
             <a:r>
@@ -10240,7 +7266,11 @@
             </a:pPr>
             <a:r>
               <a:rPr lang="en-US" dirty="0" smtClean="0"/>
-              <a:t>Show that we can secure image registries based on Active Directory policies.</a:t>
+              <a:t>Show that we can secure image registries based on Active Directory </a:t>
+            </a:r>
+            <a:r>
+              <a:rPr lang="en-US" dirty="0" smtClean="0"/>
+              <a:t>security groups.</a:t>
             </a:r>
             <a:endParaRPr lang="en-US" dirty="0"/>
           </a:p>
@@ -10323,8 +7353,13 @@
           <a:p>
             <a:r>
               <a:rPr lang="en-US" dirty="0" smtClean="0"/>
-              <a:t>How do containers make us more or less secure.</a:t>
-            </a:r>
+              <a:t>How do containers make us more or less </a:t>
+            </a:r>
+            <a:r>
+              <a:rPr lang="en-US" dirty="0" smtClean="0"/>
+              <a:t>secure?</a:t>
+            </a:r>
+            <a:endParaRPr lang="en-US" dirty="0" smtClean="0"/>
           </a:p>
           <a:p>
             <a:r>
@@ -10425,7 +7460,11 @@
           <a:p>
             <a:r>
               <a:rPr lang="en-US" dirty="0" smtClean="0"/>
-              <a:t>Select A Vendor</a:t>
+              <a:t>Select A </a:t>
+            </a:r>
+            <a:r>
+              <a:rPr lang="en-US" dirty="0" smtClean="0"/>
+              <a:t>Primary Vendor</a:t>
             </a:r>
             <a:endParaRPr lang="en-US" dirty="0"/>
           </a:p>
@@ -10672,8 +7711,18 @@
           </a:p>
           <a:p>
             <a:r>
+              <a:rPr lang="en-US" dirty="0"/>
+              <a:t>Need resources deployed</a:t>
+            </a:r>
+          </a:p>
+          <a:p>
+            <a:r>
               <a:rPr lang="en-US" dirty="0" smtClean="0"/>
-              <a:t>Efficiency is good</a:t>
+              <a:t>Efficiency </a:t>
+            </a:r>
+            <a:r>
+              <a:rPr lang="en-US" dirty="0" smtClean="0"/>
+              <a:t>is good</a:t>
             </a:r>
           </a:p>
           <a:p>
@@ -10683,13 +7732,7 @@
             </a:r>
             <a:r>
               <a:rPr lang="en-US" dirty="0"/>
-              <a:t>resources deployed</a:t>
-            </a:r>
-          </a:p>
-          <a:p>
-            <a:r>
-              <a:rPr lang="en-US" dirty="0"/>
-              <a:t>Need minimal orchestration</a:t>
+              <a:t>minimal orchestration</a:t>
             </a:r>
           </a:p>
           <a:p>
@@ -10764,8 +7807,18 @@
           </a:p>
           <a:p>
             <a:r>
+              <a:rPr lang="en-US" dirty="0"/>
+              <a:t>Need a pit of success to fall into</a:t>
+            </a:r>
+          </a:p>
+          <a:p>
+            <a:r>
               <a:rPr lang="en-US" dirty="0" smtClean="0"/>
-              <a:t>Efficiency is key</a:t>
+              <a:t>Efficiency </a:t>
+            </a:r>
+            <a:r>
+              <a:rPr lang="en-US" dirty="0" smtClean="0"/>
+              <a:t>is key</a:t>
             </a:r>
           </a:p>
           <a:p>
@@ -10775,13 +7828,7 @@
             </a:r>
             <a:r>
               <a:rPr lang="en-US" dirty="0"/>
-              <a:t>a pit of success to fall into</a:t>
-            </a:r>
-          </a:p>
-          <a:p>
-            <a:r>
-              <a:rPr lang="en-US" dirty="0"/>
-              <a:t>Need complex orchestration</a:t>
+              <a:t>complex orchestration</a:t>
             </a:r>
           </a:p>
           <a:p>
@@ -10799,7 +7846,11 @@
           <a:p>
             <a:r>
               <a:rPr lang="en-US" dirty="0" smtClean="0"/>
-              <a:t>Need to iterate ASAP</a:t>
+              <a:t>Need to iterate </a:t>
+            </a:r>
+            <a:r>
+              <a:rPr lang="en-US" dirty="0" smtClean="0"/>
+              <a:t>frequently</a:t>
             </a:r>
             <a:endParaRPr lang="en-US" dirty="0"/>
           </a:p>
@@ -10886,8 +7937,20 @@
               <a:buNone/>
             </a:pPr>
             <a:r>
+              <a:rPr lang="en-US" b="1" dirty="0"/>
+              <a:t>Phase 1: </a:t>
+            </a:r>
+            <a:r>
               <a:rPr lang="en-US" b="1" dirty="0" smtClean="0"/>
-              <a:t>Support Vendor Applications</a:t>
+              <a:t> Support </a:t>
+            </a:r>
+            <a:r>
+              <a:rPr lang="en-US" b="1" dirty="0" smtClean="0"/>
+              <a:t>Vendor </a:t>
+            </a:r>
+            <a:r>
+              <a:rPr lang="en-US" b="1" dirty="0" smtClean="0"/>
+              <a:t>Application Deployment</a:t>
             </a:r>
           </a:p>
           <a:p>
@@ -10907,7 +7970,11 @@
             </a:pPr>
             <a:r>
               <a:rPr lang="en-US" dirty="0" smtClean="0"/>
-              <a:t>Begin supporting manual deployments</a:t>
+              <a:t>Begin </a:t>
+            </a:r>
+            <a:r>
+              <a:rPr lang="en-US" dirty="0" smtClean="0"/>
+              <a:t>supporting manual deployments</a:t>
             </a:r>
           </a:p>
           <a:p>
@@ -10942,9 +8009,22 @@
               <a:buNone/>
             </a:pPr>
             <a:r>
+              <a:rPr lang="en-US" b="1" dirty="0"/>
+              <a:t>Phase </a:t>
+            </a:r>
+            <a:r>
               <a:rPr lang="en-US" b="1" dirty="0" smtClean="0"/>
-              <a:t>Support Development Teams</a:t>
-            </a:r>
+              <a:t>2:  Support </a:t>
+            </a:r>
+            <a:r>
+              <a:rPr lang="en-US" b="1" dirty="0" smtClean="0"/>
+              <a:t>Development </a:t>
+            </a:r>
+            <a:r>
+              <a:rPr lang="en-US" b="1" dirty="0" smtClean="0"/>
+              <a:t>Team Integration</a:t>
+            </a:r>
+            <a:endParaRPr lang="en-US" b="1" dirty="0" smtClean="0"/>
           </a:p>
           <a:p>
             <a:pPr marL="514350" indent="-514350">
@@ -10953,8 +8033,17 @@
             </a:pPr>
             <a:r>
               <a:rPr lang="en-US" dirty="0" smtClean="0"/>
-              <a:t>Install Docker for Desktop (consider this much earlier)</a:t>
-            </a:r>
+              <a:t>Docker </a:t>
+            </a:r>
+            <a:r>
+              <a:rPr lang="en-US" dirty="0" smtClean="0"/>
+              <a:t>for </a:t>
+            </a:r>
+            <a:r>
+              <a:rPr lang="en-US" dirty="0" smtClean="0"/>
+              <a:t>Desktop</a:t>
+            </a:r>
+            <a:endParaRPr lang="en-US" dirty="0" smtClean="0"/>
           </a:p>
           <a:p>
             <a:pPr marL="514350" indent="-514350">
@@ -11010,110 +8099,6 @@
           <p:cNvPr id="2" name="Title 1">
             <a:extLst>
               <a:ext uri="{FF2B5EF4-FFF2-40B4-BE49-F238E27FC236}">
-                <a16:creationId xmlns:a16="http://schemas.microsoft.com/office/drawing/2014/main" id="{0CC70382-4DBB-49E9-988B-0AB567C046AF}"/>
-              </a:ext>
-            </a:extLst>
-          </p:cNvPr>
-          <p:cNvSpPr>
-            <a:spLocks noGrp="1"/>
-          </p:cNvSpPr>
-          <p:nvPr>
-            <p:ph type="title"/>
-          </p:nvPr>
-        </p:nvSpPr>
-        <p:spPr/>
-        <p:txBody>
-          <a:bodyPr/>
-          <a:lstStyle/>
-          <a:p>
-            <a:r>
-              <a:rPr lang="en-US" dirty="0"/>
-              <a:t>Development </a:t>
-            </a:r>
-            <a:r>
-              <a:rPr lang="en-US" dirty="0" smtClean="0"/>
-              <a:t>Operations:  </a:t>
-            </a:r>
-            <a:r>
-              <a:rPr lang="en-US" dirty="0" smtClean="0"/>
-              <a:t>The </a:t>
-            </a:r>
-            <a:r>
-              <a:rPr lang="en-US" dirty="0"/>
-              <a:t>Inner Loop</a:t>
-            </a:r>
-          </a:p>
-        </p:txBody>
-      </p:sp>
-      <p:graphicFrame>
-        <p:nvGraphicFramePr>
-          <p:cNvPr id="4" name="Content Placeholder 3">
-            <a:extLst>
-              <a:ext uri="{FF2B5EF4-FFF2-40B4-BE49-F238E27FC236}">
-                <a16:creationId xmlns:a16="http://schemas.microsoft.com/office/drawing/2014/main" id="{7304DDB0-877B-4737-B668-33B57ABD6D14}"/>
-              </a:ext>
-            </a:extLst>
-          </p:cNvPr>
-          <p:cNvGraphicFramePr>
-            <a:graphicFrameLocks noGrp="1"/>
-          </p:cNvGraphicFramePr>
-          <p:nvPr>
-            <p:ph idx="1"/>
-            <p:extLst/>
-          </p:nvPr>
-        </p:nvGraphicFramePr>
-        <p:xfrm>
-          <a:off x="838200" y="1825625"/>
-          <a:ext cx="10515600" cy="4351338"/>
-        </p:xfrm>
-        <a:graphic>
-          <a:graphicData uri="http://schemas.openxmlformats.org/drawingml/2006/diagram">
-            <dgm:relIds xmlns:dgm="http://schemas.openxmlformats.org/drawingml/2006/diagram" xmlns:r="http://schemas.openxmlformats.org/officeDocument/2006/relationships" r:dm="rId2" r:lo="rId3" r:qs="rId4" r:cs="rId5"/>
-          </a:graphicData>
-        </a:graphic>
-      </p:graphicFrame>
-    </p:spTree>
-    <p:extLst>
-      <p:ext uri="{BB962C8B-B14F-4D97-AF65-F5344CB8AC3E}">
-        <p14:creationId xmlns:p14="http://schemas.microsoft.com/office/powerpoint/2010/main" val="4004470912"/>
-      </p:ext>
-    </p:extLst>
-  </p:cSld>
-  <p:clrMapOvr>
-    <a:masterClrMapping/>
-  </p:clrMapOvr>
-  <p:timing>
-    <p:tnLst>
-      <p:par>
-        <p:cTn id="1" dur="indefinite" restart="never" nodeType="tmRoot"/>
-      </p:par>
-    </p:tnLst>
-  </p:timing>
-</p:sld>
-</file>
-
-<file path=ppt/slides/slide18.xml><?xml version="1.0" encoding="utf-8"?>
-<p:sld xmlns:a="http://schemas.openxmlformats.org/drawingml/2006/main" xmlns:r="http://schemas.openxmlformats.org/officeDocument/2006/relationships" xmlns:p="http://schemas.openxmlformats.org/presentationml/2006/main">
-  <p:cSld>
-    <p:spTree>
-      <p:nvGrpSpPr>
-        <p:cNvPr id="1" name=""/>
-        <p:cNvGrpSpPr/>
-        <p:nvPr/>
-      </p:nvGrpSpPr>
-      <p:grpSpPr>
-        <a:xfrm>
-          <a:off x="0" y="0"/>
-          <a:ext cx="0" cy="0"/>
-          <a:chOff x="0" y="0"/>
-          <a:chExt cx="0" cy="0"/>
-        </a:xfrm>
-      </p:grpSpPr>
-      <p:sp>
-        <p:nvSpPr>
-          <p:cNvPr id="2" name="Title 1">
-            <a:extLst>
-              <a:ext uri="{FF2B5EF4-FFF2-40B4-BE49-F238E27FC236}">
                 <a16:creationId xmlns:a16="http://schemas.microsoft.com/office/drawing/2014/main" id="{3EFB5B40-C168-4DA5-ABDD-C34D96123F6F}"/>
               </a:ext>
             </a:extLst>
@@ -11155,8 +8140,8 @@
         </p:nvGrpSpPr>
         <p:grpSpPr>
           <a:xfrm>
-            <a:off x="447842" y="5019194"/>
-            <a:ext cx="1181100" cy="1181100"/>
+            <a:off x="280287" y="5019194"/>
+            <a:ext cx="1348655" cy="1348655"/>
             <a:chOff x="1281113" y="3599657"/>
             <a:chExt cx="1181100" cy="1181100"/>
           </a:xfrm>
@@ -11931,20 +8916,24 @@
             </a:fontRef>
           </p:style>
           <p:txBody>
-            <a:bodyPr rtlCol="0" anchor="ctr"/>
+            <a:bodyPr rtlCol="0" anchor="t"/>
             <a:lstStyle/>
             <a:p>
               <a:pPr algn="ctr"/>
+              <a:r>
+                <a:rPr lang="en-US" dirty="0" smtClean="0"/>
+                <a:t>Docker Hosts</a:t>
+              </a:r>
               <a:endParaRPr lang="en-US" dirty="0"/>
             </a:p>
           </p:txBody>
         </p:sp>
         <p:sp>
           <p:nvSpPr>
-            <p:cNvPr id="31" name="Rectangle 30">
+            <p:cNvPr id="35" name="Rectangle 34">
               <a:extLst>
                 <a:ext uri="{FF2B5EF4-FFF2-40B4-BE49-F238E27FC236}">
-                  <a16:creationId xmlns:a16="http://schemas.microsoft.com/office/drawing/2014/main" id="{3255094C-8239-45FE-9F52-E0C787DE338B}"/>
+                  <a16:creationId xmlns:a16="http://schemas.microsoft.com/office/drawing/2014/main" id="{3BC202CD-E443-4B4A-A779-5E25843DED97}"/>
                 </a:ext>
               </a:extLst>
             </p:cNvPr>
@@ -11953,7 +8942,62 @@
           </p:nvSpPr>
           <p:spPr>
             <a:xfrm>
-              <a:off x="9753600" y="2399672"/>
+              <a:off x="9732063" y="2690873"/>
+              <a:ext cx="1990558" cy="414474"/>
+            </a:xfrm>
+            <a:prstGeom prst="rect">
+              <a:avLst/>
+            </a:prstGeom>
+            <a:solidFill>
+              <a:schemeClr val="bg2">
+                <a:lumMod val="75000"/>
+              </a:schemeClr>
+            </a:solidFill>
+          </p:spPr>
+          <p:style>
+            <a:lnRef idx="2">
+              <a:schemeClr val="accent1">
+                <a:shade val="50000"/>
+              </a:schemeClr>
+            </a:lnRef>
+            <a:fillRef idx="1">
+              <a:schemeClr val="accent1"/>
+            </a:fillRef>
+            <a:effectRef idx="0">
+              <a:schemeClr val="accent1"/>
+            </a:effectRef>
+            <a:fontRef idx="minor">
+              <a:schemeClr val="lt1"/>
+            </a:fontRef>
+          </p:style>
+          <p:txBody>
+            <a:bodyPr rtlCol="0" anchor="ctr"/>
+            <a:lstStyle/>
+            <a:p>
+              <a:pPr algn="ctr"/>
+              <a:r>
+                <a:rPr lang="en-US" dirty="0" smtClean="0"/>
+                <a:t>Desktop</a:t>
+              </a:r>
+              <a:endParaRPr lang="en-US" dirty="0"/>
+            </a:p>
+          </p:txBody>
+        </p:sp>
+        <p:sp>
+          <p:nvSpPr>
+            <p:cNvPr id="36" name="Rectangle 35">
+              <a:extLst>
+                <a:ext uri="{FF2B5EF4-FFF2-40B4-BE49-F238E27FC236}">
+                  <a16:creationId xmlns:a16="http://schemas.microsoft.com/office/drawing/2014/main" id="{E6113020-BE87-41C8-819D-28B50CF4F79C}"/>
+                </a:ext>
+              </a:extLst>
+            </p:cNvPr>
+            <p:cNvSpPr/>
+            <p:nvPr/>
+          </p:nvSpPr>
+          <p:spPr>
+            <a:xfrm>
+              <a:off x="9732063" y="3169171"/>
               <a:ext cx="1990558" cy="414474"/>
             </a:xfrm>
             <a:prstGeom prst="rect">
@@ -11988,17 +9032,22 @@
               <a:pPr algn="ctr"/>
               <a:r>
                 <a:rPr lang="en-US" dirty="0"/>
-                <a:t>UAT Environment</a:t>
+                <a:t>Test </a:t>
               </a:r>
+              <a:r>
+                <a:rPr lang="en-US" dirty="0" err="1" smtClean="0"/>
+                <a:t>Env</a:t>
+              </a:r>
+              <a:endParaRPr lang="en-US" dirty="0"/>
             </a:p>
           </p:txBody>
         </p:sp>
         <p:sp>
           <p:nvSpPr>
-            <p:cNvPr id="34" name="Rectangle 33">
+            <p:cNvPr id="37" name="Rectangle 36">
               <a:extLst>
                 <a:ext uri="{FF2B5EF4-FFF2-40B4-BE49-F238E27FC236}">
-                  <a16:creationId xmlns:a16="http://schemas.microsoft.com/office/drawing/2014/main" id="{113F8BAF-AB23-40D9-B9C0-1332F3FCB0A7}"/>
+                  <a16:creationId xmlns:a16="http://schemas.microsoft.com/office/drawing/2014/main" id="{C30FAE3B-E988-42C8-90B8-CAAA8DB966D0}"/>
                 </a:ext>
               </a:extLst>
             </p:cNvPr>
@@ -12007,7 +9056,7 @@
           </p:nvSpPr>
           <p:spPr>
             <a:xfrm>
-              <a:off x="9753600" y="2877969"/>
+              <a:off x="9732063" y="3647467"/>
               <a:ext cx="1990558" cy="414474"/>
             </a:xfrm>
             <a:prstGeom prst="rect">
@@ -12042,17 +9091,22 @@
               <a:pPr algn="ctr"/>
               <a:r>
                 <a:rPr lang="en-US" dirty="0"/>
-                <a:t>Production Server</a:t>
+                <a:t>UAT </a:t>
               </a:r>
+              <a:r>
+                <a:rPr lang="en-US" dirty="0" err="1"/>
+                <a:t>Env</a:t>
+              </a:r>
+              <a:endParaRPr lang="en-US" dirty="0"/>
             </a:p>
           </p:txBody>
         </p:sp>
         <p:sp>
           <p:nvSpPr>
-            <p:cNvPr id="35" name="Rectangle 34">
+            <p:cNvPr id="38" name="Rectangle 37">
               <a:extLst>
                 <a:ext uri="{FF2B5EF4-FFF2-40B4-BE49-F238E27FC236}">
-                  <a16:creationId xmlns:a16="http://schemas.microsoft.com/office/drawing/2014/main" id="{3BC202CD-E443-4B4A-A779-5E25843DED97}"/>
+                  <a16:creationId xmlns:a16="http://schemas.microsoft.com/office/drawing/2014/main" id="{99A24083-AED4-4397-85FB-13813AFABCCD}"/>
                 </a:ext>
               </a:extLst>
             </p:cNvPr>
@@ -12061,7 +9115,7 @@
           </p:nvSpPr>
           <p:spPr>
             <a:xfrm>
-              <a:off x="9753600" y="3356266"/>
+              <a:off x="9732063" y="4125764"/>
               <a:ext cx="1990558" cy="414474"/>
             </a:xfrm>
             <a:prstGeom prst="rect">
@@ -12095,18 +9149,23 @@
             <a:p>
               <a:pPr algn="ctr"/>
               <a:r>
-                <a:rPr lang="en-US" dirty="0"/>
-                <a:t>Container Service</a:t>
+                <a:rPr lang="en-US" dirty="0" smtClean="0"/>
+                <a:t>On </a:t>
               </a:r>
+              <a:r>
+                <a:rPr lang="en-US" dirty="0" err="1" smtClean="0"/>
+                <a:t>Premisis</a:t>
+              </a:r>
+              <a:endParaRPr lang="en-US" dirty="0"/>
             </a:p>
           </p:txBody>
         </p:sp>
         <p:sp>
           <p:nvSpPr>
-            <p:cNvPr id="36" name="Rectangle 35">
+            <p:cNvPr id="39" name="Rectangle 38">
               <a:extLst>
                 <a:ext uri="{FF2B5EF4-FFF2-40B4-BE49-F238E27FC236}">
-                  <a16:creationId xmlns:a16="http://schemas.microsoft.com/office/drawing/2014/main" id="{E6113020-BE87-41C8-819D-28B50CF4F79C}"/>
+                  <a16:creationId xmlns:a16="http://schemas.microsoft.com/office/drawing/2014/main" id="{23562B93-69A8-46D2-8539-5762C2457EEA}"/>
                 </a:ext>
               </a:extLst>
             </p:cNvPr>
@@ -12115,7 +9174,7 @@
           </p:nvSpPr>
           <p:spPr>
             <a:xfrm>
-              <a:off x="9753600" y="3834563"/>
+              <a:off x="9732063" y="4604062"/>
               <a:ext cx="1990558" cy="414474"/>
             </a:xfrm>
             <a:prstGeom prst="rect">
@@ -12149,171 +9208,14 @@
             <a:p>
               <a:pPr algn="ctr"/>
               <a:r>
-                <a:rPr lang="en-US" dirty="0"/>
-                <a:t>Service Fabric</a:t>
+                <a:rPr lang="en-US" dirty="0" smtClean="0"/>
+                <a:t>Off </a:t>
               </a:r>
-            </a:p>
-          </p:txBody>
-        </p:sp>
-        <p:sp>
-          <p:nvSpPr>
-            <p:cNvPr id="37" name="Rectangle 36">
-              <a:extLst>
-                <a:ext uri="{FF2B5EF4-FFF2-40B4-BE49-F238E27FC236}">
-                  <a16:creationId xmlns:a16="http://schemas.microsoft.com/office/drawing/2014/main" id="{C30FAE3B-E988-42C8-90B8-CAAA8DB966D0}"/>
-                </a:ext>
-              </a:extLst>
-            </p:cNvPr>
-            <p:cNvSpPr/>
-            <p:nvPr/>
-          </p:nvSpPr>
-          <p:spPr>
-            <a:xfrm>
-              <a:off x="9753600" y="4312860"/>
-              <a:ext cx="1990558" cy="414474"/>
-            </a:xfrm>
-            <a:prstGeom prst="rect">
-              <a:avLst/>
-            </a:prstGeom>
-            <a:solidFill>
-              <a:schemeClr val="bg2">
-                <a:lumMod val="75000"/>
-              </a:schemeClr>
-            </a:solidFill>
-          </p:spPr>
-          <p:style>
-            <a:lnRef idx="2">
-              <a:schemeClr val="accent1">
-                <a:shade val="50000"/>
-              </a:schemeClr>
-            </a:lnRef>
-            <a:fillRef idx="1">
-              <a:schemeClr val="accent1"/>
-            </a:fillRef>
-            <a:effectRef idx="0">
-              <a:schemeClr val="accent1"/>
-            </a:effectRef>
-            <a:fontRef idx="minor">
-              <a:schemeClr val="lt1"/>
-            </a:fontRef>
-          </p:style>
-          <p:txBody>
-            <a:bodyPr rtlCol="0" anchor="ctr"/>
-            <a:lstStyle/>
-            <a:p>
-              <a:pPr algn="ctr"/>
               <a:r>
-                <a:rPr lang="en-US" dirty="0"/>
-                <a:t>Batch</a:t>
+                <a:rPr lang="en-US" dirty="0" err="1" smtClean="0"/>
+                <a:t>Premisis</a:t>
               </a:r>
-            </a:p>
-          </p:txBody>
-        </p:sp>
-        <p:sp>
-          <p:nvSpPr>
-            <p:cNvPr id="38" name="Rectangle 37">
-              <a:extLst>
-                <a:ext uri="{FF2B5EF4-FFF2-40B4-BE49-F238E27FC236}">
-                  <a16:creationId xmlns:a16="http://schemas.microsoft.com/office/drawing/2014/main" id="{99A24083-AED4-4397-85FB-13813AFABCCD}"/>
-                </a:ext>
-              </a:extLst>
-            </p:cNvPr>
-            <p:cNvSpPr/>
-            <p:nvPr/>
-          </p:nvSpPr>
-          <p:spPr>
-            <a:xfrm>
-              <a:off x="9753600" y="4791157"/>
-              <a:ext cx="1990558" cy="414474"/>
-            </a:xfrm>
-            <a:prstGeom prst="rect">
-              <a:avLst/>
-            </a:prstGeom>
-            <a:solidFill>
-              <a:schemeClr val="bg2">
-                <a:lumMod val="75000"/>
-              </a:schemeClr>
-            </a:solidFill>
-          </p:spPr>
-          <p:style>
-            <a:lnRef idx="2">
-              <a:schemeClr val="accent1">
-                <a:shade val="50000"/>
-              </a:schemeClr>
-            </a:lnRef>
-            <a:fillRef idx="1">
-              <a:schemeClr val="accent1"/>
-            </a:fillRef>
-            <a:effectRef idx="0">
-              <a:schemeClr val="accent1"/>
-            </a:effectRef>
-            <a:fontRef idx="minor">
-              <a:schemeClr val="lt1"/>
-            </a:fontRef>
-          </p:style>
-          <p:txBody>
-            <a:bodyPr rtlCol="0" anchor="ctr"/>
-            <a:lstStyle/>
-            <a:p>
-              <a:pPr algn="ctr"/>
-              <a:r>
-                <a:rPr lang="en-US" dirty="0"/>
-                <a:t>App Services</a:t>
-              </a:r>
-            </a:p>
-          </p:txBody>
-        </p:sp>
-        <p:sp>
-          <p:nvSpPr>
-            <p:cNvPr id="39" name="Rectangle 38">
-              <a:extLst>
-                <a:ext uri="{FF2B5EF4-FFF2-40B4-BE49-F238E27FC236}">
-                  <a16:creationId xmlns:a16="http://schemas.microsoft.com/office/drawing/2014/main" id="{23562B93-69A8-46D2-8539-5762C2457EEA}"/>
-                </a:ext>
-              </a:extLst>
-            </p:cNvPr>
-            <p:cNvSpPr/>
-            <p:nvPr/>
-          </p:nvSpPr>
-          <p:spPr>
-            <a:xfrm>
-              <a:off x="9753600" y="5269454"/>
-              <a:ext cx="1990558" cy="414474"/>
-            </a:xfrm>
-            <a:prstGeom prst="rect">
-              <a:avLst/>
-            </a:prstGeom>
-            <a:solidFill>
-              <a:schemeClr val="bg2">
-                <a:lumMod val="75000"/>
-              </a:schemeClr>
-            </a:solidFill>
-          </p:spPr>
-          <p:style>
-            <a:lnRef idx="2">
-              <a:schemeClr val="accent1">
-                <a:shade val="50000"/>
-              </a:schemeClr>
-            </a:lnRef>
-            <a:fillRef idx="1">
-              <a:schemeClr val="accent1"/>
-            </a:fillRef>
-            <a:effectRef idx="0">
-              <a:schemeClr val="accent1"/>
-            </a:effectRef>
-            <a:fontRef idx="minor">
-              <a:schemeClr val="lt1"/>
-            </a:fontRef>
-          </p:style>
-          <p:txBody>
-            <a:bodyPr rtlCol="0" anchor="ctr"/>
-            <a:lstStyle/>
-            <a:p>
-              <a:pPr algn="ctr"/>
-              <a:r>
-                <a:rPr lang="en-US" dirty="0"/>
-                <a:t>Coming Soon</a:t>
-              </a:r>
+              <a:endParaRPr lang="en-US" dirty="0"/>
             </a:p>
           </p:txBody>
         </p:sp>
@@ -12427,7 +9329,7 @@
             </a:avLst>
           </a:prstGeom>
           <a:solidFill>
-            <a:srgbClr val="00B0F0"/>
+            <a:srgbClr val="FF0000"/>
           </a:solidFill>
           <a:ln>
             <a:noFill/>
@@ -13485,8 +10387,13 @@
           <a:p>
             <a:r>
               <a:rPr lang="en-US" dirty="0"/>
-              <a:t>Figure out budgeting</a:t>
-            </a:r>
+              <a:t>Figure out </a:t>
+            </a:r>
+            <a:r>
+              <a:rPr lang="en-US" dirty="0" smtClean="0"/>
+              <a:t>budgeting / licensing</a:t>
+            </a:r>
+            <a:endParaRPr lang="en-US" dirty="0"/>
           </a:p>
           <a:p>
             <a:r>
@@ -13496,26 +10403,18 @@
           </a:p>
           <a:p>
             <a:r>
+              <a:rPr lang="en-US" dirty="0" smtClean="0"/>
+              <a:t>Build out vendor app support</a:t>
+            </a:r>
+          </a:p>
+          <a:p>
+            <a:r>
+              <a:rPr lang="en-US" dirty="0" smtClean="0"/>
+              <a:t>Build </a:t>
+            </a:r>
+            <a:r>
               <a:rPr lang="en-US" dirty="0"/>
-              <a:t>Build a devops pipeline</a:t>
-            </a:r>
-          </a:p>
-          <a:p>
-            <a:r>
-              <a:rPr lang="en-US" dirty="0"/>
-              <a:t>Include multi-platform support</a:t>
-            </a:r>
-          </a:p>
-          <a:p>
-            <a:r>
-              <a:rPr lang="en-US" dirty="0"/>
-              <a:t>Extensive testing</a:t>
-            </a:r>
-          </a:p>
-          <a:p>
-            <a:r>
-              <a:rPr lang="en-US" dirty="0"/>
-              <a:t>General release</a:t>
+              <a:t>a devops pipeline</a:t>
             </a:r>
           </a:p>
           <a:p>
@@ -13904,7 +10803,15 @@
           <a:p>
             <a:r>
               <a:rPr lang="en-US" dirty="0" smtClean="0"/>
-              <a:t>Let the vendor figure demonstrate how to make container images.</a:t>
+              <a:t>Let the vendor </a:t>
+            </a:r>
+            <a:r>
+              <a:rPr lang="en-US" dirty="0" smtClean="0"/>
+              <a:t>demonstrate </a:t>
+            </a:r>
+            <a:r>
+              <a:rPr lang="en-US" dirty="0" smtClean="0"/>
+              <a:t>how to make container images.</a:t>
             </a:r>
             <a:endParaRPr lang="en-US" dirty="0"/>
           </a:p>

</xml_diff>

<commit_message>
Finished styling and animating, including fixing minor goofs.
</commit_message>
<xml_diff>
--- a/Docker Proofs of Concept.pptx
+++ b/Docker Proofs of Concept.pptx
@@ -11113,12 +11113,31 @@
           <a:bodyPr/>
           <a:lstStyle/>
           <a:p>
-            <a:pPr marL="0" indent="0">
-              <a:buNone/>
-            </a:pPr>
             <a:r>
               <a:rPr lang="en-US" dirty="0"/>
-              <a:t>Show that we can secure image registries based on Active Directory policies.</a:t>
+              <a:t>Kubernetes Cluster Security</a:t>
+            </a:r>
+          </a:p>
+          <a:p>
+            <a:r>
+              <a:rPr lang="en-US" dirty="0"/>
+              <a:t>Deployment Security</a:t>
+            </a:r>
+          </a:p>
+          <a:p>
+            <a:r>
+              <a:rPr lang="en-US" dirty="0"/>
+              <a:t>Private Container Registry Security</a:t>
+            </a:r>
+          </a:p>
+          <a:p>
+            <a:r>
+              <a:rPr lang="en-US" dirty="0" err="1"/>
+              <a:t>Etc</a:t>
+            </a:r>
+            <a:r>
+              <a:rPr lang="en-US" dirty="0"/>
+              <a:t>…</a:t>
             </a:r>
           </a:p>
         </p:txBody>
@@ -11133,6 +11152,283 @@
   <p:clrMapOvr>
     <a:masterClrMapping/>
   </p:clrMapOvr>
+  <p:timing>
+    <p:tnLst>
+      <p:par>
+        <p:cTn id="1" dur="indefinite" restart="never" nodeType="tmRoot">
+          <p:childTnLst>
+            <p:seq concurrent="1" nextAc="seek">
+              <p:cTn id="2" dur="indefinite" nodeType="mainSeq">
+                <p:childTnLst>
+                  <p:par>
+                    <p:cTn id="3" fill="hold">
+                      <p:stCondLst>
+                        <p:cond delay="indefinite"/>
+                      </p:stCondLst>
+                      <p:childTnLst>
+                        <p:par>
+                          <p:cTn id="4" fill="hold">
+                            <p:stCondLst>
+                              <p:cond delay="0"/>
+                            </p:stCondLst>
+                            <p:childTnLst>
+                              <p:par>
+                                <p:cTn id="5" presetID="10" presetClass="entr" presetSubtype="0" fill="hold" grpId="0" nodeType="clickEffect">
+                                  <p:stCondLst>
+                                    <p:cond delay="0"/>
+                                  </p:stCondLst>
+                                  <p:childTnLst>
+                                    <p:set>
+                                      <p:cBhvr>
+                                        <p:cTn id="6" dur="1" fill="hold">
+                                          <p:stCondLst>
+                                            <p:cond delay="0"/>
+                                          </p:stCondLst>
+                                        </p:cTn>
+                                        <p:tgtEl>
+                                          <p:spTgt spid="3">
+                                            <p:txEl>
+                                              <p:pRg st="0" end="0"/>
+                                            </p:txEl>
+                                          </p:spTgt>
+                                        </p:tgtEl>
+                                        <p:attrNameLst>
+                                          <p:attrName>style.visibility</p:attrName>
+                                        </p:attrNameLst>
+                                      </p:cBhvr>
+                                      <p:to>
+                                        <p:strVal val="visible"/>
+                                      </p:to>
+                                    </p:set>
+                                    <p:animEffect transition="in" filter="fade">
+                                      <p:cBhvr>
+                                        <p:cTn id="7" dur="500"/>
+                                        <p:tgtEl>
+                                          <p:spTgt spid="3">
+                                            <p:txEl>
+                                              <p:pRg st="0" end="0"/>
+                                            </p:txEl>
+                                          </p:spTgt>
+                                        </p:tgtEl>
+                                      </p:cBhvr>
+                                    </p:animEffect>
+                                  </p:childTnLst>
+                                </p:cTn>
+                              </p:par>
+                            </p:childTnLst>
+                          </p:cTn>
+                        </p:par>
+                      </p:childTnLst>
+                    </p:cTn>
+                  </p:par>
+                  <p:par>
+                    <p:cTn id="8" fill="hold">
+                      <p:stCondLst>
+                        <p:cond delay="indefinite"/>
+                      </p:stCondLst>
+                      <p:childTnLst>
+                        <p:par>
+                          <p:cTn id="9" fill="hold">
+                            <p:stCondLst>
+                              <p:cond delay="0"/>
+                            </p:stCondLst>
+                            <p:childTnLst>
+                              <p:par>
+                                <p:cTn id="10" presetID="10" presetClass="entr" presetSubtype="0" fill="hold" grpId="0" nodeType="clickEffect">
+                                  <p:stCondLst>
+                                    <p:cond delay="0"/>
+                                  </p:stCondLst>
+                                  <p:childTnLst>
+                                    <p:set>
+                                      <p:cBhvr>
+                                        <p:cTn id="11" dur="1" fill="hold">
+                                          <p:stCondLst>
+                                            <p:cond delay="0"/>
+                                          </p:stCondLst>
+                                        </p:cTn>
+                                        <p:tgtEl>
+                                          <p:spTgt spid="3">
+                                            <p:txEl>
+                                              <p:pRg st="1" end="1"/>
+                                            </p:txEl>
+                                          </p:spTgt>
+                                        </p:tgtEl>
+                                        <p:attrNameLst>
+                                          <p:attrName>style.visibility</p:attrName>
+                                        </p:attrNameLst>
+                                      </p:cBhvr>
+                                      <p:to>
+                                        <p:strVal val="visible"/>
+                                      </p:to>
+                                    </p:set>
+                                    <p:animEffect transition="in" filter="fade">
+                                      <p:cBhvr>
+                                        <p:cTn id="12" dur="500"/>
+                                        <p:tgtEl>
+                                          <p:spTgt spid="3">
+                                            <p:txEl>
+                                              <p:pRg st="1" end="1"/>
+                                            </p:txEl>
+                                          </p:spTgt>
+                                        </p:tgtEl>
+                                      </p:cBhvr>
+                                    </p:animEffect>
+                                  </p:childTnLst>
+                                </p:cTn>
+                              </p:par>
+                            </p:childTnLst>
+                          </p:cTn>
+                        </p:par>
+                      </p:childTnLst>
+                    </p:cTn>
+                  </p:par>
+                  <p:par>
+                    <p:cTn id="13" fill="hold">
+                      <p:stCondLst>
+                        <p:cond delay="indefinite"/>
+                      </p:stCondLst>
+                      <p:childTnLst>
+                        <p:par>
+                          <p:cTn id="14" fill="hold">
+                            <p:stCondLst>
+                              <p:cond delay="0"/>
+                            </p:stCondLst>
+                            <p:childTnLst>
+                              <p:par>
+                                <p:cTn id="15" presetID="10" presetClass="entr" presetSubtype="0" fill="hold" grpId="0" nodeType="clickEffect">
+                                  <p:stCondLst>
+                                    <p:cond delay="0"/>
+                                  </p:stCondLst>
+                                  <p:childTnLst>
+                                    <p:set>
+                                      <p:cBhvr>
+                                        <p:cTn id="16" dur="1" fill="hold">
+                                          <p:stCondLst>
+                                            <p:cond delay="0"/>
+                                          </p:stCondLst>
+                                        </p:cTn>
+                                        <p:tgtEl>
+                                          <p:spTgt spid="3">
+                                            <p:txEl>
+                                              <p:pRg st="2" end="2"/>
+                                            </p:txEl>
+                                          </p:spTgt>
+                                        </p:tgtEl>
+                                        <p:attrNameLst>
+                                          <p:attrName>style.visibility</p:attrName>
+                                        </p:attrNameLst>
+                                      </p:cBhvr>
+                                      <p:to>
+                                        <p:strVal val="visible"/>
+                                      </p:to>
+                                    </p:set>
+                                    <p:animEffect transition="in" filter="fade">
+                                      <p:cBhvr>
+                                        <p:cTn id="17" dur="500"/>
+                                        <p:tgtEl>
+                                          <p:spTgt spid="3">
+                                            <p:txEl>
+                                              <p:pRg st="2" end="2"/>
+                                            </p:txEl>
+                                          </p:spTgt>
+                                        </p:tgtEl>
+                                      </p:cBhvr>
+                                    </p:animEffect>
+                                  </p:childTnLst>
+                                </p:cTn>
+                              </p:par>
+                            </p:childTnLst>
+                          </p:cTn>
+                        </p:par>
+                      </p:childTnLst>
+                    </p:cTn>
+                  </p:par>
+                  <p:par>
+                    <p:cTn id="18" fill="hold">
+                      <p:stCondLst>
+                        <p:cond delay="indefinite"/>
+                      </p:stCondLst>
+                      <p:childTnLst>
+                        <p:par>
+                          <p:cTn id="19" fill="hold">
+                            <p:stCondLst>
+                              <p:cond delay="0"/>
+                            </p:stCondLst>
+                            <p:childTnLst>
+                              <p:par>
+                                <p:cTn id="20" presetID="10" presetClass="entr" presetSubtype="0" fill="hold" grpId="0" nodeType="clickEffect">
+                                  <p:stCondLst>
+                                    <p:cond delay="0"/>
+                                  </p:stCondLst>
+                                  <p:childTnLst>
+                                    <p:set>
+                                      <p:cBhvr>
+                                        <p:cTn id="21" dur="1" fill="hold">
+                                          <p:stCondLst>
+                                            <p:cond delay="0"/>
+                                          </p:stCondLst>
+                                        </p:cTn>
+                                        <p:tgtEl>
+                                          <p:spTgt spid="3">
+                                            <p:txEl>
+                                              <p:pRg st="3" end="3"/>
+                                            </p:txEl>
+                                          </p:spTgt>
+                                        </p:tgtEl>
+                                        <p:attrNameLst>
+                                          <p:attrName>style.visibility</p:attrName>
+                                        </p:attrNameLst>
+                                      </p:cBhvr>
+                                      <p:to>
+                                        <p:strVal val="visible"/>
+                                      </p:to>
+                                    </p:set>
+                                    <p:animEffect transition="in" filter="fade">
+                                      <p:cBhvr>
+                                        <p:cTn id="22" dur="500"/>
+                                        <p:tgtEl>
+                                          <p:spTgt spid="3">
+                                            <p:txEl>
+                                              <p:pRg st="3" end="3"/>
+                                            </p:txEl>
+                                          </p:spTgt>
+                                        </p:tgtEl>
+                                      </p:cBhvr>
+                                    </p:animEffect>
+                                  </p:childTnLst>
+                                </p:cTn>
+                              </p:par>
+                            </p:childTnLst>
+                          </p:cTn>
+                        </p:par>
+                      </p:childTnLst>
+                    </p:cTn>
+                  </p:par>
+                </p:childTnLst>
+              </p:cTn>
+              <p:prevCondLst>
+                <p:cond evt="onPrev" delay="0">
+                  <p:tgtEl>
+                    <p:sldTgt/>
+                  </p:tgtEl>
+                </p:cond>
+              </p:prevCondLst>
+              <p:nextCondLst>
+                <p:cond evt="onNext" delay="0">
+                  <p:tgtEl>
+                    <p:sldTgt/>
+                  </p:tgtEl>
+                </p:cond>
+              </p:nextCondLst>
+            </p:seq>
+          </p:childTnLst>
+        </p:cTn>
+      </p:par>
+    </p:tnLst>
+    <p:bldLst>
+      <p:bldP spid="3" grpId="0" build="p"/>
+    </p:bldLst>
+  </p:timing>
 </p:sld>
 </file>
 
@@ -11192,7 +11488,7 @@
           <a:p>
             <a:r>
               <a:rPr lang="en-US" dirty="0"/>
-              <a:t>How do containers make us more or less secure.</a:t>
+              <a:t>How do containers make us more or less secure?</a:t>
             </a:r>
           </a:p>
           <a:p>
@@ -11233,8 +11529,12 @@
           </a:p>
           <a:p>
             <a:r>
+              <a:rPr lang="en-US" dirty="0" err="1"/>
+              <a:t>Etc</a:t>
+            </a:r>
+            <a:r>
               <a:rPr lang="en-US" dirty="0"/>
-              <a:t>Etc…  We’ll present a formal list to each vendor.</a:t>
+              <a:t>…</a:t>
             </a:r>
           </a:p>
         </p:txBody>
@@ -12434,13 +12734,13 @@
           <a:p>
             <a:r>
               <a:rPr lang="en-US" dirty="0"/>
-              <a:t>Efficiency is good</a:t>
+              <a:t>Need resources deployed</a:t>
             </a:r>
           </a:p>
           <a:p>
             <a:r>
               <a:rPr lang="en-US" dirty="0"/>
-              <a:t>Need resources deployed</a:t>
+              <a:t>Workflow efficiency is good</a:t>
             </a:r>
           </a:p>
           <a:p>
@@ -12516,13 +12816,13 @@
           <a:p>
             <a:r>
               <a:rPr lang="en-US" dirty="0"/>
-              <a:t>Efficiency is key</a:t>
+              <a:t>Need a pit of success to fall into</a:t>
             </a:r>
           </a:p>
           <a:p>
             <a:r>
               <a:rPr lang="en-US" dirty="0"/>
-              <a:t>Need a pit of success to fall into</a:t>
+              <a:t>Workflow efficiency is key</a:t>
             </a:r>
           </a:p>
           <a:p>
@@ -12643,7 +12943,7 @@
                             </p:stCondLst>
                             <p:childTnLst>
                               <p:par>
-                                <p:cTn id="10" presetID="10" presetClass="entr" presetSubtype="0" fill="hold" nodeType="clickEffect">
+                                <p:cTn id="10" presetID="10" presetClass="entr" presetSubtype="0" fill="hold" grpId="0" nodeType="clickEffect">
                                   <p:stCondLst>
                                     <p:cond delay="0"/>
                                   </p:stCondLst>
@@ -12658,7 +12958,7 @@
                                         <p:tgtEl>
                                           <p:spTgt spid="4">
                                             <p:txEl>
-                                              <p:pRg st="3" end="3"/>
+                                              <p:pRg st="0" end="0"/>
                                             </p:txEl>
                                           </p:spTgt>
                                         </p:tgtEl>
@@ -12676,7 +12976,7 @@
                                         <p:tgtEl>
                                           <p:spTgt spid="4">
                                             <p:txEl>
-                                              <p:pRg st="3" end="3"/>
+                                              <p:pRg st="0" end="0"/>
                                             </p:txEl>
                                           </p:spTgt>
                                         </p:tgtEl>
@@ -12717,9 +13017,9 @@
                                           </p:stCondLst>
                                         </p:cTn>
                                         <p:tgtEl>
-                                          <p:spTgt spid="5">
+                                          <p:spTgt spid="4">
                                             <p:txEl>
-                                              <p:pRg st="0" end="0"/>
+                                              <p:pRg st="1" end="1"/>
                                             </p:txEl>
                                           </p:spTgt>
                                         </p:tgtEl>
@@ -12735,9 +13035,9 @@
                                       <p:cBhvr>
                                         <p:cTn id="17" dur="500"/>
                                         <p:tgtEl>
-                                          <p:spTgt spid="5">
+                                          <p:spTgt spid="4">
                                             <p:txEl>
-                                              <p:pRg st="0" end="0"/>
+                                              <p:pRg st="1" end="1"/>
                                             </p:txEl>
                                           </p:spTgt>
                                         </p:tgtEl>
@@ -12765,7 +13065,7 @@
                             </p:stCondLst>
                             <p:childTnLst>
                               <p:par>
-                                <p:cTn id="20" presetID="10" presetClass="entr" presetSubtype="0" fill="hold" nodeType="clickEffect">
+                                <p:cTn id="20" presetID="10" presetClass="entr" presetSubtype="0" fill="hold" grpId="0" nodeType="clickEffect">
                                   <p:stCondLst>
                                     <p:cond delay="0"/>
                                   </p:stCondLst>
@@ -12773,6 +13073,494 @@
                                     <p:set>
                                       <p:cBhvr>
                                         <p:cTn id="21" dur="1" fill="hold">
+                                          <p:stCondLst>
+                                            <p:cond delay="0"/>
+                                          </p:stCondLst>
+                                        </p:cTn>
+                                        <p:tgtEl>
+                                          <p:spTgt spid="4">
+                                            <p:txEl>
+                                              <p:pRg st="2" end="2"/>
+                                            </p:txEl>
+                                          </p:spTgt>
+                                        </p:tgtEl>
+                                        <p:attrNameLst>
+                                          <p:attrName>style.visibility</p:attrName>
+                                        </p:attrNameLst>
+                                      </p:cBhvr>
+                                      <p:to>
+                                        <p:strVal val="visible"/>
+                                      </p:to>
+                                    </p:set>
+                                    <p:animEffect transition="in" filter="fade">
+                                      <p:cBhvr>
+                                        <p:cTn id="22" dur="500"/>
+                                        <p:tgtEl>
+                                          <p:spTgt spid="4">
+                                            <p:txEl>
+                                              <p:pRg st="2" end="2"/>
+                                            </p:txEl>
+                                          </p:spTgt>
+                                        </p:tgtEl>
+                                      </p:cBhvr>
+                                    </p:animEffect>
+                                  </p:childTnLst>
+                                </p:cTn>
+                              </p:par>
+                            </p:childTnLst>
+                          </p:cTn>
+                        </p:par>
+                      </p:childTnLst>
+                    </p:cTn>
+                  </p:par>
+                  <p:par>
+                    <p:cTn id="23" fill="hold">
+                      <p:stCondLst>
+                        <p:cond delay="indefinite"/>
+                      </p:stCondLst>
+                      <p:childTnLst>
+                        <p:par>
+                          <p:cTn id="24" fill="hold">
+                            <p:stCondLst>
+                              <p:cond delay="0"/>
+                            </p:stCondLst>
+                            <p:childTnLst>
+                              <p:par>
+                                <p:cTn id="25" presetID="10" presetClass="entr" presetSubtype="0" fill="hold" grpId="0" nodeType="clickEffect">
+                                  <p:stCondLst>
+                                    <p:cond delay="0"/>
+                                  </p:stCondLst>
+                                  <p:childTnLst>
+                                    <p:set>
+                                      <p:cBhvr>
+                                        <p:cTn id="26" dur="1" fill="hold">
+                                          <p:stCondLst>
+                                            <p:cond delay="0"/>
+                                          </p:stCondLst>
+                                        </p:cTn>
+                                        <p:tgtEl>
+                                          <p:spTgt spid="4">
+                                            <p:txEl>
+                                              <p:pRg st="3" end="3"/>
+                                            </p:txEl>
+                                          </p:spTgt>
+                                        </p:tgtEl>
+                                        <p:attrNameLst>
+                                          <p:attrName>style.visibility</p:attrName>
+                                        </p:attrNameLst>
+                                      </p:cBhvr>
+                                      <p:to>
+                                        <p:strVal val="visible"/>
+                                      </p:to>
+                                    </p:set>
+                                    <p:animEffect transition="in" filter="fade">
+                                      <p:cBhvr>
+                                        <p:cTn id="27" dur="500"/>
+                                        <p:tgtEl>
+                                          <p:spTgt spid="4">
+                                            <p:txEl>
+                                              <p:pRg st="3" end="3"/>
+                                            </p:txEl>
+                                          </p:spTgt>
+                                        </p:tgtEl>
+                                      </p:cBhvr>
+                                    </p:animEffect>
+                                  </p:childTnLst>
+                                </p:cTn>
+                              </p:par>
+                            </p:childTnLst>
+                          </p:cTn>
+                        </p:par>
+                      </p:childTnLst>
+                    </p:cTn>
+                  </p:par>
+                  <p:par>
+                    <p:cTn id="28" fill="hold">
+                      <p:stCondLst>
+                        <p:cond delay="indefinite"/>
+                      </p:stCondLst>
+                      <p:childTnLst>
+                        <p:par>
+                          <p:cTn id="29" fill="hold">
+                            <p:stCondLst>
+                              <p:cond delay="0"/>
+                            </p:stCondLst>
+                            <p:childTnLst>
+                              <p:par>
+                                <p:cTn id="30" presetID="10" presetClass="entr" presetSubtype="0" fill="hold" grpId="0" nodeType="clickEffect">
+                                  <p:stCondLst>
+                                    <p:cond delay="0"/>
+                                  </p:stCondLst>
+                                  <p:childTnLst>
+                                    <p:set>
+                                      <p:cBhvr>
+                                        <p:cTn id="31" dur="1" fill="hold">
+                                          <p:stCondLst>
+                                            <p:cond delay="0"/>
+                                          </p:stCondLst>
+                                        </p:cTn>
+                                        <p:tgtEl>
+                                          <p:spTgt spid="4">
+                                            <p:txEl>
+                                              <p:pRg st="4" end="4"/>
+                                            </p:txEl>
+                                          </p:spTgt>
+                                        </p:tgtEl>
+                                        <p:attrNameLst>
+                                          <p:attrName>style.visibility</p:attrName>
+                                        </p:attrNameLst>
+                                      </p:cBhvr>
+                                      <p:to>
+                                        <p:strVal val="visible"/>
+                                      </p:to>
+                                    </p:set>
+                                    <p:animEffect transition="in" filter="fade">
+                                      <p:cBhvr>
+                                        <p:cTn id="32" dur="500"/>
+                                        <p:tgtEl>
+                                          <p:spTgt spid="4">
+                                            <p:txEl>
+                                              <p:pRg st="4" end="4"/>
+                                            </p:txEl>
+                                          </p:spTgt>
+                                        </p:tgtEl>
+                                      </p:cBhvr>
+                                    </p:animEffect>
+                                  </p:childTnLst>
+                                </p:cTn>
+                              </p:par>
+                            </p:childTnLst>
+                          </p:cTn>
+                        </p:par>
+                      </p:childTnLst>
+                    </p:cTn>
+                  </p:par>
+                  <p:par>
+                    <p:cTn id="33" fill="hold">
+                      <p:stCondLst>
+                        <p:cond delay="indefinite"/>
+                      </p:stCondLst>
+                      <p:childTnLst>
+                        <p:par>
+                          <p:cTn id="34" fill="hold">
+                            <p:stCondLst>
+                              <p:cond delay="0"/>
+                            </p:stCondLst>
+                            <p:childTnLst>
+                              <p:par>
+                                <p:cTn id="35" presetID="10" presetClass="entr" presetSubtype="0" fill="hold" grpId="0" nodeType="clickEffect">
+                                  <p:stCondLst>
+                                    <p:cond delay="0"/>
+                                  </p:stCondLst>
+                                  <p:childTnLst>
+                                    <p:set>
+                                      <p:cBhvr>
+                                        <p:cTn id="36" dur="1" fill="hold">
+                                          <p:stCondLst>
+                                            <p:cond delay="0"/>
+                                          </p:stCondLst>
+                                        </p:cTn>
+                                        <p:tgtEl>
+                                          <p:spTgt spid="4">
+                                            <p:txEl>
+                                              <p:pRg st="5" end="5"/>
+                                            </p:txEl>
+                                          </p:spTgt>
+                                        </p:tgtEl>
+                                        <p:attrNameLst>
+                                          <p:attrName>style.visibility</p:attrName>
+                                        </p:attrNameLst>
+                                      </p:cBhvr>
+                                      <p:to>
+                                        <p:strVal val="visible"/>
+                                      </p:to>
+                                    </p:set>
+                                    <p:animEffect transition="in" filter="fade">
+                                      <p:cBhvr>
+                                        <p:cTn id="37" dur="500"/>
+                                        <p:tgtEl>
+                                          <p:spTgt spid="4">
+                                            <p:txEl>
+                                              <p:pRg st="5" end="5"/>
+                                            </p:txEl>
+                                          </p:spTgt>
+                                        </p:tgtEl>
+                                      </p:cBhvr>
+                                    </p:animEffect>
+                                  </p:childTnLst>
+                                </p:cTn>
+                              </p:par>
+                            </p:childTnLst>
+                          </p:cTn>
+                        </p:par>
+                      </p:childTnLst>
+                    </p:cTn>
+                  </p:par>
+                  <p:par>
+                    <p:cTn id="38" fill="hold">
+                      <p:stCondLst>
+                        <p:cond delay="indefinite"/>
+                      </p:stCondLst>
+                      <p:childTnLst>
+                        <p:par>
+                          <p:cTn id="39" fill="hold">
+                            <p:stCondLst>
+                              <p:cond delay="0"/>
+                            </p:stCondLst>
+                            <p:childTnLst>
+                              <p:par>
+                                <p:cTn id="40" presetID="10" presetClass="entr" presetSubtype="0" fill="hold" grpId="0" nodeType="clickEffect">
+                                  <p:stCondLst>
+                                    <p:cond delay="0"/>
+                                  </p:stCondLst>
+                                  <p:childTnLst>
+                                    <p:set>
+                                      <p:cBhvr>
+                                        <p:cTn id="41" dur="1" fill="hold">
+                                          <p:stCondLst>
+                                            <p:cond delay="0"/>
+                                          </p:stCondLst>
+                                        </p:cTn>
+                                        <p:tgtEl>
+                                          <p:spTgt spid="4">
+                                            <p:txEl>
+                                              <p:pRg st="6" end="6"/>
+                                            </p:txEl>
+                                          </p:spTgt>
+                                        </p:tgtEl>
+                                        <p:attrNameLst>
+                                          <p:attrName>style.visibility</p:attrName>
+                                        </p:attrNameLst>
+                                      </p:cBhvr>
+                                      <p:to>
+                                        <p:strVal val="visible"/>
+                                      </p:to>
+                                    </p:set>
+                                    <p:animEffect transition="in" filter="fade">
+                                      <p:cBhvr>
+                                        <p:cTn id="42" dur="500"/>
+                                        <p:tgtEl>
+                                          <p:spTgt spid="4">
+                                            <p:txEl>
+                                              <p:pRg st="6" end="6"/>
+                                            </p:txEl>
+                                          </p:spTgt>
+                                        </p:tgtEl>
+                                      </p:cBhvr>
+                                    </p:animEffect>
+                                  </p:childTnLst>
+                                </p:cTn>
+                              </p:par>
+                            </p:childTnLst>
+                          </p:cTn>
+                        </p:par>
+                      </p:childTnLst>
+                    </p:cTn>
+                  </p:par>
+                  <p:par>
+                    <p:cTn id="43" fill="hold">
+                      <p:stCondLst>
+                        <p:cond delay="indefinite"/>
+                      </p:stCondLst>
+                      <p:childTnLst>
+                        <p:par>
+                          <p:cTn id="44" fill="hold">
+                            <p:stCondLst>
+                              <p:cond delay="0"/>
+                            </p:stCondLst>
+                            <p:childTnLst>
+                              <p:par>
+                                <p:cTn id="45" presetID="10" presetClass="entr" presetSubtype="0" fill="hold" grpId="0" nodeType="clickEffect">
+                                  <p:stCondLst>
+                                    <p:cond delay="0"/>
+                                  </p:stCondLst>
+                                  <p:childTnLst>
+                                    <p:set>
+                                      <p:cBhvr>
+                                        <p:cTn id="46" dur="1" fill="hold">
+                                          <p:stCondLst>
+                                            <p:cond delay="0"/>
+                                          </p:stCondLst>
+                                        </p:cTn>
+                                        <p:tgtEl>
+                                          <p:spTgt spid="5">
+                                            <p:txEl>
+                                              <p:pRg st="0" end="0"/>
+                                            </p:txEl>
+                                          </p:spTgt>
+                                        </p:tgtEl>
+                                        <p:attrNameLst>
+                                          <p:attrName>style.visibility</p:attrName>
+                                        </p:attrNameLst>
+                                      </p:cBhvr>
+                                      <p:to>
+                                        <p:strVal val="visible"/>
+                                      </p:to>
+                                    </p:set>
+                                    <p:animEffect transition="in" filter="fade">
+                                      <p:cBhvr>
+                                        <p:cTn id="47" dur="500"/>
+                                        <p:tgtEl>
+                                          <p:spTgt spid="5">
+                                            <p:txEl>
+                                              <p:pRg st="0" end="0"/>
+                                            </p:txEl>
+                                          </p:spTgt>
+                                        </p:tgtEl>
+                                      </p:cBhvr>
+                                    </p:animEffect>
+                                  </p:childTnLst>
+                                </p:cTn>
+                              </p:par>
+                            </p:childTnLst>
+                          </p:cTn>
+                        </p:par>
+                      </p:childTnLst>
+                    </p:cTn>
+                  </p:par>
+                  <p:par>
+                    <p:cTn id="48" fill="hold">
+                      <p:stCondLst>
+                        <p:cond delay="indefinite"/>
+                      </p:stCondLst>
+                      <p:childTnLst>
+                        <p:par>
+                          <p:cTn id="49" fill="hold">
+                            <p:stCondLst>
+                              <p:cond delay="0"/>
+                            </p:stCondLst>
+                            <p:childTnLst>
+                              <p:par>
+                                <p:cTn id="50" presetID="10" presetClass="entr" presetSubtype="0" fill="hold" grpId="0" nodeType="clickEffect">
+                                  <p:stCondLst>
+                                    <p:cond delay="0"/>
+                                  </p:stCondLst>
+                                  <p:childTnLst>
+                                    <p:set>
+                                      <p:cBhvr>
+                                        <p:cTn id="51" dur="1" fill="hold">
+                                          <p:stCondLst>
+                                            <p:cond delay="0"/>
+                                          </p:stCondLst>
+                                        </p:cTn>
+                                        <p:tgtEl>
+                                          <p:spTgt spid="6">
+                                            <p:txEl>
+                                              <p:pRg st="0" end="0"/>
+                                            </p:txEl>
+                                          </p:spTgt>
+                                        </p:tgtEl>
+                                        <p:attrNameLst>
+                                          <p:attrName>style.visibility</p:attrName>
+                                        </p:attrNameLst>
+                                      </p:cBhvr>
+                                      <p:to>
+                                        <p:strVal val="visible"/>
+                                      </p:to>
+                                    </p:set>
+                                    <p:animEffect transition="in" filter="fade">
+                                      <p:cBhvr>
+                                        <p:cTn id="52" dur="500"/>
+                                        <p:tgtEl>
+                                          <p:spTgt spid="6">
+                                            <p:txEl>
+                                              <p:pRg st="0" end="0"/>
+                                            </p:txEl>
+                                          </p:spTgt>
+                                        </p:tgtEl>
+                                      </p:cBhvr>
+                                    </p:animEffect>
+                                  </p:childTnLst>
+                                </p:cTn>
+                              </p:par>
+                            </p:childTnLst>
+                          </p:cTn>
+                        </p:par>
+                      </p:childTnLst>
+                    </p:cTn>
+                  </p:par>
+                  <p:par>
+                    <p:cTn id="53" fill="hold">
+                      <p:stCondLst>
+                        <p:cond delay="indefinite"/>
+                      </p:stCondLst>
+                      <p:childTnLst>
+                        <p:par>
+                          <p:cTn id="54" fill="hold">
+                            <p:stCondLst>
+                              <p:cond delay="0"/>
+                            </p:stCondLst>
+                            <p:childTnLst>
+                              <p:par>
+                                <p:cTn id="55" presetID="10" presetClass="entr" presetSubtype="0" fill="hold" grpId="0" nodeType="clickEffect">
+                                  <p:stCondLst>
+                                    <p:cond delay="0"/>
+                                  </p:stCondLst>
+                                  <p:childTnLst>
+                                    <p:set>
+                                      <p:cBhvr>
+                                        <p:cTn id="56" dur="1" fill="hold">
+                                          <p:stCondLst>
+                                            <p:cond delay="0"/>
+                                          </p:stCondLst>
+                                        </p:cTn>
+                                        <p:tgtEl>
+                                          <p:spTgt spid="6">
+                                            <p:txEl>
+                                              <p:pRg st="1" end="1"/>
+                                            </p:txEl>
+                                          </p:spTgt>
+                                        </p:tgtEl>
+                                        <p:attrNameLst>
+                                          <p:attrName>style.visibility</p:attrName>
+                                        </p:attrNameLst>
+                                      </p:cBhvr>
+                                      <p:to>
+                                        <p:strVal val="visible"/>
+                                      </p:to>
+                                    </p:set>
+                                    <p:animEffect transition="in" filter="fade">
+                                      <p:cBhvr>
+                                        <p:cTn id="57" dur="500"/>
+                                        <p:tgtEl>
+                                          <p:spTgt spid="6">
+                                            <p:txEl>
+                                              <p:pRg st="1" end="1"/>
+                                            </p:txEl>
+                                          </p:spTgt>
+                                        </p:tgtEl>
+                                      </p:cBhvr>
+                                    </p:animEffect>
+                                  </p:childTnLst>
+                                </p:cTn>
+                              </p:par>
+                            </p:childTnLst>
+                          </p:cTn>
+                        </p:par>
+                      </p:childTnLst>
+                    </p:cTn>
+                  </p:par>
+                  <p:par>
+                    <p:cTn id="58" fill="hold">
+                      <p:stCondLst>
+                        <p:cond delay="indefinite"/>
+                      </p:stCondLst>
+                      <p:childTnLst>
+                        <p:par>
+                          <p:cTn id="59" fill="hold">
+                            <p:stCondLst>
+                              <p:cond delay="0"/>
+                            </p:stCondLst>
+                            <p:childTnLst>
+                              <p:par>
+                                <p:cTn id="60" presetID="10" presetClass="entr" presetSubtype="0" fill="hold" grpId="0" nodeType="clickEffect">
+                                  <p:stCondLst>
+                                    <p:cond delay="0"/>
+                                  </p:stCondLst>
+                                  <p:childTnLst>
+                                    <p:set>
+                                      <p:cBhvr>
+                                        <p:cTn id="61" dur="1" fill="hold">
                                           <p:stCondLst>
                                             <p:cond delay="0"/>
                                           </p:stCondLst>
@@ -12794,11 +13582,255 @@
                                     </p:set>
                                     <p:animEffect transition="in" filter="fade">
                                       <p:cBhvr>
-                                        <p:cTn id="22" dur="500"/>
+                                        <p:cTn id="62" dur="500"/>
                                         <p:tgtEl>
                                           <p:spTgt spid="6">
                                             <p:txEl>
                                               <p:pRg st="2" end="2"/>
+                                            </p:txEl>
+                                          </p:spTgt>
+                                        </p:tgtEl>
+                                      </p:cBhvr>
+                                    </p:animEffect>
+                                  </p:childTnLst>
+                                </p:cTn>
+                              </p:par>
+                            </p:childTnLst>
+                          </p:cTn>
+                        </p:par>
+                      </p:childTnLst>
+                    </p:cTn>
+                  </p:par>
+                  <p:par>
+                    <p:cTn id="63" fill="hold">
+                      <p:stCondLst>
+                        <p:cond delay="indefinite"/>
+                      </p:stCondLst>
+                      <p:childTnLst>
+                        <p:par>
+                          <p:cTn id="64" fill="hold">
+                            <p:stCondLst>
+                              <p:cond delay="0"/>
+                            </p:stCondLst>
+                            <p:childTnLst>
+                              <p:par>
+                                <p:cTn id="65" presetID="10" presetClass="entr" presetSubtype="0" fill="hold" grpId="0" nodeType="clickEffect">
+                                  <p:stCondLst>
+                                    <p:cond delay="0"/>
+                                  </p:stCondLst>
+                                  <p:childTnLst>
+                                    <p:set>
+                                      <p:cBhvr>
+                                        <p:cTn id="66" dur="1" fill="hold">
+                                          <p:stCondLst>
+                                            <p:cond delay="0"/>
+                                          </p:stCondLst>
+                                        </p:cTn>
+                                        <p:tgtEl>
+                                          <p:spTgt spid="6">
+                                            <p:txEl>
+                                              <p:pRg st="3" end="3"/>
+                                            </p:txEl>
+                                          </p:spTgt>
+                                        </p:tgtEl>
+                                        <p:attrNameLst>
+                                          <p:attrName>style.visibility</p:attrName>
+                                        </p:attrNameLst>
+                                      </p:cBhvr>
+                                      <p:to>
+                                        <p:strVal val="visible"/>
+                                      </p:to>
+                                    </p:set>
+                                    <p:animEffect transition="in" filter="fade">
+                                      <p:cBhvr>
+                                        <p:cTn id="67" dur="500"/>
+                                        <p:tgtEl>
+                                          <p:spTgt spid="6">
+                                            <p:txEl>
+                                              <p:pRg st="3" end="3"/>
+                                            </p:txEl>
+                                          </p:spTgt>
+                                        </p:tgtEl>
+                                      </p:cBhvr>
+                                    </p:animEffect>
+                                  </p:childTnLst>
+                                </p:cTn>
+                              </p:par>
+                            </p:childTnLst>
+                          </p:cTn>
+                        </p:par>
+                      </p:childTnLst>
+                    </p:cTn>
+                  </p:par>
+                  <p:par>
+                    <p:cTn id="68" fill="hold">
+                      <p:stCondLst>
+                        <p:cond delay="indefinite"/>
+                      </p:stCondLst>
+                      <p:childTnLst>
+                        <p:par>
+                          <p:cTn id="69" fill="hold">
+                            <p:stCondLst>
+                              <p:cond delay="0"/>
+                            </p:stCondLst>
+                            <p:childTnLst>
+                              <p:par>
+                                <p:cTn id="70" presetID="10" presetClass="entr" presetSubtype="0" fill="hold" grpId="0" nodeType="clickEffect">
+                                  <p:stCondLst>
+                                    <p:cond delay="0"/>
+                                  </p:stCondLst>
+                                  <p:childTnLst>
+                                    <p:set>
+                                      <p:cBhvr>
+                                        <p:cTn id="71" dur="1" fill="hold">
+                                          <p:stCondLst>
+                                            <p:cond delay="0"/>
+                                          </p:stCondLst>
+                                        </p:cTn>
+                                        <p:tgtEl>
+                                          <p:spTgt spid="6">
+                                            <p:txEl>
+                                              <p:pRg st="4" end="4"/>
+                                            </p:txEl>
+                                          </p:spTgt>
+                                        </p:tgtEl>
+                                        <p:attrNameLst>
+                                          <p:attrName>style.visibility</p:attrName>
+                                        </p:attrNameLst>
+                                      </p:cBhvr>
+                                      <p:to>
+                                        <p:strVal val="visible"/>
+                                      </p:to>
+                                    </p:set>
+                                    <p:animEffect transition="in" filter="fade">
+                                      <p:cBhvr>
+                                        <p:cTn id="72" dur="500"/>
+                                        <p:tgtEl>
+                                          <p:spTgt spid="6">
+                                            <p:txEl>
+                                              <p:pRg st="4" end="4"/>
+                                            </p:txEl>
+                                          </p:spTgt>
+                                        </p:tgtEl>
+                                      </p:cBhvr>
+                                    </p:animEffect>
+                                  </p:childTnLst>
+                                </p:cTn>
+                              </p:par>
+                            </p:childTnLst>
+                          </p:cTn>
+                        </p:par>
+                      </p:childTnLst>
+                    </p:cTn>
+                  </p:par>
+                  <p:par>
+                    <p:cTn id="73" fill="hold">
+                      <p:stCondLst>
+                        <p:cond delay="indefinite"/>
+                      </p:stCondLst>
+                      <p:childTnLst>
+                        <p:par>
+                          <p:cTn id="74" fill="hold">
+                            <p:stCondLst>
+                              <p:cond delay="0"/>
+                            </p:stCondLst>
+                            <p:childTnLst>
+                              <p:par>
+                                <p:cTn id="75" presetID="10" presetClass="entr" presetSubtype="0" fill="hold" grpId="0" nodeType="clickEffect">
+                                  <p:stCondLst>
+                                    <p:cond delay="0"/>
+                                  </p:stCondLst>
+                                  <p:childTnLst>
+                                    <p:set>
+                                      <p:cBhvr>
+                                        <p:cTn id="76" dur="1" fill="hold">
+                                          <p:stCondLst>
+                                            <p:cond delay="0"/>
+                                          </p:stCondLst>
+                                        </p:cTn>
+                                        <p:tgtEl>
+                                          <p:spTgt spid="6">
+                                            <p:txEl>
+                                              <p:pRg st="5" end="5"/>
+                                            </p:txEl>
+                                          </p:spTgt>
+                                        </p:tgtEl>
+                                        <p:attrNameLst>
+                                          <p:attrName>style.visibility</p:attrName>
+                                        </p:attrNameLst>
+                                      </p:cBhvr>
+                                      <p:to>
+                                        <p:strVal val="visible"/>
+                                      </p:to>
+                                    </p:set>
+                                    <p:animEffect transition="in" filter="fade">
+                                      <p:cBhvr>
+                                        <p:cTn id="77" dur="500"/>
+                                        <p:tgtEl>
+                                          <p:spTgt spid="6">
+                                            <p:txEl>
+                                              <p:pRg st="5" end="5"/>
+                                            </p:txEl>
+                                          </p:spTgt>
+                                        </p:tgtEl>
+                                      </p:cBhvr>
+                                    </p:animEffect>
+                                  </p:childTnLst>
+                                </p:cTn>
+                              </p:par>
+                            </p:childTnLst>
+                          </p:cTn>
+                        </p:par>
+                      </p:childTnLst>
+                    </p:cTn>
+                  </p:par>
+                  <p:par>
+                    <p:cTn id="78" fill="hold">
+                      <p:stCondLst>
+                        <p:cond delay="indefinite"/>
+                      </p:stCondLst>
+                      <p:childTnLst>
+                        <p:par>
+                          <p:cTn id="79" fill="hold">
+                            <p:stCondLst>
+                              <p:cond delay="0"/>
+                            </p:stCondLst>
+                            <p:childTnLst>
+                              <p:par>
+                                <p:cTn id="80" presetID="10" presetClass="entr" presetSubtype="0" fill="hold" grpId="0" nodeType="clickEffect">
+                                  <p:stCondLst>
+                                    <p:cond delay="0"/>
+                                  </p:stCondLst>
+                                  <p:childTnLst>
+                                    <p:set>
+                                      <p:cBhvr>
+                                        <p:cTn id="81" dur="1" fill="hold">
+                                          <p:stCondLst>
+                                            <p:cond delay="0"/>
+                                          </p:stCondLst>
+                                        </p:cTn>
+                                        <p:tgtEl>
+                                          <p:spTgt spid="6">
+                                            <p:txEl>
+                                              <p:pRg st="6" end="6"/>
+                                            </p:txEl>
+                                          </p:spTgt>
+                                        </p:tgtEl>
+                                        <p:attrNameLst>
+                                          <p:attrName>style.visibility</p:attrName>
+                                        </p:attrNameLst>
+                                      </p:cBhvr>
+                                      <p:to>
+                                        <p:strVal val="visible"/>
+                                      </p:to>
+                                    </p:set>
+                                    <p:animEffect transition="in" filter="fade">
+                                      <p:cBhvr>
+                                        <p:cTn id="82" dur="500"/>
+                                        <p:tgtEl>
+                                          <p:spTgt spid="6">
+                                            <p:txEl>
+                                              <p:pRg st="6" end="6"/>
                                             </p:txEl>
                                           </p:spTgt>
                                         </p:tgtEl>
@@ -12836,7 +13868,9 @@
     </p:tnLst>
     <p:bldLst>
       <p:bldP spid="3" grpId="0" build="p"/>
+      <p:bldP spid="4" grpId="0" build="p"/>
       <p:bldP spid="5" grpId="0" build="p"/>
+      <p:bldP spid="6" grpId="0" build="p"/>
     </p:bldLst>
   </p:timing>
 </p:sld>
@@ -16150,7 +17184,7 @@
                             </p:stCondLst>
                             <p:childTnLst>
                               <p:par>
-                                <p:cTn id="55" presetID="10" presetClass="entr" presetSubtype="0" fill="hold" nodeType="clickEffect">
+                                <p:cTn id="55" presetID="10" presetClass="entr" presetSubtype="0" fill="hold" grpId="0" nodeType="clickEffect">
                                   <p:stCondLst>
                                     <p:cond delay="0"/>
                                   </p:stCondLst>
@@ -16158,6 +17192,67 @@
                                     <p:set>
                                       <p:cBhvr>
                                         <p:cTn id="56" dur="1" fill="hold">
+                                          <p:stCondLst>
+                                            <p:cond delay="0"/>
+                                          </p:stCondLst>
+                                        </p:cTn>
+                                        <p:tgtEl>
+                                          <p:spTgt spid="6">
+                                            <p:txEl>
+                                              <p:pRg st="0" end="0"/>
+                                            </p:txEl>
+                                          </p:spTgt>
+                                        </p:tgtEl>
+                                        <p:attrNameLst>
+                                          <p:attrName>style.visibility</p:attrName>
+                                        </p:attrNameLst>
+                                      </p:cBhvr>
+                                      <p:to>
+                                        <p:strVal val="visible"/>
+                                      </p:to>
+                                    </p:set>
+                                    <p:animEffect transition="in" filter="fade">
+                                      <p:cBhvr>
+                                        <p:cTn id="57" dur="500"/>
+                                        <p:tgtEl>
+                                          <p:spTgt spid="6">
+                                            <p:txEl>
+                                              <p:pRg st="0" end="0"/>
+                                            </p:txEl>
+                                          </p:spTgt>
+                                        </p:tgtEl>
+                                      </p:cBhvr>
+                                    </p:animEffect>
+                                  </p:childTnLst>
+                                </p:cTn>
+                              </p:par>
+                            </p:childTnLst>
+                          </p:cTn>
+                        </p:par>
+                      </p:childTnLst>
+                    </p:cTn>
+                  </p:par>
+                  <p:par>
+                    <p:cTn id="58" fill="hold">
+                      <p:stCondLst>
+                        <p:cond delay="indefinite"/>
+                      </p:stCondLst>
+                      <p:childTnLst>
+                        <p:par>
+                          <p:cTn id="59" fill="hold">
+                            <p:stCondLst>
+                              <p:cond delay="0"/>
+                            </p:stCondLst>
+                            <p:childTnLst>
+                              <p:par>
+                                <p:cTn id="60" presetID="10" presetClass="entr" presetSubtype="0" fill="hold" grpId="0" nodeType="clickEffect">
+                                  <p:stCondLst>
+                                    <p:cond delay="0"/>
+                                  </p:stCondLst>
+                                  <p:childTnLst>
+                                    <p:set>
+                                      <p:cBhvr>
+                                        <p:cTn id="61" dur="1" fill="hold">
                                           <p:stCondLst>
                                             <p:cond delay="0"/>
                                           </p:stCondLst>
@@ -16179,11 +17274,255 @@
                                     </p:set>
                                     <p:animEffect transition="in" filter="fade">
                                       <p:cBhvr>
-                                        <p:cTn id="57" dur="500"/>
+                                        <p:cTn id="62" dur="500"/>
                                         <p:tgtEl>
                                           <p:spTgt spid="6">
                                             <p:txEl>
                                               <p:pRg st="1" end="1"/>
+                                            </p:txEl>
+                                          </p:spTgt>
+                                        </p:tgtEl>
+                                      </p:cBhvr>
+                                    </p:animEffect>
+                                  </p:childTnLst>
+                                </p:cTn>
+                              </p:par>
+                            </p:childTnLst>
+                          </p:cTn>
+                        </p:par>
+                      </p:childTnLst>
+                    </p:cTn>
+                  </p:par>
+                  <p:par>
+                    <p:cTn id="63" fill="hold">
+                      <p:stCondLst>
+                        <p:cond delay="indefinite"/>
+                      </p:stCondLst>
+                      <p:childTnLst>
+                        <p:par>
+                          <p:cTn id="64" fill="hold">
+                            <p:stCondLst>
+                              <p:cond delay="0"/>
+                            </p:stCondLst>
+                            <p:childTnLst>
+                              <p:par>
+                                <p:cTn id="65" presetID="10" presetClass="entr" presetSubtype="0" fill="hold" grpId="0" nodeType="clickEffect">
+                                  <p:stCondLst>
+                                    <p:cond delay="0"/>
+                                  </p:stCondLst>
+                                  <p:childTnLst>
+                                    <p:set>
+                                      <p:cBhvr>
+                                        <p:cTn id="66" dur="1" fill="hold">
+                                          <p:stCondLst>
+                                            <p:cond delay="0"/>
+                                          </p:stCondLst>
+                                        </p:cTn>
+                                        <p:tgtEl>
+                                          <p:spTgt spid="6">
+                                            <p:txEl>
+                                              <p:pRg st="2" end="2"/>
+                                            </p:txEl>
+                                          </p:spTgt>
+                                        </p:tgtEl>
+                                        <p:attrNameLst>
+                                          <p:attrName>style.visibility</p:attrName>
+                                        </p:attrNameLst>
+                                      </p:cBhvr>
+                                      <p:to>
+                                        <p:strVal val="visible"/>
+                                      </p:to>
+                                    </p:set>
+                                    <p:animEffect transition="in" filter="fade">
+                                      <p:cBhvr>
+                                        <p:cTn id="67" dur="500"/>
+                                        <p:tgtEl>
+                                          <p:spTgt spid="6">
+                                            <p:txEl>
+                                              <p:pRg st="2" end="2"/>
+                                            </p:txEl>
+                                          </p:spTgt>
+                                        </p:tgtEl>
+                                      </p:cBhvr>
+                                    </p:animEffect>
+                                  </p:childTnLst>
+                                </p:cTn>
+                              </p:par>
+                            </p:childTnLst>
+                          </p:cTn>
+                        </p:par>
+                      </p:childTnLst>
+                    </p:cTn>
+                  </p:par>
+                  <p:par>
+                    <p:cTn id="68" fill="hold">
+                      <p:stCondLst>
+                        <p:cond delay="indefinite"/>
+                      </p:stCondLst>
+                      <p:childTnLst>
+                        <p:par>
+                          <p:cTn id="69" fill="hold">
+                            <p:stCondLst>
+                              <p:cond delay="0"/>
+                            </p:stCondLst>
+                            <p:childTnLst>
+                              <p:par>
+                                <p:cTn id="70" presetID="10" presetClass="entr" presetSubtype="0" fill="hold" grpId="0" nodeType="clickEffect">
+                                  <p:stCondLst>
+                                    <p:cond delay="0"/>
+                                  </p:stCondLst>
+                                  <p:childTnLst>
+                                    <p:set>
+                                      <p:cBhvr>
+                                        <p:cTn id="71" dur="1" fill="hold">
+                                          <p:stCondLst>
+                                            <p:cond delay="0"/>
+                                          </p:stCondLst>
+                                        </p:cTn>
+                                        <p:tgtEl>
+                                          <p:spTgt spid="6">
+                                            <p:txEl>
+                                              <p:pRg st="3" end="3"/>
+                                            </p:txEl>
+                                          </p:spTgt>
+                                        </p:tgtEl>
+                                        <p:attrNameLst>
+                                          <p:attrName>style.visibility</p:attrName>
+                                        </p:attrNameLst>
+                                      </p:cBhvr>
+                                      <p:to>
+                                        <p:strVal val="visible"/>
+                                      </p:to>
+                                    </p:set>
+                                    <p:animEffect transition="in" filter="fade">
+                                      <p:cBhvr>
+                                        <p:cTn id="72" dur="500"/>
+                                        <p:tgtEl>
+                                          <p:spTgt spid="6">
+                                            <p:txEl>
+                                              <p:pRg st="3" end="3"/>
+                                            </p:txEl>
+                                          </p:spTgt>
+                                        </p:tgtEl>
+                                      </p:cBhvr>
+                                    </p:animEffect>
+                                  </p:childTnLst>
+                                </p:cTn>
+                              </p:par>
+                            </p:childTnLst>
+                          </p:cTn>
+                        </p:par>
+                      </p:childTnLst>
+                    </p:cTn>
+                  </p:par>
+                  <p:par>
+                    <p:cTn id="73" fill="hold">
+                      <p:stCondLst>
+                        <p:cond delay="indefinite"/>
+                      </p:stCondLst>
+                      <p:childTnLst>
+                        <p:par>
+                          <p:cTn id="74" fill="hold">
+                            <p:stCondLst>
+                              <p:cond delay="0"/>
+                            </p:stCondLst>
+                            <p:childTnLst>
+                              <p:par>
+                                <p:cTn id="75" presetID="10" presetClass="entr" presetSubtype="0" fill="hold" grpId="0" nodeType="clickEffect">
+                                  <p:stCondLst>
+                                    <p:cond delay="0"/>
+                                  </p:stCondLst>
+                                  <p:childTnLst>
+                                    <p:set>
+                                      <p:cBhvr>
+                                        <p:cTn id="76" dur="1" fill="hold">
+                                          <p:stCondLst>
+                                            <p:cond delay="0"/>
+                                          </p:stCondLst>
+                                        </p:cTn>
+                                        <p:tgtEl>
+                                          <p:spTgt spid="6">
+                                            <p:txEl>
+                                              <p:pRg st="4" end="4"/>
+                                            </p:txEl>
+                                          </p:spTgt>
+                                        </p:tgtEl>
+                                        <p:attrNameLst>
+                                          <p:attrName>style.visibility</p:attrName>
+                                        </p:attrNameLst>
+                                      </p:cBhvr>
+                                      <p:to>
+                                        <p:strVal val="visible"/>
+                                      </p:to>
+                                    </p:set>
+                                    <p:animEffect transition="in" filter="fade">
+                                      <p:cBhvr>
+                                        <p:cTn id="77" dur="500"/>
+                                        <p:tgtEl>
+                                          <p:spTgt spid="6">
+                                            <p:txEl>
+                                              <p:pRg st="4" end="4"/>
+                                            </p:txEl>
+                                          </p:spTgt>
+                                        </p:tgtEl>
+                                      </p:cBhvr>
+                                    </p:animEffect>
+                                  </p:childTnLst>
+                                </p:cTn>
+                              </p:par>
+                            </p:childTnLst>
+                          </p:cTn>
+                        </p:par>
+                      </p:childTnLst>
+                    </p:cTn>
+                  </p:par>
+                  <p:par>
+                    <p:cTn id="78" fill="hold">
+                      <p:stCondLst>
+                        <p:cond delay="indefinite"/>
+                      </p:stCondLst>
+                      <p:childTnLst>
+                        <p:par>
+                          <p:cTn id="79" fill="hold">
+                            <p:stCondLst>
+                              <p:cond delay="0"/>
+                            </p:stCondLst>
+                            <p:childTnLst>
+                              <p:par>
+                                <p:cTn id="80" presetID="10" presetClass="entr" presetSubtype="0" fill="hold" grpId="0" nodeType="clickEffect">
+                                  <p:stCondLst>
+                                    <p:cond delay="0"/>
+                                  </p:stCondLst>
+                                  <p:childTnLst>
+                                    <p:set>
+                                      <p:cBhvr>
+                                        <p:cTn id="81" dur="1" fill="hold">
+                                          <p:stCondLst>
+                                            <p:cond delay="0"/>
+                                          </p:stCondLst>
+                                        </p:cTn>
+                                        <p:tgtEl>
+                                          <p:spTgt spid="6">
+                                            <p:txEl>
+                                              <p:pRg st="5" end="5"/>
+                                            </p:txEl>
+                                          </p:spTgt>
+                                        </p:tgtEl>
+                                        <p:attrNameLst>
+                                          <p:attrName>style.visibility</p:attrName>
+                                        </p:attrNameLst>
+                                      </p:cBhvr>
+                                      <p:to>
+                                        <p:strVal val="visible"/>
+                                      </p:to>
+                                    </p:set>
+                                    <p:animEffect transition="in" filter="fade">
+                                      <p:cBhvr>
+                                        <p:cTn id="82" dur="500"/>
+                                        <p:tgtEl>
+                                          <p:spTgt spid="6">
+                                            <p:txEl>
+                                              <p:pRg st="5" end="5"/>
                                             </p:txEl>
                                           </p:spTgt>
                                         </p:tgtEl>
@@ -16223,6 +17562,7 @@
       <p:bldP spid="3" grpId="0" build="p"/>
       <p:bldP spid="4" grpId="0" build="p"/>
       <p:bldP spid="5" grpId="0" build="p"/>
+      <p:bldP spid="6" grpId="0" build="p"/>
     </p:bldLst>
   </p:timing>
 </p:sld>

</xml_diff>

<commit_message>
Ready for Craig's feedback.
</commit_message>
<xml_diff>
--- a/Docker Proofs of Concept.pptx
+++ b/Docker Proofs of Concept.pptx
@@ -4812,7 +4812,7 @@
           <a:p>
             <a:fld id="{594BF61B-F633-497E-89E6-831EB66A6863}" type="datetimeFigureOut">
               <a:rPr lang="en-US" smtClean="0"/>
-              <a:t>4/9/2019</a:t>
+              <a:t>4/10/2019</a:t>
             </a:fld>
             <a:endParaRPr lang="en-US"/>
           </a:p>
@@ -5063,7 +5063,7 @@
           <a:p>
             <a:fld id="{594BF61B-F633-497E-89E6-831EB66A6863}" type="datetimeFigureOut">
               <a:rPr lang="en-US" smtClean="0"/>
-              <a:t>4/9/2019</a:t>
+              <a:t>4/10/2019</a:t>
             </a:fld>
             <a:endParaRPr lang="en-US"/>
           </a:p>
@@ -5377,7 +5377,7 @@
           <a:p>
             <a:fld id="{594BF61B-F633-497E-89E6-831EB66A6863}" type="datetimeFigureOut">
               <a:rPr lang="en-US" smtClean="0"/>
-              <a:t>4/9/2019</a:t>
+              <a:t>4/10/2019</a:t>
             </a:fld>
             <a:endParaRPr lang="en-US"/>
           </a:p>
@@ -5718,7 +5718,7 @@
           <a:p>
             <a:fld id="{594BF61B-F633-497E-89E6-831EB66A6863}" type="datetimeFigureOut">
               <a:rPr lang="en-US" smtClean="0"/>
-              <a:t>4/9/2019</a:t>
+              <a:t>4/10/2019</a:t>
             </a:fld>
             <a:endParaRPr lang="en-US"/>
           </a:p>
@@ -6032,7 +6032,7 @@
           <a:p>
             <a:fld id="{594BF61B-F633-497E-89E6-831EB66A6863}" type="datetimeFigureOut">
               <a:rPr lang="en-US" smtClean="0"/>
-              <a:t>4/9/2019</a:t>
+              <a:t>4/10/2019</a:t>
             </a:fld>
             <a:endParaRPr lang="en-US"/>
           </a:p>
@@ -6425,7 +6425,7 @@
           <a:p>
             <a:fld id="{594BF61B-F633-497E-89E6-831EB66A6863}" type="datetimeFigureOut">
               <a:rPr lang="en-US" smtClean="0"/>
-              <a:t>4/9/2019</a:t>
+              <a:t>4/10/2019</a:t>
             </a:fld>
             <a:endParaRPr lang="en-US"/>
           </a:p>
@@ -6595,7 +6595,7 @@
           <a:p>
             <a:fld id="{594BF61B-F633-497E-89E6-831EB66A6863}" type="datetimeFigureOut">
               <a:rPr lang="en-US" smtClean="0"/>
-              <a:t>4/9/2019</a:t>
+              <a:t>4/10/2019</a:t>
             </a:fld>
             <a:endParaRPr lang="en-US"/>
           </a:p>
@@ -6775,7 +6775,7 @@
           <a:p>
             <a:fld id="{594BF61B-F633-497E-89E6-831EB66A6863}" type="datetimeFigureOut">
               <a:rPr lang="en-US" smtClean="0"/>
-              <a:t>4/9/2019</a:t>
+              <a:t>4/10/2019</a:t>
             </a:fld>
             <a:endParaRPr lang="en-US"/>
           </a:p>
@@ -6951,7 +6951,7 @@
           <a:p>
             <a:fld id="{594BF61B-F633-497E-89E6-831EB66A6863}" type="datetimeFigureOut">
               <a:rPr lang="en-US" smtClean="0"/>
-              <a:t>4/9/2019</a:t>
+              <a:t>4/10/2019</a:t>
             </a:fld>
             <a:endParaRPr lang="en-US"/>
           </a:p>
@@ -7198,7 +7198,7 @@
           <a:p>
             <a:fld id="{594BF61B-F633-497E-89E6-831EB66A6863}" type="datetimeFigureOut">
               <a:rPr lang="en-US" smtClean="0"/>
-              <a:t>4/9/2019</a:t>
+              <a:t>4/10/2019</a:t>
             </a:fld>
             <a:endParaRPr lang="en-US"/>
           </a:p>
@@ -7430,7 +7430,7 @@
           <a:p>
             <a:fld id="{594BF61B-F633-497E-89E6-831EB66A6863}" type="datetimeFigureOut">
               <a:rPr lang="en-US" smtClean="0"/>
-              <a:t>4/9/2019</a:t>
+              <a:t>4/10/2019</a:t>
             </a:fld>
             <a:endParaRPr lang="en-US"/>
           </a:p>
@@ -7804,7 +7804,7 @@
           <a:p>
             <a:fld id="{594BF61B-F633-497E-89E6-831EB66A6863}" type="datetimeFigureOut">
               <a:rPr lang="en-US" smtClean="0"/>
-              <a:t>4/9/2019</a:t>
+              <a:t>4/10/2019</a:t>
             </a:fld>
             <a:endParaRPr lang="en-US"/>
           </a:p>
@@ -7927,7 +7927,7 @@
           <a:p>
             <a:fld id="{594BF61B-F633-497E-89E6-831EB66A6863}" type="datetimeFigureOut">
               <a:rPr lang="en-US" smtClean="0"/>
-              <a:t>4/9/2019</a:t>
+              <a:t>4/10/2019</a:t>
             </a:fld>
             <a:endParaRPr lang="en-US"/>
           </a:p>
@@ -8022,7 +8022,7 @@
           <a:p>
             <a:fld id="{594BF61B-F633-497E-89E6-831EB66A6863}" type="datetimeFigureOut">
               <a:rPr lang="en-US" smtClean="0"/>
-              <a:t>4/9/2019</a:t>
+              <a:t>4/10/2019</a:t>
             </a:fld>
             <a:endParaRPr lang="en-US"/>
           </a:p>
@@ -8277,7 +8277,7 @@
           <a:p>
             <a:fld id="{594BF61B-F633-497E-89E6-831EB66A6863}" type="datetimeFigureOut">
               <a:rPr lang="en-US" smtClean="0"/>
-              <a:t>4/9/2019</a:t>
+              <a:t>4/10/2019</a:t>
             </a:fld>
             <a:endParaRPr lang="en-US"/>
           </a:p>
@@ -8540,7 +8540,7 @@
           <a:p>
             <a:fld id="{594BF61B-F633-497E-89E6-831EB66A6863}" type="datetimeFigureOut">
               <a:rPr lang="en-US" smtClean="0"/>
-              <a:t>4/9/2019</a:t>
+              <a:t>4/10/2019</a:t>
             </a:fld>
             <a:endParaRPr lang="en-US"/>
           </a:p>
@@ -9283,7 +9283,7 @@
           <a:p>
             <a:fld id="{594BF61B-F633-497E-89E6-831EB66A6863}" type="datetimeFigureOut">
               <a:rPr lang="en-US" smtClean="0"/>
-              <a:t>4/9/2019</a:t>
+              <a:t>4/10/2019</a:t>
             </a:fld>
             <a:endParaRPr lang="en-US"/>
           </a:p>
@@ -10772,6 +10772,12 @@
           <a:p>
             <a:r>
               <a:rPr lang="en-US" dirty="0"/>
+              <a:t>Discuss integration with our existing NOC products</a:t>
+            </a:r>
+          </a:p>
+          <a:p>
+            <a:r>
+              <a:rPr lang="en-US" dirty="0"/>
               <a:t>Etc…</a:t>
             </a:r>
           </a:p>
@@ -11025,6 +11031,67 @@
                                           <p:spTgt spid="3">
                                             <p:txEl>
                                               <p:pRg st="3" end="3"/>
+                                            </p:txEl>
+                                          </p:spTgt>
+                                        </p:tgtEl>
+                                      </p:cBhvr>
+                                    </p:animEffect>
+                                  </p:childTnLst>
+                                </p:cTn>
+                              </p:par>
+                            </p:childTnLst>
+                          </p:cTn>
+                        </p:par>
+                      </p:childTnLst>
+                    </p:cTn>
+                  </p:par>
+                  <p:par>
+                    <p:cTn id="23" fill="hold">
+                      <p:stCondLst>
+                        <p:cond delay="indefinite"/>
+                      </p:stCondLst>
+                      <p:childTnLst>
+                        <p:par>
+                          <p:cTn id="24" fill="hold">
+                            <p:stCondLst>
+                              <p:cond delay="0"/>
+                            </p:stCondLst>
+                            <p:childTnLst>
+                              <p:par>
+                                <p:cTn id="25" presetID="10" presetClass="entr" presetSubtype="0" fill="hold" grpId="0" nodeType="clickEffect">
+                                  <p:stCondLst>
+                                    <p:cond delay="0"/>
+                                  </p:stCondLst>
+                                  <p:childTnLst>
+                                    <p:set>
+                                      <p:cBhvr>
+                                        <p:cTn id="26" dur="1" fill="hold">
+                                          <p:stCondLst>
+                                            <p:cond delay="0"/>
+                                          </p:stCondLst>
+                                        </p:cTn>
+                                        <p:tgtEl>
+                                          <p:spTgt spid="3">
+                                            <p:txEl>
+                                              <p:pRg st="4" end="4"/>
+                                            </p:txEl>
+                                          </p:spTgt>
+                                        </p:tgtEl>
+                                        <p:attrNameLst>
+                                          <p:attrName>style.visibility</p:attrName>
+                                        </p:attrNameLst>
+                                      </p:cBhvr>
+                                      <p:to>
+                                        <p:strVal val="visible"/>
+                                      </p:to>
+                                    </p:set>
+                                    <p:animEffect transition="in" filter="fade">
+                                      <p:cBhvr>
+                                        <p:cTn id="27" dur="500"/>
+                                        <p:tgtEl>
+                                          <p:spTgt spid="3">
+                                            <p:txEl>
+                                              <p:pRg st="4" end="4"/>
                                             </p:txEl>
                                           </p:spTgt>
                                         </p:tgtEl>
@@ -12640,7 +12707,7 @@
           <a:p>
             <a:r>
               <a:rPr lang="en-US" dirty="0"/>
-              <a:t>Containers as a Service</a:t>
+              <a:t>Infrastructure Build-Out</a:t>
             </a:r>
           </a:p>
         </p:txBody>
@@ -12736,7 +12803,7 @@
           <a:p>
             <a:r>
               <a:rPr lang="en-US" dirty="0"/>
-              <a:t>Runs vendor applications</a:t>
+              <a:t>Business and infra. applications</a:t>
             </a:r>
           </a:p>
           <a:p>
@@ -12854,7 +12921,7 @@
           <a:p>
             <a:r>
               <a:rPr lang="en-US" dirty="0"/>
-              <a:t>Need to iterate ASAP</a:t>
+              <a:t>Need to iterate frequently</a:t>
             </a:r>
           </a:p>
         </p:txBody>
@@ -16420,7 +16487,7 @@
         <p:spPr/>
         <p:txBody>
           <a:bodyPr>
-            <a:normAutofit lnSpcReduction="10000"/>
+            <a:normAutofit fontScale="85000" lnSpcReduction="20000"/>
           </a:bodyPr>
           <a:lstStyle/>
           <a:p>
@@ -16459,7 +16526,7 @@
             <a:pPr marL="0" indent="0">
               <a:buNone/>
             </a:pPr>
-            <a:endParaRPr lang="en-US" b="1" dirty="0"/>
+            <a:endParaRPr lang="en-US" dirty="0"/>
           </a:p>
           <a:p>
             <a:pPr marL="0" indent="0">
@@ -16467,25 +16534,12 @@
             </a:pPr>
             <a:r>
               <a:rPr lang="en-US" b="1" dirty="0"/>
-              <a:t>Project Manager</a:t>
+              <a:t>Core Team</a:t>
             </a:r>
             <a:r>
               <a:rPr lang="en-US" dirty="0"/>
-              <a:t>:  John Baldwin, Sara Zacharias, Jonathan Borg, Justine Gaston, </a:t>
-            </a:r>
-            <a:r>
-              <a:rPr lang="en-US" dirty="0" err="1"/>
-              <a:t>Cherryl</a:t>
-            </a:r>
-            <a:r>
-              <a:rPr lang="en-US" dirty="0"/>
-              <a:t> Freeman, Barry </a:t>
-            </a:r>
-            <a:r>
-              <a:rPr lang="en-US" dirty="0" err="1"/>
-              <a:t>Yim</a:t>
-            </a:r>
-            <a:endParaRPr lang="en-US" dirty="0"/>
+              <a:t>:  </a:t>
+            </a:r>
           </a:p>
           <a:p>
             <a:pPr marL="0" indent="0">
@@ -16499,12 +16553,25 @@
             </a:pPr>
             <a:r>
               <a:rPr lang="en-US" b="1" dirty="0"/>
-              <a:t>Stakeholders</a:t>
+              <a:t>Project Manager</a:t>
             </a:r>
             <a:r>
               <a:rPr lang="en-US" dirty="0"/>
-              <a:t>:  Big Data, Desktop Support, Development Managers, eBusiness, Engineering, Oracle Team, SCADA, Server Team</a:t>
-            </a:r>
+              <a:t>:  John Baldwin, Sara Zacharias, Jonathan Borg, Justine Gaston, </a:t>
+            </a:r>
+            <a:r>
+              <a:rPr lang="en-US" dirty="0" err="1"/>
+              <a:t>Cherryl</a:t>
+            </a:r>
+            <a:r>
+              <a:rPr lang="en-US" dirty="0"/>
+              <a:t> Freeman, Barry </a:t>
+            </a:r>
+            <a:r>
+              <a:rPr lang="en-US" dirty="0" err="1"/>
+              <a:t>Yim</a:t>
+            </a:r>
+            <a:endParaRPr lang="en-US" dirty="0"/>
           </a:p>
           <a:p>
             <a:pPr marL="0" indent="0">
@@ -16518,19 +16585,30 @@
             </a:pPr>
             <a:r>
               <a:rPr lang="en-US" b="1" dirty="0"/>
+              <a:t>Stakeholders</a:t>
+            </a:r>
+            <a:r>
+              <a:rPr lang="en-US" dirty="0"/>
+              <a:t>:  Big Data, Desktop Support, Development Managers, eBusiness, Engineering, Oracle Team, SCADA, Server Team</a:t>
+            </a:r>
+          </a:p>
+          <a:p>
+            <a:pPr marL="0" indent="0">
+              <a:buNone/>
+            </a:pPr>
+            <a:endParaRPr lang="en-US" b="1" dirty="0"/>
+          </a:p>
+          <a:p>
+            <a:pPr marL="0" indent="0">
+              <a:buNone/>
+            </a:pPr>
+            <a:r>
+              <a:rPr lang="en-US" b="1" dirty="0"/>
               <a:t>Vendors</a:t>
             </a:r>
             <a:r>
               <a:rPr lang="en-US" dirty="0"/>
-              <a:t>:  Docker Enterprise, </a:t>
-            </a:r>
-            <a:r>
-              <a:rPr lang="en-US"/>
-              <a:t>Red Hat OpenShift</a:t>
-            </a:r>
-            <a:r>
-              <a:rPr lang="en-US" dirty="0"/>
-              <a:t>, Rancher</a:t>
+              <a:t>:  Docker Enterprise, Red Hat OpenShift, Rancher</a:t>
             </a:r>
           </a:p>
         </p:txBody>
@@ -17910,7 +17988,7 @@
           <a:p>
             <a:r>
               <a:rPr lang="en-US" dirty="0"/>
-              <a:t>Minimum Viable Product</a:t>
+              <a:t>Proofs of Concept and Vendor Selection</a:t>
             </a:r>
           </a:p>
         </p:txBody>
@@ -18804,7 +18882,7 @@
           <a:p>
             <a:r>
               <a:rPr lang="en-US" dirty="0"/>
-              <a:t>Let the vendor figure demonstrate how to make container images.</a:t>
+              <a:t>Let the vendor figure out how to make container images.</a:t>
             </a:r>
           </a:p>
         </p:txBody>

</xml_diff>